<commit_message>
added universal model in English
</commit_message>
<xml_diff>
--- a/CaseStudy/BusinessFlow/BusinessFlow-CE.pptx
+++ b/CaseStudy/BusinessFlow/BusinessFlow-CE.pptx
@@ -7,7 +7,7 @@
     <p:sldMasterId id="2147483904" r:id="rId3"/>
   </p:sldMasterIdLst>
   <p:notesMasterIdLst>
-    <p:notesMasterId r:id="rId13"/>
+    <p:notesMasterId r:id="rId14"/>
   </p:notesMasterIdLst>
   <p:sldIdLst>
     <p:sldId id="293" r:id="rId4"/>
@@ -19,6 +19,7 @@
     <p:sldId id="297" r:id="rId10"/>
     <p:sldId id="256" r:id="rId11"/>
     <p:sldId id="302" r:id="rId12"/>
+    <p:sldId id="306" r:id="rId13"/>
   </p:sldIdLst>
   <p:sldSz cx="12192000" cy="6858000"/>
   <p:notesSz cx="6858000" cy="9144000"/>
@@ -207,7 +208,7 @@
           <a:p>
             <a:fld id="{AACA0F1E-6A7A-408C-9B73-64CA77DFA15B}" type="datetimeFigureOut">
               <a:rPr kumimoji="1" lang="ja-JP" altLang="en-US" smtClean="0"/>
-              <a:t>2018/11/12</a:t>
+              <a:t>2018/11/15</a:t>
             </a:fld>
             <a:endParaRPr kumimoji="1" lang="ja-JP" altLang="en-US"/>
           </a:p>
@@ -637,7 +638,7 @@
           <a:p>
             <a:fld id="{51684739-6B5A-4F8B-B16A-0057429AE121}" type="datetime1">
               <a:rPr kumimoji="1" lang="ja-JP" altLang="en-US" smtClean="0"/>
-              <a:t>2018/11/12</a:t>
+              <a:t>2018/11/15</a:t>
             </a:fld>
             <a:endParaRPr kumimoji="1" lang="ja-JP" altLang="en-US"/>
           </a:p>
@@ -843,7 +844,7 @@
           <a:p>
             <a:fld id="{D6C24767-C37E-45FC-97CA-CB11AB76749C}" type="datetime1">
               <a:rPr kumimoji="1" lang="ja-JP" altLang="en-US" smtClean="0"/>
-              <a:t>2018/11/12</a:t>
+              <a:t>2018/11/15</a:t>
             </a:fld>
             <a:endParaRPr kumimoji="1" lang="ja-JP" altLang="en-US"/>
           </a:p>
@@ -1059,7 +1060,7 @@
           <a:p>
             <a:fld id="{7BA61CA7-7D10-4549-A359-CC229CBEA567}" type="datetime1">
               <a:rPr kumimoji="1" lang="ja-JP" altLang="en-US" smtClean="0"/>
-              <a:t>2018/11/12</a:t>
+              <a:t>2018/11/15</a:t>
             </a:fld>
             <a:endParaRPr kumimoji="1" lang="ja-JP" altLang="en-US"/>
           </a:p>
@@ -2198,7 +2199,7 @@
           <a:p>
             <a:fld id="{F068AB85-2ACE-4F70-9090-AAB334D4C59F}" type="datetimeFigureOut">
               <a:rPr kumimoji="1" lang="ja-JP" altLang="en-US" smtClean="0"/>
-              <a:t>2018/11/12</a:t>
+              <a:t>2018/11/15</a:t>
             </a:fld>
             <a:endParaRPr kumimoji="1" lang="ja-JP" altLang="en-US"/>
           </a:p>
@@ -2428,7 +2429,7 @@
           <a:p>
             <a:fld id="{F068AB85-2ACE-4F70-9090-AAB334D4C59F}" type="datetimeFigureOut">
               <a:rPr kumimoji="1" lang="ja-JP" altLang="en-US" smtClean="0"/>
-              <a:t>2018/11/12</a:t>
+              <a:t>2018/11/15</a:t>
             </a:fld>
             <a:endParaRPr kumimoji="1" lang="ja-JP" altLang="en-US"/>
           </a:p>
@@ -2703,7 +2704,7 @@
           <a:p>
             <a:fld id="{F068AB85-2ACE-4F70-9090-AAB334D4C59F}" type="datetimeFigureOut">
               <a:rPr kumimoji="1" lang="ja-JP" altLang="en-US" smtClean="0"/>
-              <a:t>2018/11/12</a:t>
+              <a:t>2018/11/15</a:t>
             </a:fld>
             <a:endParaRPr kumimoji="1" lang="ja-JP" altLang="en-US"/>
           </a:p>
@@ -3032,7 +3033,7 @@
           <a:p>
             <a:fld id="{F068AB85-2ACE-4F70-9090-AAB334D4C59F}" type="datetimeFigureOut">
               <a:rPr kumimoji="1" lang="ja-JP" altLang="en-US" smtClean="0"/>
-              <a:t>2018/11/12</a:t>
+              <a:t>2018/11/15</a:t>
             </a:fld>
             <a:endParaRPr kumimoji="1" lang="ja-JP" altLang="en-US"/>
           </a:p>
@@ -3246,7 +3247,7 @@
           <a:p>
             <a:fld id="{B46D0EEA-4AC9-487F-BF7E-E7ADE265C8B1}" type="datetime1">
               <a:rPr kumimoji="1" lang="ja-JP" altLang="en-US" smtClean="0"/>
-              <a:t>2018/11/12</a:t>
+              <a:t>2018/11/15</a:t>
             </a:fld>
             <a:endParaRPr kumimoji="1" lang="ja-JP" altLang="en-US"/>
           </a:p>
@@ -3713,7 +3714,7 @@
           <a:p>
             <a:fld id="{F068AB85-2ACE-4F70-9090-AAB334D4C59F}" type="datetimeFigureOut">
               <a:rPr kumimoji="1" lang="ja-JP" altLang="en-US" smtClean="0"/>
-              <a:t>2018/11/12</a:t>
+              <a:t>2018/11/15</a:t>
             </a:fld>
             <a:endParaRPr kumimoji="1" lang="ja-JP" altLang="en-US"/>
           </a:p>
@@ -3854,7 +3855,7 @@
           <a:p>
             <a:fld id="{F068AB85-2ACE-4F70-9090-AAB334D4C59F}" type="datetimeFigureOut">
               <a:rPr kumimoji="1" lang="ja-JP" altLang="en-US" smtClean="0"/>
-              <a:t>2018/11/12</a:t>
+              <a:t>2018/11/15</a:t>
             </a:fld>
             <a:endParaRPr kumimoji="1" lang="ja-JP" altLang="en-US"/>
           </a:p>
@@ -3967,7 +3968,7 @@
           <a:p>
             <a:fld id="{F068AB85-2ACE-4F70-9090-AAB334D4C59F}" type="datetimeFigureOut">
               <a:rPr kumimoji="1" lang="ja-JP" altLang="en-US" smtClean="0"/>
-              <a:t>2018/11/12</a:t>
+              <a:t>2018/11/15</a:t>
             </a:fld>
             <a:endParaRPr kumimoji="1" lang="ja-JP" altLang="en-US"/>
           </a:p>
@@ -4310,7 +4311,7 @@
           <a:p>
             <a:fld id="{F068AB85-2ACE-4F70-9090-AAB334D4C59F}" type="datetimeFigureOut">
               <a:rPr kumimoji="1" lang="ja-JP" altLang="en-US" smtClean="0"/>
-              <a:t>2018/11/12</a:t>
+              <a:t>2018/11/15</a:t>
             </a:fld>
             <a:endParaRPr kumimoji="1" lang="ja-JP" altLang="en-US"/>
           </a:p>
@@ -4598,7 +4599,7 @@
           <a:p>
             <a:fld id="{F068AB85-2ACE-4F70-9090-AAB334D4C59F}" type="datetimeFigureOut">
               <a:rPr kumimoji="1" lang="ja-JP" altLang="en-US" smtClean="0"/>
-              <a:t>2018/11/12</a:t>
+              <a:t>2018/11/15</a:t>
             </a:fld>
             <a:endParaRPr kumimoji="1" lang="ja-JP" altLang="en-US"/>
           </a:p>
@@ -4828,7 +4829,7 @@
           <a:p>
             <a:fld id="{F068AB85-2ACE-4F70-9090-AAB334D4C59F}" type="datetimeFigureOut">
               <a:rPr kumimoji="1" lang="ja-JP" altLang="en-US" smtClean="0"/>
-              <a:t>2018/11/12</a:t>
+              <a:t>2018/11/15</a:t>
             </a:fld>
             <a:endParaRPr kumimoji="1" lang="ja-JP" altLang="en-US"/>
           </a:p>
@@ -5068,7 +5069,7 @@
           <a:p>
             <a:fld id="{F068AB85-2ACE-4F70-9090-AAB334D4C59F}" type="datetimeFigureOut">
               <a:rPr kumimoji="1" lang="ja-JP" altLang="en-US" smtClean="0"/>
-              <a:t>2018/11/12</a:t>
+              <a:t>2018/11/15</a:t>
             </a:fld>
             <a:endParaRPr kumimoji="1" lang="ja-JP" altLang="en-US"/>
           </a:p>
@@ -5326,7 +5327,7 @@
           <a:p>
             <a:fld id="{9AD472B9-0DC0-43A3-A586-259C5CCCC7B7}" type="datetime1">
               <a:rPr kumimoji="1" lang="ja-JP" altLang="en-US" smtClean="0"/>
-              <a:t>2018/11/12</a:t>
+              <a:t>2018/11/15</a:t>
             </a:fld>
             <a:endParaRPr kumimoji="1" lang="ja-JP" altLang="en-US"/>
           </a:p>
@@ -5681,7 +5682,7 @@
           <a:p>
             <a:fld id="{FCE8AD0A-FF56-440C-8866-2DBB85638F26}" type="datetime1">
               <a:rPr kumimoji="1" lang="ja-JP" altLang="en-US" smtClean="0"/>
-              <a:t>2018/11/12</a:t>
+              <a:t>2018/11/15</a:t>
             </a:fld>
             <a:endParaRPr kumimoji="1" lang="ja-JP" altLang="en-US"/>
           </a:p>
@@ -6172,7 +6173,7 @@
           <a:p>
             <a:fld id="{B98F01A6-9B05-4412-9B66-4612911364EA}" type="datetime1">
               <a:rPr kumimoji="1" lang="ja-JP" altLang="en-US" smtClean="0"/>
-              <a:t>2018/11/12</a:t>
+              <a:t>2018/11/15</a:t>
             </a:fld>
             <a:endParaRPr kumimoji="1" lang="ja-JP" altLang="en-US"/>
           </a:p>
@@ -6294,7 +6295,7 @@
           <a:p>
             <a:fld id="{930E7C22-1549-405D-A0B3-B16D97AD5E99}" type="datetime1">
               <a:rPr kumimoji="1" lang="ja-JP" altLang="en-US" smtClean="0"/>
-              <a:t>2018/11/12</a:t>
+              <a:t>2018/11/15</a:t>
             </a:fld>
             <a:endParaRPr kumimoji="1" lang="ja-JP" altLang="en-US"/>
           </a:p>
@@ -6393,7 +6394,7 @@
           <a:p>
             <a:fld id="{C15DACC1-FFB1-4714-840C-A511AA693359}" type="datetime1">
               <a:rPr kumimoji="1" lang="ja-JP" altLang="en-US" smtClean="0"/>
-              <a:t>2018/11/12</a:t>
+              <a:t>2018/11/15</a:t>
             </a:fld>
             <a:endParaRPr kumimoji="1" lang="ja-JP" altLang="en-US"/>
           </a:p>
@@ -6706,7 +6707,7 @@
           <a:p>
             <a:fld id="{5F86D9A3-D474-427A-8BEC-4724A22B28E1}" type="datetime1">
               <a:rPr kumimoji="1" lang="ja-JP" altLang="en-US" smtClean="0"/>
-              <a:t>2018/11/12</a:t>
+              <a:t>2018/11/15</a:t>
             </a:fld>
             <a:endParaRPr kumimoji="1" lang="ja-JP" altLang="en-US"/>
           </a:p>
@@ -6967,7 +6968,7 @@
           <a:p>
             <a:fld id="{9DFBE405-2BEB-4CB5-9650-43A5C6CAEB09}" type="datetime1">
               <a:rPr kumimoji="1" lang="ja-JP" altLang="en-US" smtClean="0"/>
-              <a:t>2018/11/12</a:t>
+              <a:t>2018/11/15</a:t>
             </a:fld>
             <a:endParaRPr kumimoji="1" lang="ja-JP" altLang="en-US"/>
           </a:p>
@@ -7215,7 +7216,7 @@
           <a:p>
             <a:fld id="{AE379D9F-14C0-4FEA-A161-9952562F370E}" type="datetime1">
               <a:rPr kumimoji="1" lang="ja-JP" altLang="en-US" smtClean="0"/>
-              <a:t>2018/11/12</a:t>
+              <a:t>2018/11/15</a:t>
             </a:fld>
             <a:endParaRPr kumimoji="1" lang="ja-JP" altLang="en-US"/>
           </a:p>
@@ -8205,7 +8206,7 @@
           <a:p>
             <a:fld id="{F068AB85-2ACE-4F70-9090-AAB334D4C59F}" type="datetimeFigureOut">
               <a:rPr kumimoji="1" lang="ja-JP" altLang="en-US" smtClean="0"/>
-              <a:t>2018/11/12</a:t>
+              <a:t>2018/11/15</a:t>
             </a:fld>
             <a:endParaRPr kumimoji="1" lang="ja-JP" altLang="en-US"/>
           </a:p>
@@ -10996,6 +10997,4691 @@
     <p:extLst>
       <p:ext uri="{BB962C8B-B14F-4D97-AF65-F5344CB8AC3E}">
         <p14:creationId xmlns:p14="http://schemas.microsoft.com/office/powerpoint/2010/main" val="207295777"/>
+      </p:ext>
+    </p:extLst>
+  </p:cSld>
+  <p:clrMapOvr>
+    <a:masterClrMapping/>
+  </p:clrMapOvr>
+</p:sld>
+</file>
+
+<file path=ppt/slides/slide10.xml><?xml version="1.0" encoding="utf-8"?>
+<p:sld xmlns:a="http://schemas.openxmlformats.org/drawingml/2006/main" xmlns:r="http://schemas.openxmlformats.org/officeDocument/2006/relationships" xmlns:p="http://schemas.openxmlformats.org/presentationml/2006/main">
+  <p:cSld>
+    <p:spTree>
+      <p:nvGrpSpPr>
+        <p:cNvPr id="1" name=""/>
+        <p:cNvGrpSpPr/>
+        <p:nvPr/>
+      </p:nvGrpSpPr>
+      <p:grpSpPr>
+        <a:xfrm>
+          <a:off x="0" y="0"/>
+          <a:ext cx="0" cy="0"/>
+          <a:chOff x="0" y="0"/>
+          <a:chExt cx="0" cy="0"/>
+        </a:xfrm>
+      </p:grpSpPr>
+      <p:sp>
+        <p:nvSpPr>
+          <p:cNvPr id="2" name="フッター プレースホルダー 1">
+            <a:extLst>
+              <a:ext uri="{FF2B5EF4-FFF2-40B4-BE49-F238E27FC236}">
+                <a16:creationId xmlns:a16="http://schemas.microsoft.com/office/drawing/2014/main" id="{E8DFE1D6-FE49-4377-A3BD-BCE7470B4846}"/>
+              </a:ext>
+            </a:extLst>
+          </p:cNvPr>
+          <p:cNvSpPr>
+            <a:spLocks noGrp="1"/>
+          </p:cNvSpPr>
+          <p:nvPr>
+            <p:ph type="ftr" sz="quarter" idx="11"/>
+          </p:nvPr>
+        </p:nvSpPr>
+        <p:spPr>
+          <a:xfrm>
+            <a:off x="4648200" y="6356350"/>
+            <a:ext cx="2895600" cy="365125"/>
+          </a:xfrm>
+        </p:spPr>
+        <p:txBody>
+          <a:bodyPr/>
+          <a:lstStyle/>
+          <a:p>
+            <a:pPr marL="0" marR="0" lvl="0" indent="0" algn="ctr" defTabSz="914400" rtl="0" eaLnBrk="1" fontAlgn="auto" latinLnBrk="0" hangingPunct="1">
+              <a:lnSpc>
+                <a:spcPct val="100000"/>
+              </a:lnSpc>
+              <a:spcBef>
+                <a:spcPts val="0"/>
+              </a:spcBef>
+              <a:spcAft>
+                <a:spcPts val="0"/>
+              </a:spcAft>
+              <a:buClrTx/>
+              <a:buSzTx/>
+              <a:buFontTx/>
+              <a:buNone/>
+              <a:tabLst/>
+              <a:defRPr/>
+            </a:pPr>
+            <a:r>
+              <a:rPr kumimoji="1" lang="en-US" altLang="ja-JP" sz="1200" b="0" i="0" u="none" strike="noStrike" kern="1200" cap="none" spc="0" normalizeH="0" baseline="0" noProof="0">
+                <a:ln>
+                  <a:noFill/>
+                </a:ln>
+                <a:solidFill>
+                  <a:prstClr val="black">
+                    <a:tint val="75000"/>
+                  </a:prstClr>
+                </a:solidFill>
+                <a:effectLst/>
+                <a:uLnTx/>
+                <a:uFillTx/>
+                <a:latin typeface="Calibri"/>
+                <a:ea typeface="ＭＳ Ｐゴシック" panose="020B0600070205080204" pitchFamily="50" charset="-128"/>
+                <a:cs typeface="+mn-cs"/>
+              </a:rPr>
+              <a:t>CC0-1.0</a:t>
+            </a:r>
+            <a:endParaRPr kumimoji="1" lang="ja-JP" altLang="en-US" sz="1200" b="0" i="0" u="none" strike="noStrike" kern="1200" cap="none" spc="0" normalizeH="0" baseline="0" noProof="0" dirty="0">
+              <a:ln>
+                <a:noFill/>
+              </a:ln>
+              <a:solidFill>
+                <a:prstClr val="black">
+                  <a:tint val="75000"/>
+                </a:prstClr>
+              </a:solidFill>
+              <a:effectLst/>
+              <a:uLnTx/>
+              <a:uFillTx/>
+              <a:latin typeface="Calibri"/>
+              <a:ea typeface="ＭＳ Ｐゴシック" panose="020B0600070205080204" pitchFamily="50" charset="-128"/>
+              <a:cs typeface="+mn-cs"/>
+            </a:endParaRPr>
+          </a:p>
+        </p:txBody>
+      </p:sp>
+      <p:grpSp>
+        <p:nvGrpSpPr>
+          <p:cNvPr id="6" name="グループ化 5">
+            <a:extLst>
+              <a:ext uri="{FF2B5EF4-FFF2-40B4-BE49-F238E27FC236}">
+                <a16:creationId xmlns:a16="http://schemas.microsoft.com/office/drawing/2014/main" id="{1B411A8F-3472-460F-A512-BBA3619B8BEA}"/>
+              </a:ext>
+            </a:extLst>
+          </p:cNvPr>
+          <p:cNvGrpSpPr/>
+          <p:nvPr/>
+        </p:nvGrpSpPr>
+        <p:grpSpPr>
+          <a:xfrm>
+            <a:off x="520912" y="219362"/>
+            <a:ext cx="10596855" cy="6051490"/>
+            <a:chOff x="520912" y="219362"/>
+            <a:chExt cx="10596855" cy="6051490"/>
+          </a:xfrm>
+        </p:grpSpPr>
+        <p:sp>
+          <p:nvSpPr>
+            <p:cNvPr id="3" name="四角形: 角を丸くする 2">
+              <a:extLst>
+                <a:ext uri="{FF2B5EF4-FFF2-40B4-BE49-F238E27FC236}">
+                  <a16:creationId xmlns:a16="http://schemas.microsoft.com/office/drawing/2014/main" id="{2C34A4A2-6303-43D7-A31A-2AA017E830C7}"/>
+                </a:ext>
+              </a:extLst>
+            </p:cNvPr>
+            <p:cNvSpPr/>
+            <p:nvPr/>
+          </p:nvSpPr>
+          <p:spPr>
+            <a:xfrm>
+              <a:off x="520912" y="2284389"/>
+              <a:ext cx="1733005" cy="3204754"/>
+            </a:xfrm>
+            <a:prstGeom prst="roundRect">
+              <a:avLst/>
+            </a:prstGeom>
+            <a:solidFill>
+              <a:srgbClr val="00B050"/>
+            </a:solidFill>
+            <a:ln>
+              <a:solidFill>
+                <a:srgbClr val="00B050"/>
+              </a:solidFill>
+            </a:ln>
+          </p:spPr>
+          <p:style>
+            <a:lnRef idx="2">
+              <a:schemeClr val="accent1">
+                <a:shade val="50000"/>
+              </a:schemeClr>
+            </a:lnRef>
+            <a:fillRef idx="1">
+              <a:schemeClr val="accent1"/>
+            </a:fillRef>
+            <a:effectRef idx="0">
+              <a:schemeClr val="accent1"/>
+            </a:effectRef>
+            <a:fontRef idx="minor">
+              <a:schemeClr val="lt1"/>
+            </a:fontRef>
+          </p:style>
+          <p:txBody>
+            <a:bodyPr rtlCol="0" anchor="ctr"/>
+            <a:lstStyle/>
+            <a:p>
+              <a:pPr marL="0" marR="0" lvl="0" indent="0" algn="ctr" defTabSz="914400" rtl="0" eaLnBrk="1" fontAlgn="auto" latinLnBrk="0" hangingPunct="1">
+                <a:lnSpc>
+                  <a:spcPct val="100000"/>
+                </a:lnSpc>
+                <a:spcBef>
+                  <a:spcPts val="0"/>
+                </a:spcBef>
+                <a:spcAft>
+                  <a:spcPts val="0"/>
+                </a:spcAft>
+                <a:buClrTx/>
+                <a:buSzTx/>
+                <a:buFontTx/>
+                <a:buNone/>
+                <a:tabLst/>
+                <a:defRPr/>
+              </a:pPr>
+              <a:r>
+                <a:rPr kumimoji="1" lang="en-US" altLang="ja-JP" dirty="0">
+                  <a:solidFill>
+                    <a:prstClr val="white"/>
+                  </a:solidFill>
+                  <a:latin typeface="Calibri"/>
+                  <a:ea typeface="ＭＳ Ｐゴシック" panose="020B0600070205080204" pitchFamily="50" charset="-128"/>
+                </a:rPr>
+                <a:t>Supplier</a:t>
+              </a:r>
+              <a:endParaRPr kumimoji="1" lang="en-US" altLang="ja-JP" sz="1800" b="0" i="0" u="none" strike="noStrike" kern="1200" cap="none" spc="0" normalizeH="0" baseline="0" noProof="0" dirty="0">
+                <a:ln>
+                  <a:noFill/>
+                </a:ln>
+                <a:solidFill>
+                  <a:prstClr val="white"/>
+                </a:solidFill>
+                <a:effectLst/>
+                <a:uLnTx/>
+                <a:uFillTx/>
+                <a:latin typeface="Calibri"/>
+                <a:ea typeface="ＭＳ Ｐゴシック" panose="020B0600070205080204" pitchFamily="50" charset="-128"/>
+                <a:cs typeface="+mn-cs"/>
+              </a:endParaRPr>
+            </a:p>
+          </p:txBody>
+        </p:sp>
+        <p:sp>
+          <p:nvSpPr>
+            <p:cNvPr id="7" name="四角形: 角を丸くする 6">
+              <a:extLst>
+                <a:ext uri="{FF2B5EF4-FFF2-40B4-BE49-F238E27FC236}">
+                  <a16:creationId xmlns:a16="http://schemas.microsoft.com/office/drawing/2014/main" id="{8E1A5EC1-C62A-4EBD-8155-D9DD4151CBB7}"/>
+                </a:ext>
+              </a:extLst>
+            </p:cNvPr>
+            <p:cNvSpPr/>
+            <p:nvPr/>
+          </p:nvSpPr>
+          <p:spPr>
+            <a:xfrm>
+              <a:off x="3617350" y="274774"/>
+              <a:ext cx="4464203" cy="5202913"/>
+            </a:xfrm>
+            <a:prstGeom prst="roundRect">
+              <a:avLst/>
+            </a:prstGeom>
+            <a:solidFill>
+              <a:schemeClr val="accent1">
+                <a:lumMod val="60000"/>
+                <a:lumOff val="40000"/>
+              </a:schemeClr>
+            </a:solidFill>
+          </p:spPr>
+          <p:style>
+            <a:lnRef idx="2">
+              <a:schemeClr val="accent1">
+                <a:shade val="50000"/>
+              </a:schemeClr>
+            </a:lnRef>
+            <a:fillRef idx="1">
+              <a:schemeClr val="accent1"/>
+            </a:fillRef>
+            <a:effectRef idx="0">
+              <a:schemeClr val="accent1"/>
+            </a:effectRef>
+            <a:fontRef idx="minor">
+              <a:schemeClr val="lt1"/>
+            </a:fontRef>
+          </p:style>
+          <p:txBody>
+            <a:bodyPr rtlCol="0" anchor="ctr"/>
+            <a:lstStyle/>
+            <a:p>
+              <a:pPr marL="0" marR="0" lvl="0" indent="0" algn="ctr" defTabSz="914400" rtl="0" eaLnBrk="1" fontAlgn="auto" latinLnBrk="0" hangingPunct="1">
+                <a:lnSpc>
+                  <a:spcPct val="100000"/>
+                </a:lnSpc>
+                <a:spcBef>
+                  <a:spcPts val="0"/>
+                </a:spcBef>
+                <a:spcAft>
+                  <a:spcPts val="0"/>
+                </a:spcAft>
+                <a:buClrTx/>
+                <a:buSzTx/>
+                <a:buFontTx/>
+                <a:buNone/>
+                <a:tabLst/>
+                <a:defRPr/>
+              </a:pPr>
+              <a:endParaRPr kumimoji="1" lang="ja-JP" altLang="en-US" sz="1800" b="0" i="0" u="none" strike="noStrike" kern="1200" cap="none" spc="0" normalizeH="0" baseline="0" noProof="0">
+                <a:ln>
+                  <a:noFill/>
+                </a:ln>
+                <a:solidFill>
+                  <a:prstClr val="white"/>
+                </a:solidFill>
+                <a:effectLst/>
+                <a:uLnTx/>
+                <a:uFillTx/>
+                <a:latin typeface="Calibri"/>
+                <a:ea typeface="ＭＳ Ｐゴシック" panose="020B0600070205080204" pitchFamily="50" charset="-128"/>
+                <a:cs typeface="+mn-cs"/>
+              </a:endParaRPr>
+            </a:p>
+          </p:txBody>
+        </p:sp>
+        <p:sp>
+          <p:nvSpPr>
+            <p:cNvPr id="8" name="四角形: 角を丸くする 7">
+              <a:extLst>
+                <a:ext uri="{FF2B5EF4-FFF2-40B4-BE49-F238E27FC236}">
+                  <a16:creationId xmlns:a16="http://schemas.microsoft.com/office/drawing/2014/main" id="{89052F24-0417-4CDA-8638-962F182F5F29}"/>
+                </a:ext>
+              </a:extLst>
+            </p:cNvPr>
+            <p:cNvSpPr/>
+            <p:nvPr/>
+          </p:nvSpPr>
+          <p:spPr>
+            <a:xfrm>
+              <a:off x="8834848" y="2425332"/>
+              <a:ext cx="1733005" cy="3204754"/>
+            </a:xfrm>
+            <a:prstGeom prst="roundRect">
+              <a:avLst/>
+            </a:prstGeom>
+            <a:solidFill>
+              <a:srgbClr val="00B050"/>
+            </a:solidFill>
+            <a:ln>
+              <a:solidFill>
+                <a:srgbClr val="00B050"/>
+              </a:solidFill>
+            </a:ln>
+          </p:spPr>
+          <p:style>
+            <a:lnRef idx="2">
+              <a:schemeClr val="accent1">
+                <a:shade val="50000"/>
+              </a:schemeClr>
+            </a:lnRef>
+            <a:fillRef idx="1">
+              <a:schemeClr val="accent1"/>
+            </a:fillRef>
+            <a:effectRef idx="0">
+              <a:schemeClr val="accent1"/>
+            </a:effectRef>
+            <a:fontRef idx="minor">
+              <a:schemeClr val="lt1"/>
+            </a:fontRef>
+          </p:style>
+          <p:txBody>
+            <a:bodyPr rtlCol="0" anchor="ctr"/>
+            <a:lstStyle/>
+            <a:p>
+              <a:pPr marL="0" marR="0" lvl="0" indent="0" algn="ctr" defTabSz="914400" rtl="0" eaLnBrk="1" fontAlgn="auto" latinLnBrk="0" hangingPunct="1">
+                <a:lnSpc>
+                  <a:spcPct val="100000"/>
+                </a:lnSpc>
+                <a:spcBef>
+                  <a:spcPts val="0"/>
+                </a:spcBef>
+                <a:spcAft>
+                  <a:spcPts val="0"/>
+                </a:spcAft>
+                <a:buClrTx/>
+                <a:buSzTx/>
+                <a:buFontTx/>
+                <a:buNone/>
+                <a:tabLst/>
+                <a:defRPr/>
+              </a:pPr>
+              <a:r>
+                <a:rPr kumimoji="1" lang="en-US" altLang="ja-JP" dirty="0">
+                  <a:solidFill>
+                    <a:prstClr val="white"/>
+                  </a:solidFill>
+                  <a:latin typeface="Calibri"/>
+                  <a:ea typeface="ＭＳ Ｐゴシック" panose="020B0600070205080204" pitchFamily="50" charset="-128"/>
+                </a:rPr>
+                <a:t>Recipient</a:t>
+              </a:r>
+              <a:endParaRPr kumimoji="1" lang="ja-JP" altLang="en-US" sz="1800" b="0" i="0" u="none" strike="noStrike" kern="1200" cap="none" spc="0" normalizeH="0" baseline="0" noProof="0" dirty="0">
+                <a:ln>
+                  <a:noFill/>
+                </a:ln>
+                <a:solidFill>
+                  <a:prstClr val="white"/>
+                </a:solidFill>
+                <a:effectLst/>
+                <a:uLnTx/>
+                <a:uFillTx/>
+                <a:latin typeface="Calibri"/>
+                <a:ea typeface="ＭＳ Ｐゴシック" panose="020B0600070205080204" pitchFamily="50" charset="-128"/>
+                <a:cs typeface="+mn-cs"/>
+              </a:endParaRPr>
+            </a:p>
+          </p:txBody>
+        </p:sp>
+        <p:sp>
+          <p:nvSpPr>
+            <p:cNvPr id="10" name="四角形: 角を丸くする 9">
+              <a:extLst>
+                <a:ext uri="{FF2B5EF4-FFF2-40B4-BE49-F238E27FC236}">
+                  <a16:creationId xmlns:a16="http://schemas.microsoft.com/office/drawing/2014/main" id="{3E8CA6F4-9AF7-4331-9663-D13706D8F841}"/>
+                </a:ext>
+              </a:extLst>
+            </p:cNvPr>
+            <p:cNvSpPr/>
+            <p:nvPr/>
+          </p:nvSpPr>
+          <p:spPr>
+            <a:xfrm>
+              <a:off x="4249891" y="5639776"/>
+              <a:ext cx="3561795" cy="631076"/>
+            </a:xfrm>
+            <a:prstGeom prst="roundRect">
+              <a:avLst/>
+            </a:prstGeom>
+            <a:solidFill>
+              <a:srgbClr val="00B050"/>
+            </a:solidFill>
+            <a:ln>
+              <a:solidFill>
+                <a:srgbClr val="00B050"/>
+              </a:solidFill>
+            </a:ln>
+          </p:spPr>
+          <p:style>
+            <a:lnRef idx="2">
+              <a:schemeClr val="accent1">
+                <a:shade val="50000"/>
+              </a:schemeClr>
+            </a:lnRef>
+            <a:fillRef idx="1">
+              <a:schemeClr val="accent1"/>
+            </a:fillRef>
+            <a:effectRef idx="0">
+              <a:schemeClr val="accent1"/>
+            </a:effectRef>
+            <a:fontRef idx="minor">
+              <a:schemeClr val="lt1"/>
+            </a:fontRef>
+          </p:style>
+          <p:txBody>
+            <a:bodyPr rtlCol="0" anchor="ctr"/>
+            <a:lstStyle/>
+            <a:p>
+              <a:pPr marL="0" marR="0" lvl="0" indent="0" algn="ctr" defTabSz="914400" rtl="0" eaLnBrk="1" fontAlgn="auto" latinLnBrk="0" hangingPunct="1">
+                <a:lnSpc>
+                  <a:spcPct val="100000"/>
+                </a:lnSpc>
+                <a:spcBef>
+                  <a:spcPts val="0"/>
+                </a:spcBef>
+                <a:spcAft>
+                  <a:spcPts val="0"/>
+                </a:spcAft>
+                <a:buClrTx/>
+                <a:buSzTx/>
+                <a:buFontTx/>
+                <a:buNone/>
+                <a:tabLst/>
+                <a:defRPr/>
+              </a:pPr>
+              <a:r>
+                <a:rPr kumimoji="1" lang="en-US" altLang="ja-JP" dirty="0">
+                  <a:solidFill>
+                    <a:prstClr val="white"/>
+                  </a:solidFill>
+                  <a:latin typeface="Calibri"/>
+                  <a:ea typeface="ＭＳ Ｐゴシック" panose="020B0600070205080204" pitchFamily="50" charset="-128"/>
+                </a:rPr>
+                <a:t>OSS</a:t>
+              </a:r>
+              <a:r>
+                <a:rPr kumimoji="1" lang="ja-JP" altLang="en-US" dirty="0">
+                  <a:solidFill>
+                    <a:prstClr val="white"/>
+                  </a:solidFill>
+                  <a:latin typeface="Calibri"/>
+                  <a:ea typeface="ＭＳ Ｐゴシック" panose="020B0600070205080204" pitchFamily="50" charset="-128"/>
+                </a:rPr>
+                <a:t> </a:t>
+              </a:r>
+              <a:r>
+                <a:rPr kumimoji="1" lang="en-US" altLang="ja-JP" dirty="0">
+                  <a:solidFill>
+                    <a:prstClr val="white"/>
+                  </a:solidFill>
+                  <a:latin typeface="Calibri"/>
+                  <a:ea typeface="ＭＳ Ｐゴシック" panose="020B0600070205080204" pitchFamily="50" charset="-128"/>
+                </a:rPr>
+                <a:t>community</a:t>
+              </a:r>
+              <a:endParaRPr kumimoji="1" lang="ja-JP" altLang="en-US" sz="1800" b="0" i="0" u="none" strike="noStrike" kern="1200" cap="none" spc="0" normalizeH="0" baseline="0" noProof="0" dirty="0">
+                <a:ln>
+                  <a:noFill/>
+                </a:ln>
+                <a:solidFill>
+                  <a:prstClr val="white"/>
+                </a:solidFill>
+                <a:effectLst/>
+                <a:uLnTx/>
+                <a:uFillTx/>
+                <a:latin typeface="Calibri"/>
+                <a:ea typeface="ＭＳ Ｐゴシック" panose="020B0600070205080204" pitchFamily="50" charset="-128"/>
+                <a:cs typeface="+mn-cs"/>
+              </a:endParaRPr>
+            </a:p>
+          </p:txBody>
+        </p:sp>
+        <p:sp>
+          <p:nvSpPr>
+            <p:cNvPr id="11" name="四角形: 角を丸くする 10">
+              <a:extLst>
+                <a:ext uri="{FF2B5EF4-FFF2-40B4-BE49-F238E27FC236}">
+                  <a16:creationId xmlns:a16="http://schemas.microsoft.com/office/drawing/2014/main" id="{AFB6E93C-9793-472A-B955-A686FAC84609}"/>
+                </a:ext>
+              </a:extLst>
+            </p:cNvPr>
+            <p:cNvSpPr/>
+            <p:nvPr/>
+          </p:nvSpPr>
+          <p:spPr>
+            <a:xfrm>
+              <a:off x="4836750" y="2538986"/>
+              <a:ext cx="2145891" cy="1781839"/>
+            </a:xfrm>
+            <a:prstGeom prst="roundRect">
+              <a:avLst/>
+            </a:prstGeom>
+            <a:solidFill>
+              <a:srgbClr val="FFFF00"/>
+            </a:solidFill>
+            <a:ln>
+              <a:noFill/>
+            </a:ln>
+          </p:spPr>
+          <p:style>
+            <a:lnRef idx="2">
+              <a:schemeClr val="accent1">
+                <a:shade val="50000"/>
+              </a:schemeClr>
+            </a:lnRef>
+            <a:fillRef idx="1">
+              <a:schemeClr val="accent1"/>
+            </a:fillRef>
+            <a:effectRef idx="0">
+              <a:schemeClr val="accent1"/>
+            </a:effectRef>
+            <a:fontRef idx="minor">
+              <a:schemeClr val="lt1"/>
+            </a:fontRef>
+          </p:style>
+          <p:txBody>
+            <a:bodyPr rtlCol="0" anchor="ctr"/>
+            <a:lstStyle/>
+            <a:p>
+              <a:pPr marL="0" marR="0" lvl="0" indent="0" algn="ctr" defTabSz="914400" rtl="0" eaLnBrk="1" fontAlgn="auto" latinLnBrk="0" hangingPunct="1">
+                <a:lnSpc>
+                  <a:spcPct val="100000"/>
+                </a:lnSpc>
+                <a:spcBef>
+                  <a:spcPts val="0"/>
+                </a:spcBef>
+                <a:spcAft>
+                  <a:spcPts val="0"/>
+                </a:spcAft>
+                <a:buClrTx/>
+                <a:buSzTx/>
+                <a:buFontTx/>
+                <a:buNone/>
+                <a:tabLst/>
+                <a:defRPr/>
+              </a:pPr>
+              <a:r>
+                <a:rPr kumimoji="1" lang="en-US" altLang="ja-JP" dirty="0">
+                  <a:solidFill>
+                    <a:prstClr val="black"/>
+                  </a:solidFill>
+                  <a:latin typeface="Calibri"/>
+                  <a:ea typeface="ＭＳ Ｐゴシック" panose="020B0600070205080204" pitchFamily="50" charset="-128"/>
+                </a:rPr>
+                <a:t>Software Development</a:t>
+              </a:r>
+              <a:endParaRPr kumimoji="1" lang="en-US" altLang="ja-JP" sz="1800" b="0" i="0" u="none" strike="noStrike" kern="1200" cap="none" spc="0" normalizeH="0" baseline="0" noProof="0" dirty="0">
+                <a:ln>
+                  <a:noFill/>
+                </a:ln>
+                <a:solidFill>
+                  <a:prstClr val="black"/>
+                </a:solidFill>
+                <a:effectLst/>
+                <a:uLnTx/>
+                <a:uFillTx/>
+                <a:latin typeface="Calibri"/>
+                <a:ea typeface="ＭＳ Ｐゴシック" panose="020B0600070205080204" pitchFamily="50" charset="-128"/>
+                <a:cs typeface="+mn-cs"/>
+              </a:endParaRPr>
+            </a:p>
+          </p:txBody>
+        </p:sp>
+        <p:sp>
+          <p:nvSpPr>
+            <p:cNvPr id="17" name="四角形: 角を丸くする 16">
+              <a:extLst>
+                <a:ext uri="{FF2B5EF4-FFF2-40B4-BE49-F238E27FC236}">
+                  <a16:creationId xmlns:a16="http://schemas.microsoft.com/office/drawing/2014/main" id="{04085E13-10DF-491F-B9A2-245D5988475A}"/>
+                </a:ext>
+              </a:extLst>
+            </p:cNvPr>
+            <p:cNvSpPr/>
+            <p:nvPr/>
+          </p:nvSpPr>
+          <p:spPr>
+            <a:xfrm>
+              <a:off x="3705001" y="1535619"/>
+              <a:ext cx="1083537" cy="372291"/>
+            </a:xfrm>
+            <a:prstGeom prst="roundRect">
+              <a:avLst/>
+            </a:prstGeom>
+            <a:solidFill>
+              <a:srgbClr val="FFFF00"/>
+            </a:solidFill>
+            <a:ln>
+              <a:noFill/>
+            </a:ln>
+          </p:spPr>
+          <p:style>
+            <a:lnRef idx="2">
+              <a:schemeClr val="accent1">
+                <a:shade val="50000"/>
+              </a:schemeClr>
+            </a:lnRef>
+            <a:fillRef idx="1">
+              <a:schemeClr val="accent1"/>
+            </a:fillRef>
+            <a:effectRef idx="0">
+              <a:schemeClr val="accent1"/>
+            </a:effectRef>
+            <a:fontRef idx="minor">
+              <a:schemeClr val="lt1"/>
+            </a:fontRef>
+          </p:style>
+          <p:txBody>
+            <a:bodyPr rtlCol="0" anchor="ctr"/>
+            <a:lstStyle/>
+            <a:p>
+              <a:pPr marL="0" marR="0" lvl="0" indent="0" algn="ctr" defTabSz="914400" rtl="0" eaLnBrk="1" fontAlgn="auto" latinLnBrk="0" hangingPunct="1">
+                <a:lnSpc>
+                  <a:spcPct val="100000"/>
+                </a:lnSpc>
+                <a:spcBef>
+                  <a:spcPts val="0"/>
+                </a:spcBef>
+                <a:spcAft>
+                  <a:spcPts val="0"/>
+                </a:spcAft>
+                <a:buClrTx/>
+                <a:buSzTx/>
+                <a:buFontTx/>
+                <a:buNone/>
+                <a:tabLst/>
+                <a:defRPr/>
+              </a:pPr>
+              <a:r>
+                <a:rPr kumimoji="1" lang="en-US" altLang="ja-JP" sz="1400" dirty="0">
+                  <a:solidFill>
+                    <a:prstClr val="black"/>
+                  </a:solidFill>
+                  <a:latin typeface="Calibri"/>
+                  <a:ea typeface="ＭＳ Ｐゴシック" panose="020B0600070205080204" pitchFamily="50" charset="-128"/>
+                </a:rPr>
+                <a:t>Software</a:t>
+              </a:r>
+              <a:r>
+                <a:rPr kumimoji="1" lang="ja-JP" altLang="en-US" sz="1400" dirty="0">
+                  <a:solidFill>
+                    <a:prstClr val="black"/>
+                  </a:solidFill>
+                  <a:latin typeface="Calibri"/>
+                  <a:ea typeface="ＭＳ Ｐゴシック" panose="020B0600070205080204" pitchFamily="50" charset="-128"/>
+                </a:rPr>
+                <a:t> </a:t>
+              </a:r>
+              <a:r>
+                <a:rPr kumimoji="1" lang="en-US" altLang="ja-JP" sz="1400" dirty="0">
+                  <a:solidFill>
+                    <a:prstClr val="black"/>
+                  </a:solidFill>
+                  <a:latin typeface="Calibri"/>
+                  <a:ea typeface="ＭＳ Ｐゴシック" panose="020B0600070205080204" pitchFamily="50" charset="-128"/>
+                </a:rPr>
+                <a:t>Contract</a:t>
+              </a:r>
+              <a:endParaRPr kumimoji="1" lang="en-US" altLang="ja-JP" sz="1400" b="0" i="0" u="none" strike="noStrike" kern="1200" cap="none" spc="0" normalizeH="0" baseline="0" noProof="0" dirty="0">
+                <a:ln>
+                  <a:noFill/>
+                </a:ln>
+                <a:solidFill>
+                  <a:prstClr val="black"/>
+                </a:solidFill>
+                <a:effectLst/>
+                <a:uLnTx/>
+                <a:uFillTx/>
+                <a:latin typeface="Calibri"/>
+                <a:ea typeface="ＭＳ Ｐゴシック" panose="020B0600070205080204" pitchFamily="50" charset="-128"/>
+                <a:cs typeface="+mn-cs"/>
+              </a:endParaRPr>
+            </a:p>
+          </p:txBody>
+        </p:sp>
+        <p:sp>
+          <p:nvSpPr>
+            <p:cNvPr id="19" name="四角形: 角を丸くする 18">
+              <a:extLst>
+                <a:ext uri="{FF2B5EF4-FFF2-40B4-BE49-F238E27FC236}">
+                  <a16:creationId xmlns:a16="http://schemas.microsoft.com/office/drawing/2014/main" id="{6523DCD1-17EA-4908-91AA-938632C2087D}"/>
+                </a:ext>
+              </a:extLst>
+            </p:cNvPr>
+            <p:cNvSpPr/>
+            <p:nvPr/>
+          </p:nvSpPr>
+          <p:spPr>
+            <a:xfrm>
+              <a:off x="4763312" y="2006542"/>
+              <a:ext cx="1094404" cy="372291"/>
+            </a:xfrm>
+            <a:prstGeom prst="roundRect">
+              <a:avLst/>
+            </a:prstGeom>
+            <a:solidFill>
+              <a:srgbClr val="FFFF00"/>
+            </a:solidFill>
+            <a:ln>
+              <a:noFill/>
+            </a:ln>
+          </p:spPr>
+          <p:style>
+            <a:lnRef idx="2">
+              <a:schemeClr val="accent1">
+                <a:shade val="50000"/>
+              </a:schemeClr>
+            </a:lnRef>
+            <a:fillRef idx="1">
+              <a:schemeClr val="accent1"/>
+            </a:fillRef>
+            <a:effectRef idx="0">
+              <a:schemeClr val="accent1"/>
+            </a:effectRef>
+            <a:fontRef idx="minor">
+              <a:schemeClr val="lt1"/>
+            </a:fontRef>
+          </p:style>
+          <p:txBody>
+            <a:bodyPr rtlCol="0" anchor="ctr"/>
+            <a:lstStyle/>
+            <a:p>
+              <a:pPr marL="0" marR="0" lvl="0" indent="0" algn="ctr" defTabSz="914400" rtl="0" eaLnBrk="1" fontAlgn="auto" latinLnBrk="0" hangingPunct="1">
+                <a:lnSpc>
+                  <a:spcPct val="100000"/>
+                </a:lnSpc>
+                <a:spcBef>
+                  <a:spcPts val="0"/>
+                </a:spcBef>
+                <a:spcAft>
+                  <a:spcPts val="0"/>
+                </a:spcAft>
+                <a:buClrTx/>
+                <a:buSzTx/>
+                <a:buFontTx/>
+                <a:buNone/>
+                <a:tabLst/>
+                <a:defRPr/>
+              </a:pPr>
+              <a:r>
+                <a:rPr kumimoji="1" lang="en-US" altLang="ja-JP" sz="1200" dirty="0">
+                  <a:solidFill>
+                    <a:prstClr val="black"/>
+                  </a:solidFill>
+                  <a:latin typeface="Calibri"/>
+                  <a:ea typeface="ＭＳ Ｐゴシック" panose="020B0600070205080204" pitchFamily="50" charset="-128"/>
+                </a:rPr>
+                <a:t>Software</a:t>
+              </a:r>
+              <a:r>
+                <a:rPr kumimoji="1" lang="ja-JP" altLang="en-US" sz="1200" dirty="0">
+                  <a:solidFill>
+                    <a:prstClr val="black"/>
+                  </a:solidFill>
+                  <a:latin typeface="Calibri"/>
+                  <a:ea typeface="ＭＳ Ｐゴシック" panose="020B0600070205080204" pitchFamily="50" charset="-128"/>
+                </a:rPr>
+                <a:t> </a:t>
+              </a:r>
+              <a:r>
+                <a:rPr kumimoji="1" lang="en-US" altLang="ja-JP" sz="1200" dirty="0">
+                  <a:solidFill>
+                    <a:prstClr val="black"/>
+                  </a:solidFill>
+                  <a:latin typeface="Calibri"/>
+                  <a:ea typeface="ＭＳ Ｐゴシック" panose="020B0600070205080204" pitchFamily="50" charset="-128"/>
+                </a:rPr>
+                <a:t>Verification</a:t>
+              </a:r>
+              <a:endParaRPr kumimoji="1" lang="en-US" altLang="ja-JP" sz="1200" b="0" i="0" u="none" strike="noStrike" kern="1200" cap="none" spc="0" normalizeH="0" baseline="0" noProof="0" dirty="0">
+                <a:ln>
+                  <a:noFill/>
+                </a:ln>
+                <a:solidFill>
+                  <a:prstClr val="black"/>
+                </a:solidFill>
+                <a:effectLst/>
+                <a:uLnTx/>
+                <a:uFillTx/>
+                <a:latin typeface="Calibri"/>
+                <a:ea typeface="ＭＳ Ｐゴシック" panose="020B0600070205080204" pitchFamily="50" charset="-128"/>
+                <a:cs typeface="+mn-cs"/>
+              </a:endParaRPr>
+            </a:p>
+          </p:txBody>
+        </p:sp>
+        <p:cxnSp>
+          <p:nvCxnSpPr>
+            <p:cNvPr id="21" name="直線矢印コネクタ 20">
+              <a:extLst>
+                <a:ext uri="{FF2B5EF4-FFF2-40B4-BE49-F238E27FC236}">
+                  <a16:creationId xmlns:a16="http://schemas.microsoft.com/office/drawing/2014/main" id="{BF8045E8-B913-4E84-B739-F112D5CF6173}"/>
+                </a:ext>
+              </a:extLst>
+            </p:cNvPr>
+            <p:cNvCxnSpPr>
+              <a:cxnSpLocks/>
+            </p:cNvCxnSpPr>
+            <p:nvPr/>
+          </p:nvCxnSpPr>
+          <p:spPr>
+            <a:xfrm flipV="1">
+              <a:off x="2268641" y="2829194"/>
+              <a:ext cx="1609840" cy="23440"/>
+            </a:xfrm>
+            <a:prstGeom prst="straightConnector1">
+              <a:avLst/>
+            </a:prstGeom>
+            <a:ln w="38100">
+              <a:solidFill>
+                <a:schemeClr val="tx1"/>
+              </a:solidFill>
+              <a:tailEnd type="triangle"/>
+            </a:ln>
+          </p:spPr>
+          <p:style>
+            <a:lnRef idx="1">
+              <a:schemeClr val="accent1"/>
+            </a:lnRef>
+            <a:fillRef idx="0">
+              <a:schemeClr val="accent1"/>
+            </a:fillRef>
+            <a:effectRef idx="0">
+              <a:schemeClr val="accent1"/>
+            </a:effectRef>
+            <a:fontRef idx="minor">
+              <a:schemeClr val="tx1"/>
+            </a:fontRef>
+          </p:style>
+        </p:cxnSp>
+        <p:sp>
+          <p:nvSpPr>
+            <p:cNvPr id="22" name="テキスト ボックス 21">
+              <a:extLst>
+                <a:ext uri="{FF2B5EF4-FFF2-40B4-BE49-F238E27FC236}">
+                  <a16:creationId xmlns:a16="http://schemas.microsoft.com/office/drawing/2014/main" id="{E9894525-D21A-419D-9CDA-8648B20773CA}"/>
+                </a:ext>
+              </a:extLst>
+            </p:cNvPr>
+            <p:cNvSpPr txBox="1"/>
+            <p:nvPr/>
+          </p:nvSpPr>
+          <p:spPr>
+            <a:xfrm>
+              <a:off x="2443759" y="2514110"/>
+              <a:ext cx="810928" cy="307777"/>
+            </a:xfrm>
+            <a:prstGeom prst="rect">
+              <a:avLst/>
+            </a:prstGeom>
+            <a:noFill/>
+          </p:spPr>
+          <p:txBody>
+            <a:bodyPr wrap="none" rtlCol="0">
+              <a:spAutoFit/>
+            </a:bodyPr>
+            <a:lstStyle/>
+            <a:p>
+              <a:pPr marL="0" marR="0" lvl="0" indent="0" algn="l" defTabSz="914400" rtl="0" eaLnBrk="1" fontAlgn="auto" latinLnBrk="0" hangingPunct="1">
+                <a:lnSpc>
+                  <a:spcPct val="100000"/>
+                </a:lnSpc>
+                <a:spcBef>
+                  <a:spcPts val="0"/>
+                </a:spcBef>
+                <a:spcAft>
+                  <a:spcPts val="0"/>
+                </a:spcAft>
+                <a:buClrTx/>
+                <a:buSzTx/>
+                <a:buFontTx/>
+                <a:buNone/>
+                <a:tabLst/>
+                <a:defRPr/>
+              </a:pPr>
+              <a:r>
+                <a:rPr kumimoji="1" lang="en-US" altLang="ja-JP" sz="1400" dirty="0">
+                  <a:solidFill>
+                    <a:prstClr val="black"/>
+                  </a:solidFill>
+                  <a:latin typeface="Calibri"/>
+                  <a:ea typeface="ＭＳ Ｐゴシック" panose="020B0600070205080204" pitchFamily="50" charset="-128"/>
+                </a:rPr>
+                <a:t>Contract</a:t>
+              </a:r>
+              <a:endParaRPr kumimoji="1" lang="ja-JP" altLang="en-US" sz="1400" b="0" i="0" u="none" strike="noStrike" kern="1200" cap="none" spc="0" normalizeH="0" baseline="0" noProof="0" dirty="0">
+                <a:ln>
+                  <a:noFill/>
+                </a:ln>
+                <a:solidFill>
+                  <a:prstClr val="black"/>
+                </a:solidFill>
+                <a:effectLst/>
+                <a:uLnTx/>
+                <a:uFillTx/>
+                <a:latin typeface="Calibri"/>
+                <a:ea typeface="ＭＳ Ｐゴシック" panose="020B0600070205080204" pitchFamily="50" charset="-128"/>
+                <a:cs typeface="+mn-cs"/>
+              </a:endParaRPr>
+            </a:p>
+          </p:txBody>
+        </p:sp>
+        <p:cxnSp>
+          <p:nvCxnSpPr>
+            <p:cNvPr id="23" name="直線矢印コネクタ 22">
+              <a:extLst>
+                <a:ext uri="{FF2B5EF4-FFF2-40B4-BE49-F238E27FC236}">
+                  <a16:creationId xmlns:a16="http://schemas.microsoft.com/office/drawing/2014/main" id="{D6DB3BC3-1EA4-43D8-9CB5-F47C3248820F}"/>
+                </a:ext>
+              </a:extLst>
+            </p:cNvPr>
+            <p:cNvCxnSpPr>
+              <a:cxnSpLocks/>
+            </p:cNvCxnSpPr>
+            <p:nvPr/>
+          </p:nvCxnSpPr>
+          <p:spPr>
+            <a:xfrm>
+              <a:off x="2268641" y="3008211"/>
+              <a:ext cx="1590791" cy="0"/>
+            </a:xfrm>
+            <a:prstGeom prst="straightConnector1">
+              <a:avLst/>
+            </a:prstGeom>
+            <a:ln w="38100">
+              <a:solidFill>
+                <a:srgbClr val="FFC000"/>
+              </a:solidFill>
+              <a:tailEnd type="triangle"/>
+            </a:ln>
+          </p:spPr>
+          <p:style>
+            <a:lnRef idx="1">
+              <a:schemeClr val="accent1"/>
+            </a:lnRef>
+            <a:fillRef idx="0">
+              <a:schemeClr val="accent1"/>
+            </a:fillRef>
+            <a:effectRef idx="0">
+              <a:schemeClr val="accent1"/>
+            </a:effectRef>
+            <a:fontRef idx="minor">
+              <a:schemeClr val="tx1"/>
+            </a:fontRef>
+          </p:style>
+        </p:cxnSp>
+        <p:cxnSp>
+          <p:nvCxnSpPr>
+            <p:cNvPr id="24" name="直線矢印コネクタ 23">
+              <a:extLst>
+                <a:ext uri="{FF2B5EF4-FFF2-40B4-BE49-F238E27FC236}">
+                  <a16:creationId xmlns:a16="http://schemas.microsoft.com/office/drawing/2014/main" id="{22A2176F-C7E0-4A62-BB89-872E3A8450C7}"/>
+                </a:ext>
+              </a:extLst>
+            </p:cNvPr>
+            <p:cNvCxnSpPr>
+              <a:cxnSpLocks/>
+            </p:cNvCxnSpPr>
+            <p:nvPr/>
+          </p:nvCxnSpPr>
+          <p:spPr>
+            <a:xfrm flipV="1">
+              <a:off x="2253917" y="3524015"/>
+              <a:ext cx="1700839" cy="24243"/>
+            </a:xfrm>
+            <a:prstGeom prst="straightConnector1">
+              <a:avLst/>
+            </a:prstGeom>
+            <a:ln w="38100">
+              <a:solidFill>
+                <a:srgbClr val="FF0000"/>
+              </a:solidFill>
+              <a:tailEnd type="triangle"/>
+            </a:ln>
+          </p:spPr>
+          <p:style>
+            <a:lnRef idx="1">
+              <a:schemeClr val="accent1"/>
+            </a:lnRef>
+            <a:fillRef idx="0">
+              <a:schemeClr val="accent1"/>
+            </a:fillRef>
+            <a:effectRef idx="0">
+              <a:schemeClr val="accent1"/>
+            </a:effectRef>
+            <a:fontRef idx="minor">
+              <a:schemeClr val="tx1"/>
+            </a:fontRef>
+          </p:style>
+        </p:cxnSp>
+        <p:sp>
+          <p:nvSpPr>
+            <p:cNvPr id="25" name="テキスト ボックス 24">
+              <a:extLst>
+                <a:ext uri="{FF2B5EF4-FFF2-40B4-BE49-F238E27FC236}">
+                  <a16:creationId xmlns:a16="http://schemas.microsoft.com/office/drawing/2014/main" id="{B4C743F6-CC25-4B1A-8297-7D8799951F02}"/>
+                </a:ext>
+              </a:extLst>
+            </p:cNvPr>
+            <p:cNvSpPr txBox="1"/>
+            <p:nvPr/>
+          </p:nvSpPr>
+          <p:spPr>
+            <a:xfrm>
+              <a:off x="2211815" y="2991283"/>
+              <a:ext cx="1704441" cy="523220"/>
+            </a:xfrm>
+            <a:prstGeom prst="rect">
+              <a:avLst/>
+            </a:prstGeom>
+            <a:noFill/>
+          </p:spPr>
+          <p:txBody>
+            <a:bodyPr wrap="none" rtlCol="0">
+              <a:spAutoFit/>
+            </a:bodyPr>
+            <a:lstStyle/>
+            <a:p>
+              <a:pPr marL="0" marR="0" lvl="0" indent="0" algn="l" defTabSz="914400" rtl="0" eaLnBrk="1" fontAlgn="auto" latinLnBrk="0" hangingPunct="1">
+                <a:lnSpc>
+                  <a:spcPct val="100000"/>
+                </a:lnSpc>
+                <a:spcBef>
+                  <a:spcPts val="0"/>
+                </a:spcBef>
+                <a:spcAft>
+                  <a:spcPts val="0"/>
+                </a:spcAft>
+                <a:buClrTx/>
+                <a:buSzTx/>
+                <a:buFontTx/>
+                <a:buNone/>
+                <a:tabLst/>
+                <a:defRPr/>
+              </a:pPr>
+              <a:r>
+                <a:rPr kumimoji="1" lang="en-US" altLang="ja-JP" sz="1400" b="0" i="0" u="none" strike="noStrike" kern="1200" cap="none" spc="0" normalizeH="0" baseline="0" noProof="0" dirty="0">
+                  <a:ln>
+                    <a:noFill/>
+                  </a:ln>
+                  <a:solidFill>
+                    <a:prstClr val="black"/>
+                  </a:solidFill>
+                  <a:effectLst/>
+                  <a:uLnTx/>
+                  <a:uFillTx/>
+                  <a:latin typeface="Calibri"/>
+                  <a:ea typeface="ＭＳ Ｐゴシック" panose="020B0600070205080204" pitchFamily="50" charset="-128"/>
+                  <a:cs typeface="+mn-cs"/>
+                </a:rPr>
+                <a:t>Proprietary Software</a:t>
+              </a:r>
+            </a:p>
+            <a:p>
+              <a:pPr marL="0" marR="0" lvl="0" indent="0" algn="l" defTabSz="914400" rtl="0" eaLnBrk="1" fontAlgn="auto" latinLnBrk="0" hangingPunct="1">
+                <a:lnSpc>
+                  <a:spcPct val="100000"/>
+                </a:lnSpc>
+                <a:spcBef>
+                  <a:spcPts val="0"/>
+                </a:spcBef>
+                <a:spcAft>
+                  <a:spcPts val="0"/>
+                </a:spcAft>
+                <a:buClrTx/>
+                <a:buSzTx/>
+                <a:buFontTx/>
+                <a:buNone/>
+                <a:tabLst/>
+                <a:defRPr/>
+              </a:pPr>
+              <a:r>
+                <a:rPr kumimoji="1" lang="ja-JP" altLang="en-US" sz="1400" b="0" i="0" u="none" strike="noStrike" kern="1200" cap="none" spc="0" normalizeH="0" baseline="0" noProof="0" dirty="0">
+                  <a:ln>
+                    <a:noFill/>
+                  </a:ln>
+                  <a:solidFill>
+                    <a:prstClr val="black"/>
+                  </a:solidFill>
+                  <a:effectLst/>
+                  <a:uLnTx/>
+                  <a:uFillTx/>
+                  <a:latin typeface="Calibri"/>
+                  <a:ea typeface="ＭＳ Ｐゴシック" panose="020B0600070205080204" pitchFamily="50" charset="-128"/>
+                  <a:cs typeface="+mn-cs"/>
+                </a:rPr>
+                <a:t>（</a:t>
+              </a:r>
+              <a:r>
+                <a:rPr kumimoji="1" lang="en-US" altLang="ja-JP" sz="1400" b="0" i="0" u="none" strike="noStrike" kern="1200" cap="none" spc="0" normalizeH="0" baseline="0" noProof="0" dirty="0">
+                  <a:ln>
+                    <a:noFill/>
+                  </a:ln>
+                  <a:solidFill>
+                    <a:prstClr val="black"/>
+                  </a:solidFill>
+                  <a:effectLst/>
+                  <a:uLnTx/>
+                  <a:uFillTx/>
+                  <a:latin typeface="Calibri"/>
+                  <a:ea typeface="ＭＳ Ｐゴシック" panose="020B0600070205080204" pitchFamily="50" charset="-128"/>
+                  <a:cs typeface="+mn-cs"/>
+                </a:rPr>
+                <a:t>incl. OSS</a:t>
+              </a:r>
+              <a:r>
+                <a:rPr kumimoji="1" lang="ja-JP" altLang="en-US" sz="1400" b="0" i="0" u="none" strike="noStrike" kern="1200" cap="none" spc="0" normalizeH="0" baseline="0" noProof="0" dirty="0">
+                  <a:ln>
+                    <a:noFill/>
+                  </a:ln>
+                  <a:solidFill>
+                    <a:prstClr val="black"/>
+                  </a:solidFill>
+                  <a:effectLst/>
+                  <a:uLnTx/>
+                  <a:uFillTx/>
+                  <a:latin typeface="Calibri"/>
+                  <a:ea typeface="ＭＳ Ｐゴシック" panose="020B0600070205080204" pitchFamily="50" charset="-128"/>
+                  <a:cs typeface="+mn-cs"/>
+                </a:rPr>
+                <a:t>）</a:t>
+              </a:r>
+            </a:p>
+          </p:txBody>
+        </p:sp>
+        <p:cxnSp>
+          <p:nvCxnSpPr>
+            <p:cNvPr id="29" name="直線矢印コネクタ 28">
+              <a:extLst>
+                <a:ext uri="{FF2B5EF4-FFF2-40B4-BE49-F238E27FC236}">
+                  <a16:creationId xmlns:a16="http://schemas.microsoft.com/office/drawing/2014/main" id="{C9876905-EE9C-4F1C-8F91-A9DF1AB0B922}"/>
+                </a:ext>
+              </a:extLst>
+            </p:cNvPr>
+            <p:cNvCxnSpPr>
+              <a:cxnSpLocks/>
+            </p:cNvCxnSpPr>
+            <p:nvPr/>
+          </p:nvCxnSpPr>
+          <p:spPr>
+            <a:xfrm flipV="1">
+              <a:off x="7776755" y="2825232"/>
+              <a:ext cx="1148566" cy="13771"/>
+            </a:xfrm>
+            <a:prstGeom prst="straightConnector1">
+              <a:avLst/>
+            </a:prstGeom>
+            <a:ln w="38100">
+              <a:solidFill>
+                <a:schemeClr val="tx1"/>
+              </a:solidFill>
+              <a:tailEnd type="triangle"/>
+            </a:ln>
+          </p:spPr>
+          <p:style>
+            <a:lnRef idx="1">
+              <a:schemeClr val="accent1"/>
+            </a:lnRef>
+            <a:fillRef idx="0">
+              <a:schemeClr val="accent1"/>
+            </a:fillRef>
+            <a:effectRef idx="0">
+              <a:schemeClr val="accent1"/>
+            </a:effectRef>
+            <a:fontRef idx="minor">
+              <a:schemeClr val="tx1"/>
+            </a:fontRef>
+          </p:style>
+        </p:cxnSp>
+        <p:cxnSp>
+          <p:nvCxnSpPr>
+            <p:cNvPr id="31" name="直線矢印コネクタ 30">
+              <a:extLst>
+                <a:ext uri="{FF2B5EF4-FFF2-40B4-BE49-F238E27FC236}">
+                  <a16:creationId xmlns:a16="http://schemas.microsoft.com/office/drawing/2014/main" id="{266003C7-C2C5-4BB9-ADBE-8E0BFA5AA82D}"/>
+                </a:ext>
+              </a:extLst>
+            </p:cNvPr>
+            <p:cNvCxnSpPr>
+              <a:cxnSpLocks/>
+            </p:cNvCxnSpPr>
+            <p:nvPr/>
+          </p:nvCxnSpPr>
+          <p:spPr>
+            <a:xfrm flipV="1">
+              <a:off x="7750358" y="3031223"/>
+              <a:ext cx="1148566" cy="0"/>
+            </a:xfrm>
+            <a:prstGeom prst="straightConnector1">
+              <a:avLst/>
+            </a:prstGeom>
+            <a:ln w="38100">
+              <a:solidFill>
+                <a:srgbClr val="FFC000"/>
+              </a:solidFill>
+              <a:tailEnd type="triangle"/>
+            </a:ln>
+          </p:spPr>
+          <p:style>
+            <a:lnRef idx="1">
+              <a:schemeClr val="accent1"/>
+            </a:lnRef>
+            <a:fillRef idx="0">
+              <a:schemeClr val="accent1"/>
+            </a:fillRef>
+            <a:effectRef idx="0">
+              <a:schemeClr val="accent1"/>
+            </a:effectRef>
+            <a:fontRef idx="minor">
+              <a:schemeClr val="tx1"/>
+            </a:fontRef>
+          </p:style>
+        </p:cxnSp>
+        <p:cxnSp>
+          <p:nvCxnSpPr>
+            <p:cNvPr id="32" name="直線矢印コネクタ 31">
+              <a:extLst>
+                <a:ext uri="{FF2B5EF4-FFF2-40B4-BE49-F238E27FC236}">
+                  <a16:creationId xmlns:a16="http://schemas.microsoft.com/office/drawing/2014/main" id="{D00AF6E8-0ED9-474D-AA30-816429BC7242}"/>
+                </a:ext>
+              </a:extLst>
+            </p:cNvPr>
+            <p:cNvCxnSpPr>
+              <a:cxnSpLocks/>
+            </p:cNvCxnSpPr>
+            <p:nvPr/>
+          </p:nvCxnSpPr>
+          <p:spPr>
+            <a:xfrm>
+              <a:off x="7783410" y="3674033"/>
+              <a:ext cx="1141911" cy="0"/>
+            </a:xfrm>
+            <a:prstGeom prst="straightConnector1">
+              <a:avLst/>
+            </a:prstGeom>
+            <a:ln w="38100">
+              <a:solidFill>
+                <a:srgbClr val="FF0000"/>
+              </a:solidFill>
+              <a:tailEnd type="triangle"/>
+            </a:ln>
+          </p:spPr>
+          <p:style>
+            <a:lnRef idx="1">
+              <a:schemeClr val="accent1"/>
+            </a:lnRef>
+            <a:fillRef idx="0">
+              <a:schemeClr val="accent1"/>
+            </a:fillRef>
+            <a:effectRef idx="0">
+              <a:schemeClr val="accent1"/>
+            </a:effectRef>
+            <a:fontRef idx="minor">
+              <a:schemeClr val="tx1"/>
+            </a:fontRef>
+          </p:style>
+        </p:cxnSp>
+        <p:cxnSp>
+          <p:nvCxnSpPr>
+            <p:cNvPr id="40" name="直線矢印コネクタ 39">
+              <a:extLst>
+                <a:ext uri="{FF2B5EF4-FFF2-40B4-BE49-F238E27FC236}">
+                  <a16:creationId xmlns:a16="http://schemas.microsoft.com/office/drawing/2014/main" id="{3CE0855D-F339-48A9-84B6-AE904974AB96}"/>
+                </a:ext>
+              </a:extLst>
+            </p:cNvPr>
+            <p:cNvCxnSpPr>
+              <a:cxnSpLocks/>
+              <a:endCxn id="62" idx="3"/>
+            </p:cNvCxnSpPr>
+            <p:nvPr/>
+          </p:nvCxnSpPr>
+          <p:spPr>
+            <a:xfrm flipH="1">
+              <a:off x="7776755" y="5086678"/>
+              <a:ext cx="1122170" cy="9359"/>
+            </a:xfrm>
+            <a:prstGeom prst="straightConnector1">
+              <a:avLst/>
+            </a:prstGeom>
+            <a:ln w="38100">
+              <a:solidFill>
+                <a:srgbClr val="FF0000"/>
+              </a:solidFill>
+              <a:tailEnd type="triangle"/>
+            </a:ln>
+          </p:spPr>
+          <p:style>
+            <a:lnRef idx="1">
+              <a:schemeClr val="accent1"/>
+            </a:lnRef>
+            <a:fillRef idx="0">
+              <a:schemeClr val="accent1"/>
+            </a:fillRef>
+            <a:effectRef idx="0">
+              <a:schemeClr val="accent1"/>
+            </a:effectRef>
+            <a:fontRef idx="minor">
+              <a:schemeClr val="tx1"/>
+            </a:fontRef>
+          </p:style>
+        </p:cxnSp>
+        <p:sp>
+          <p:nvSpPr>
+            <p:cNvPr id="41" name="四角形: 角を丸くする 40">
+              <a:extLst>
+                <a:ext uri="{FF2B5EF4-FFF2-40B4-BE49-F238E27FC236}">
+                  <a16:creationId xmlns:a16="http://schemas.microsoft.com/office/drawing/2014/main" id="{62D9895C-A80B-4178-8F06-528C0E486442}"/>
+                </a:ext>
+              </a:extLst>
+            </p:cNvPr>
+            <p:cNvSpPr/>
+            <p:nvPr/>
+          </p:nvSpPr>
+          <p:spPr>
+            <a:xfrm>
+              <a:off x="3887996" y="2538986"/>
+              <a:ext cx="878000" cy="1090564"/>
+            </a:xfrm>
+            <a:prstGeom prst="roundRect">
+              <a:avLst/>
+            </a:prstGeom>
+            <a:solidFill>
+              <a:srgbClr val="FFFF00"/>
+            </a:solidFill>
+            <a:ln>
+              <a:noFill/>
+            </a:ln>
+          </p:spPr>
+          <p:style>
+            <a:lnRef idx="2">
+              <a:schemeClr val="accent1">
+                <a:shade val="50000"/>
+              </a:schemeClr>
+            </a:lnRef>
+            <a:fillRef idx="1">
+              <a:schemeClr val="accent1"/>
+            </a:fillRef>
+            <a:effectRef idx="0">
+              <a:schemeClr val="accent1"/>
+            </a:effectRef>
+            <a:fontRef idx="minor">
+              <a:schemeClr val="lt1"/>
+            </a:fontRef>
+          </p:style>
+          <p:txBody>
+            <a:bodyPr rtlCol="0" anchor="ctr"/>
+            <a:lstStyle/>
+            <a:p>
+              <a:pPr marL="0" marR="0" lvl="0" indent="0" algn="ctr" defTabSz="914400" rtl="0" eaLnBrk="1" fontAlgn="auto" latinLnBrk="0" hangingPunct="1">
+                <a:lnSpc>
+                  <a:spcPct val="100000"/>
+                </a:lnSpc>
+                <a:spcBef>
+                  <a:spcPts val="0"/>
+                </a:spcBef>
+                <a:spcAft>
+                  <a:spcPts val="0"/>
+                </a:spcAft>
+                <a:buClrTx/>
+                <a:buSzTx/>
+                <a:buFontTx/>
+                <a:buNone/>
+                <a:tabLst/>
+                <a:defRPr/>
+              </a:pPr>
+              <a:r>
+                <a:rPr kumimoji="1" lang="en-US" altLang="ja-JP" sz="1400" dirty="0">
+                  <a:solidFill>
+                    <a:prstClr val="black"/>
+                  </a:solidFill>
+                  <a:latin typeface="Calibri"/>
+                  <a:ea typeface="ＭＳ Ｐゴシック" panose="020B0600070205080204" pitchFamily="50" charset="-128"/>
+                </a:rPr>
+                <a:t>Inbound</a:t>
+              </a:r>
+              <a:endParaRPr kumimoji="1" lang="ja-JP" altLang="en-US" sz="1600" b="0" i="0" u="none" strike="noStrike" kern="1200" cap="none" spc="0" normalizeH="0" baseline="0" noProof="0" dirty="0">
+                <a:ln>
+                  <a:noFill/>
+                </a:ln>
+                <a:solidFill>
+                  <a:prstClr val="black"/>
+                </a:solidFill>
+                <a:effectLst/>
+                <a:uLnTx/>
+                <a:uFillTx/>
+                <a:latin typeface="Calibri"/>
+                <a:ea typeface="ＭＳ Ｐゴシック" panose="020B0600070205080204" pitchFamily="50" charset="-128"/>
+                <a:cs typeface="+mn-cs"/>
+              </a:endParaRPr>
+            </a:p>
+          </p:txBody>
+        </p:sp>
+        <p:sp>
+          <p:nvSpPr>
+            <p:cNvPr id="43" name="四角形: 角を丸くする 42">
+              <a:extLst>
+                <a:ext uri="{FF2B5EF4-FFF2-40B4-BE49-F238E27FC236}">
+                  <a16:creationId xmlns:a16="http://schemas.microsoft.com/office/drawing/2014/main" id="{B1FB880F-C922-4291-A896-B3BC079FD4D7}"/>
+                </a:ext>
+              </a:extLst>
+            </p:cNvPr>
+            <p:cNvSpPr/>
+            <p:nvPr/>
+          </p:nvSpPr>
+          <p:spPr>
+            <a:xfrm>
+              <a:off x="5640118" y="1535619"/>
+              <a:ext cx="872447" cy="372291"/>
+            </a:xfrm>
+            <a:prstGeom prst="roundRect">
+              <a:avLst/>
+            </a:prstGeom>
+            <a:solidFill>
+              <a:srgbClr val="FFFF00"/>
+            </a:solidFill>
+            <a:ln>
+              <a:noFill/>
+            </a:ln>
+          </p:spPr>
+          <p:style>
+            <a:lnRef idx="2">
+              <a:schemeClr val="accent1">
+                <a:shade val="50000"/>
+              </a:schemeClr>
+            </a:lnRef>
+            <a:fillRef idx="1">
+              <a:schemeClr val="accent1"/>
+            </a:fillRef>
+            <a:effectRef idx="0">
+              <a:schemeClr val="accent1"/>
+            </a:effectRef>
+            <a:fontRef idx="minor">
+              <a:schemeClr val="lt1"/>
+            </a:fontRef>
+          </p:style>
+          <p:txBody>
+            <a:bodyPr rtlCol="0" anchor="ctr"/>
+            <a:lstStyle/>
+            <a:p>
+              <a:pPr marL="0" marR="0" lvl="0" indent="0" algn="ctr" defTabSz="914400" rtl="0" eaLnBrk="1" fontAlgn="auto" latinLnBrk="0" hangingPunct="1">
+                <a:lnSpc>
+                  <a:spcPct val="100000"/>
+                </a:lnSpc>
+                <a:spcBef>
+                  <a:spcPts val="0"/>
+                </a:spcBef>
+                <a:spcAft>
+                  <a:spcPts val="0"/>
+                </a:spcAft>
+                <a:buClrTx/>
+                <a:buSzTx/>
+                <a:buFontTx/>
+                <a:buNone/>
+                <a:tabLst/>
+                <a:defRPr/>
+              </a:pPr>
+              <a:r>
+                <a:rPr kumimoji="1" lang="en-US" altLang="ja-JP" sz="1600" dirty="0">
+                  <a:solidFill>
+                    <a:prstClr val="black"/>
+                  </a:solidFill>
+                  <a:latin typeface="Calibri"/>
+                  <a:ea typeface="ＭＳ Ｐゴシック" panose="020B0600070205080204" pitchFamily="50" charset="-128"/>
+                </a:rPr>
+                <a:t>Patent</a:t>
+              </a:r>
+              <a:endParaRPr kumimoji="1" lang="ja-JP" altLang="en-US" sz="1800" b="0" i="0" u="none" strike="noStrike" kern="1200" cap="none" spc="0" normalizeH="0" baseline="0" noProof="0" dirty="0">
+                <a:ln>
+                  <a:noFill/>
+                </a:ln>
+                <a:solidFill>
+                  <a:prstClr val="black"/>
+                </a:solidFill>
+                <a:effectLst/>
+                <a:uLnTx/>
+                <a:uFillTx/>
+                <a:latin typeface="Calibri"/>
+                <a:ea typeface="ＭＳ Ｐゴシック" panose="020B0600070205080204" pitchFamily="50" charset="-128"/>
+                <a:cs typeface="+mn-cs"/>
+              </a:endParaRPr>
+            </a:p>
+          </p:txBody>
+        </p:sp>
+        <p:cxnSp>
+          <p:nvCxnSpPr>
+            <p:cNvPr id="44" name="直線矢印コネクタ 43">
+              <a:extLst>
+                <a:ext uri="{FF2B5EF4-FFF2-40B4-BE49-F238E27FC236}">
+                  <a16:creationId xmlns:a16="http://schemas.microsoft.com/office/drawing/2014/main" id="{FDADA76A-F9C8-42B2-832F-693E5679D550}"/>
+                </a:ext>
+              </a:extLst>
+            </p:cNvPr>
+            <p:cNvCxnSpPr>
+              <a:cxnSpLocks/>
+            </p:cNvCxnSpPr>
+            <p:nvPr/>
+          </p:nvCxnSpPr>
+          <p:spPr>
+            <a:xfrm>
+              <a:off x="10137241" y="376340"/>
+              <a:ext cx="729150" cy="0"/>
+            </a:xfrm>
+            <a:prstGeom prst="straightConnector1">
+              <a:avLst/>
+            </a:prstGeom>
+            <a:ln w="38100">
+              <a:solidFill>
+                <a:schemeClr val="tx1"/>
+              </a:solidFill>
+              <a:tailEnd type="triangle"/>
+            </a:ln>
+          </p:spPr>
+          <p:style>
+            <a:lnRef idx="1">
+              <a:schemeClr val="accent1"/>
+            </a:lnRef>
+            <a:fillRef idx="0">
+              <a:schemeClr val="accent1"/>
+            </a:fillRef>
+            <a:effectRef idx="0">
+              <a:schemeClr val="accent1"/>
+            </a:effectRef>
+            <a:fontRef idx="minor">
+              <a:schemeClr val="tx1"/>
+            </a:fontRef>
+          </p:style>
+        </p:cxnSp>
+        <p:sp>
+          <p:nvSpPr>
+            <p:cNvPr id="45" name="テキスト ボックス 44">
+              <a:extLst>
+                <a:ext uri="{FF2B5EF4-FFF2-40B4-BE49-F238E27FC236}">
+                  <a16:creationId xmlns:a16="http://schemas.microsoft.com/office/drawing/2014/main" id="{9583A253-DADE-4B31-AAD9-EF598107C2BC}"/>
+                </a:ext>
+              </a:extLst>
+            </p:cNvPr>
+            <p:cNvSpPr txBox="1"/>
+            <p:nvPr/>
+          </p:nvSpPr>
+          <p:spPr>
+            <a:xfrm>
+              <a:off x="9239101" y="475731"/>
+              <a:ext cx="745140" cy="276999"/>
+            </a:xfrm>
+            <a:prstGeom prst="rect">
+              <a:avLst/>
+            </a:prstGeom>
+            <a:noFill/>
+          </p:spPr>
+          <p:txBody>
+            <a:bodyPr wrap="none" rtlCol="0">
+              <a:spAutoFit/>
+            </a:bodyPr>
+            <a:lstStyle/>
+            <a:p>
+              <a:pPr marL="0" marR="0" lvl="0" indent="0" algn="l" defTabSz="914400" rtl="0" eaLnBrk="1" fontAlgn="auto" latinLnBrk="0" hangingPunct="1">
+                <a:lnSpc>
+                  <a:spcPct val="100000"/>
+                </a:lnSpc>
+                <a:spcBef>
+                  <a:spcPts val="0"/>
+                </a:spcBef>
+                <a:spcAft>
+                  <a:spcPts val="0"/>
+                </a:spcAft>
+                <a:buClrTx/>
+                <a:buSzTx/>
+                <a:buFontTx/>
+                <a:buNone/>
+                <a:tabLst/>
+                <a:defRPr/>
+              </a:pPr>
+              <a:r>
+                <a:rPr kumimoji="1" lang="en-US" altLang="ja-JP" sz="1200" b="0" i="0" u="none" strike="noStrike" kern="1200" cap="none" spc="0" normalizeH="0" baseline="0" noProof="0" dirty="0">
+                  <a:ln>
+                    <a:noFill/>
+                  </a:ln>
+                  <a:solidFill>
+                    <a:prstClr val="black"/>
+                  </a:solidFill>
+                  <a:effectLst/>
+                  <a:uLnTx/>
+                  <a:uFillTx/>
+                  <a:latin typeface="Calibri"/>
+                  <a:ea typeface="ＭＳ Ｐゴシック" panose="020B0600070205080204" pitchFamily="50" charset="-128"/>
+                  <a:cs typeface="+mn-cs"/>
+                </a:rPr>
+                <a:t>Software</a:t>
+              </a:r>
+              <a:endParaRPr kumimoji="1" lang="ja-JP" altLang="en-US" sz="1200" b="0" i="0" u="none" strike="noStrike" kern="1200" cap="none" spc="0" normalizeH="0" baseline="0" noProof="0" dirty="0">
+                <a:ln>
+                  <a:noFill/>
+                </a:ln>
+                <a:solidFill>
+                  <a:prstClr val="black"/>
+                </a:solidFill>
+                <a:effectLst/>
+                <a:uLnTx/>
+                <a:uFillTx/>
+                <a:latin typeface="Calibri"/>
+                <a:ea typeface="ＭＳ Ｐゴシック" panose="020B0600070205080204" pitchFamily="50" charset="-128"/>
+                <a:cs typeface="+mn-cs"/>
+              </a:endParaRPr>
+            </a:p>
+          </p:txBody>
+        </p:sp>
+        <p:cxnSp>
+          <p:nvCxnSpPr>
+            <p:cNvPr id="46" name="直線矢印コネクタ 45">
+              <a:extLst>
+                <a:ext uri="{FF2B5EF4-FFF2-40B4-BE49-F238E27FC236}">
+                  <a16:creationId xmlns:a16="http://schemas.microsoft.com/office/drawing/2014/main" id="{27F132D1-801E-44B0-8A71-BF7F69C418E1}"/>
+                </a:ext>
+              </a:extLst>
+            </p:cNvPr>
+            <p:cNvCxnSpPr>
+              <a:cxnSpLocks/>
+            </p:cNvCxnSpPr>
+            <p:nvPr/>
+          </p:nvCxnSpPr>
+          <p:spPr>
+            <a:xfrm>
+              <a:off x="10133342" y="616098"/>
+              <a:ext cx="729150" cy="0"/>
+            </a:xfrm>
+            <a:prstGeom prst="straightConnector1">
+              <a:avLst/>
+            </a:prstGeom>
+            <a:ln w="38100">
+              <a:solidFill>
+                <a:srgbClr val="FFC000"/>
+              </a:solidFill>
+              <a:tailEnd type="triangle"/>
+            </a:ln>
+          </p:spPr>
+          <p:style>
+            <a:lnRef idx="1">
+              <a:schemeClr val="accent1"/>
+            </a:lnRef>
+            <a:fillRef idx="0">
+              <a:schemeClr val="accent1"/>
+            </a:fillRef>
+            <a:effectRef idx="0">
+              <a:schemeClr val="accent1"/>
+            </a:effectRef>
+            <a:fontRef idx="minor">
+              <a:schemeClr val="tx1"/>
+            </a:fontRef>
+          </p:style>
+        </p:cxnSp>
+        <p:sp>
+          <p:nvSpPr>
+            <p:cNvPr id="47" name="テキスト ボックス 46">
+              <a:extLst>
+                <a:ext uri="{FF2B5EF4-FFF2-40B4-BE49-F238E27FC236}">
+                  <a16:creationId xmlns:a16="http://schemas.microsoft.com/office/drawing/2014/main" id="{CB53ED47-8C15-4826-8B4F-A10BE7EA8E51}"/>
+                </a:ext>
+              </a:extLst>
+            </p:cNvPr>
+            <p:cNvSpPr txBox="1"/>
+            <p:nvPr/>
+          </p:nvSpPr>
+          <p:spPr>
+            <a:xfrm>
+              <a:off x="9206175" y="236234"/>
+              <a:ext cx="184731" cy="276999"/>
+            </a:xfrm>
+            <a:prstGeom prst="rect">
+              <a:avLst/>
+            </a:prstGeom>
+            <a:noFill/>
+          </p:spPr>
+          <p:txBody>
+            <a:bodyPr wrap="none" rtlCol="0">
+              <a:spAutoFit/>
+            </a:bodyPr>
+            <a:lstStyle/>
+            <a:p>
+              <a:pPr marL="0" marR="0" lvl="0" indent="0" algn="l" defTabSz="914400" rtl="0" eaLnBrk="1" fontAlgn="auto" latinLnBrk="0" hangingPunct="1">
+                <a:lnSpc>
+                  <a:spcPct val="100000"/>
+                </a:lnSpc>
+                <a:spcBef>
+                  <a:spcPts val="0"/>
+                </a:spcBef>
+                <a:spcAft>
+                  <a:spcPts val="0"/>
+                </a:spcAft>
+                <a:buClrTx/>
+                <a:buSzTx/>
+                <a:buFontTx/>
+                <a:buNone/>
+                <a:tabLst/>
+                <a:defRPr/>
+              </a:pPr>
+              <a:endParaRPr kumimoji="1" lang="ja-JP" altLang="en-US" sz="1200" b="0" i="0" u="none" strike="noStrike" kern="1200" cap="none" spc="0" normalizeH="0" baseline="0" noProof="0" dirty="0">
+                <a:ln>
+                  <a:noFill/>
+                </a:ln>
+                <a:solidFill>
+                  <a:prstClr val="black"/>
+                </a:solidFill>
+                <a:effectLst/>
+                <a:uLnTx/>
+                <a:uFillTx/>
+                <a:latin typeface="Calibri"/>
+                <a:ea typeface="ＭＳ Ｐゴシック" panose="020B0600070205080204" pitchFamily="50" charset="-128"/>
+                <a:cs typeface="+mn-cs"/>
+              </a:endParaRPr>
+            </a:p>
+          </p:txBody>
+        </p:sp>
+        <p:sp>
+          <p:nvSpPr>
+            <p:cNvPr id="48" name="テキスト ボックス 47">
+              <a:extLst>
+                <a:ext uri="{FF2B5EF4-FFF2-40B4-BE49-F238E27FC236}">
+                  <a16:creationId xmlns:a16="http://schemas.microsoft.com/office/drawing/2014/main" id="{6C3FDEA2-1B6E-4C5C-BB4C-6F9988C2F421}"/>
+                </a:ext>
+              </a:extLst>
+            </p:cNvPr>
+            <p:cNvSpPr txBox="1"/>
+            <p:nvPr/>
+          </p:nvSpPr>
+          <p:spPr>
+            <a:xfrm>
+              <a:off x="8961919" y="219362"/>
+              <a:ext cx="1252522" cy="276999"/>
+            </a:xfrm>
+            <a:prstGeom prst="rect">
+              <a:avLst/>
+            </a:prstGeom>
+            <a:noFill/>
+          </p:spPr>
+          <p:txBody>
+            <a:bodyPr wrap="none" rtlCol="0">
+              <a:spAutoFit/>
+            </a:bodyPr>
+            <a:lstStyle/>
+            <a:p>
+              <a:pPr marL="0" marR="0" lvl="0" indent="0" algn="l" defTabSz="914400" rtl="0" eaLnBrk="1" fontAlgn="auto" latinLnBrk="0" hangingPunct="1">
+                <a:lnSpc>
+                  <a:spcPct val="100000"/>
+                </a:lnSpc>
+                <a:spcBef>
+                  <a:spcPts val="0"/>
+                </a:spcBef>
+                <a:spcAft>
+                  <a:spcPts val="0"/>
+                </a:spcAft>
+                <a:buClrTx/>
+                <a:buSzTx/>
+                <a:buFontTx/>
+                <a:buNone/>
+                <a:tabLst/>
+                <a:defRPr/>
+              </a:pPr>
+              <a:r>
+                <a:rPr kumimoji="1" lang="en-US" altLang="ja-JP" sz="1200" dirty="0">
+                  <a:solidFill>
+                    <a:prstClr val="black"/>
+                  </a:solidFill>
+                  <a:latin typeface="Calibri"/>
+                  <a:ea typeface="ＭＳ Ｐゴシック" panose="020B0600070205080204" pitchFamily="50" charset="-128"/>
+                </a:rPr>
+                <a:t>Contract,</a:t>
+              </a:r>
+              <a:r>
+                <a:rPr kumimoji="1" lang="ja-JP" altLang="en-US" sz="1200" dirty="0">
+                  <a:solidFill>
+                    <a:prstClr val="black"/>
+                  </a:solidFill>
+                  <a:latin typeface="Calibri"/>
+                  <a:ea typeface="ＭＳ Ｐゴシック" panose="020B0600070205080204" pitchFamily="50" charset="-128"/>
+                </a:rPr>
+                <a:t> </a:t>
+              </a:r>
+              <a:r>
+                <a:rPr kumimoji="1" lang="en-US" altLang="ja-JP" sz="1200" dirty="0">
+                  <a:solidFill>
+                    <a:prstClr val="black"/>
+                  </a:solidFill>
+                  <a:latin typeface="Calibri"/>
+                  <a:ea typeface="ＭＳ Ｐゴシック" panose="020B0600070205080204" pitchFamily="50" charset="-128"/>
+                </a:rPr>
+                <a:t>License</a:t>
+              </a:r>
+              <a:endParaRPr kumimoji="1" lang="ja-JP" altLang="en-US" sz="1200" b="0" i="0" u="none" strike="noStrike" kern="1200" cap="none" spc="0" normalizeH="0" baseline="0" noProof="0" dirty="0">
+                <a:ln>
+                  <a:noFill/>
+                </a:ln>
+                <a:solidFill>
+                  <a:prstClr val="black"/>
+                </a:solidFill>
+                <a:effectLst/>
+                <a:uLnTx/>
+                <a:uFillTx/>
+                <a:latin typeface="Calibri"/>
+                <a:ea typeface="ＭＳ Ｐゴシック" panose="020B0600070205080204" pitchFamily="50" charset="-128"/>
+                <a:cs typeface="+mn-cs"/>
+              </a:endParaRPr>
+            </a:p>
+          </p:txBody>
+        </p:sp>
+        <p:cxnSp>
+          <p:nvCxnSpPr>
+            <p:cNvPr id="49" name="直線矢印コネクタ 48">
+              <a:extLst>
+                <a:ext uri="{FF2B5EF4-FFF2-40B4-BE49-F238E27FC236}">
+                  <a16:creationId xmlns:a16="http://schemas.microsoft.com/office/drawing/2014/main" id="{C464B536-32C7-4CB4-A68D-DC849895144C}"/>
+                </a:ext>
+              </a:extLst>
+            </p:cNvPr>
+            <p:cNvCxnSpPr>
+              <a:cxnSpLocks/>
+            </p:cNvCxnSpPr>
+            <p:nvPr/>
+          </p:nvCxnSpPr>
+          <p:spPr>
+            <a:xfrm>
+              <a:off x="10133342" y="872442"/>
+              <a:ext cx="729150" cy="0"/>
+            </a:xfrm>
+            <a:prstGeom prst="straightConnector1">
+              <a:avLst/>
+            </a:prstGeom>
+            <a:ln w="38100">
+              <a:solidFill>
+                <a:srgbClr val="FF0000"/>
+              </a:solidFill>
+              <a:tailEnd type="triangle"/>
+            </a:ln>
+          </p:spPr>
+          <p:style>
+            <a:lnRef idx="1">
+              <a:schemeClr val="accent1"/>
+            </a:lnRef>
+            <a:fillRef idx="0">
+              <a:schemeClr val="accent1"/>
+            </a:fillRef>
+            <a:effectRef idx="0">
+              <a:schemeClr val="accent1"/>
+            </a:effectRef>
+            <a:fontRef idx="minor">
+              <a:schemeClr val="tx1"/>
+            </a:fontRef>
+          </p:style>
+        </p:cxnSp>
+        <p:sp>
+          <p:nvSpPr>
+            <p:cNvPr id="50" name="テキスト ボックス 49">
+              <a:extLst>
+                <a:ext uri="{FF2B5EF4-FFF2-40B4-BE49-F238E27FC236}">
+                  <a16:creationId xmlns:a16="http://schemas.microsoft.com/office/drawing/2014/main" id="{7F771F3B-14A5-4791-833D-D36A79EE9812}"/>
+                </a:ext>
+              </a:extLst>
+            </p:cNvPr>
+            <p:cNvSpPr txBox="1"/>
+            <p:nvPr/>
+          </p:nvSpPr>
+          <p:spPr>
+            <a:xfrm>
+              <a:off x="9222327" y="759514"/>
+              <a:ext cx="1895440" cy="830997"/>
+            </a:xfrm>
+            <a:prstGeom prst="rect">
+              <a:avLst/>
+            </a:prstGeom>
+            <a:noFill/>
+          </p:spPr>
+          <p:txBody>
+            <a:bodyPr wrap="square" rtlCol="0">
+              <a:spAutoFit/>
+            </a:bodyPr>
+            <a:lstStyle/>
+            <a:p>
+              <a:pPr marL="0" marR="0" lvl="0" indent="0" algn="l" defTabSz="914400" rtl="0" eaLnBrk="1" fontAlgn="auto" latinLnBrk="0" hangingPunct="1">
+                <a:lnSpc>
+                  <a:spcPct val="100000"/>
+                </a:lnSpc>
+                <a:spcBef>
+                  <a:spcPts val="0"/>
+                </a:spcBef>
+                <a:spcAft>
+                  <a:spcPts val="0"/>
+                </a:spcAft>
+                <a:buClrTx/>
+                <a:buSzTx/>
+                <a:buFontTx/>
+                <a:buNone/>
+                <a:tabLst/>
+                <a:defRPr/>
+              </a:pPr>
+              <a:r>
+                <a:rPr kumimoji="1" lang="en-US" altLang="ja-JP" sz="1200" dirty="0">
+                  <a:solidFill>
+                    <a:prstClr val="black"/>
+                  </a:solidFill>
+                  <a:latin typeface="Calibri"/>
+                  <a:ea typeface="ＭＳ Ｐゴシック" panose="020B0600070205080204" pitchFamily="50" charset="-128"/>
+                </a:rPr>
+                <a:t>OSS license</a:t>
+              </a:r>
+              <a:endParaRPr kumimoji="1" lang="en-US" altLang="ja-JP" sz="1200" b="0" i="0" u="none" strike="noStrike" kern="1200" cap="none" spc="0" normalizeH="0" baseline="0" noProof="0" dirty="0">
+                <a:ln>
+                  <a:noFill/>
+                </a:ln>
+                <a:solidFill>
+                  <a:prstClr val="black"/>
+                </a:solidFill>
+                <a:effectLst/>
+                <a:uLnTx/>
+                <a:uFillTx/>
+                <a:latin typeface="Calibri"/>
+                <a:ea typeface="ＭＳ Ｐゴシック" panose="020B0600070205080204" pitchFamily="50" charset="-128"/>
+                <a:cs typeface="+mn-cs"/>
+              </a:endParaRPr>
+            </a:p>
+            <a:p>
+              <a:pPr marL="0" marR="0" lvl="0" indent="0" algn="l" defTabSz="914400" rtl="0" eaLnBrk="1" fontAlgn="auto" latinLnBrk="0" hangingPunct="1">
+                <a:lnSpc>
+                  <a:spcPct val="100000"/>
+                </a:lnSpc>
+                <a:spcBef>
+                  <a:spcPts val="0"/>
+                </a:spcBef>
+                <a:spcAft>
+                  <a:spcPts val="0"/>
+                </a:spcAft>
+                <a:buClrTx/>
+                <a:buSzTx/>
+                <a:buFontTx/>
+                <a:buNone/>
+                <a:tabLst/>
+                <a:defRPr/>
+              </a:pPr>
+              <a:r>
+                <a:rPr kumimoji="1" lang="ja-JP" altLang="en-US" sz="1200" b="0" i="0" u="none" strike="noStrike" kern="1200" cap="none" spc="0" normalizeH="0" baseline="0" noProof="0" dirty="0">
+                  <a:ln>
+                    <a:noFill/>
+                  </a:ln>
+                  <a:solidFill>
+                    <a:prstClr val="black"/>
+                  </a:solidFill>
+                  <a:effectLst/>
+                  <a:uLnTx/>
+                  <a:uFillTx/>
+                  <a:latin typeface="Calibri"/>
+                  <a:ea typeface="ＭＳ Ｐゴシック" panose="020B0600070205080204" pitchFamily="50" charset="-128"/>
+                  <a:cs typeface="+mn-cs"/>
+                </a:rPr>
+                <a:t>（</a:t>
+              </a:r>
+              <a:r>
+                <a:rPr kumimoji="1" lang="en-US" altLang="ja-JP" sz="1200" dirty="0">
+                  <a:solidFill>
+                    <a:prstClr val="black"/>
+                  </a:solidFill>
+                  <a:latin typeface="Calibri"/>
+                  <a:ea typeface="ＭＳ Ｐゴシック" panose="020B0600070205080204" pitchFamily="50" charset="-128"/>
+                </a:rPr>
+                <a:t>BoM, License, Copyright, Meta data, </a:t>
+              </a:r>
+            </a:p>
+            <a:p>
+              <a:pPr marL="0" marR="0" lvl="0" indent="0" algn="l" defTabSz="914400" rtl="0" eaLnBrk="1" fontAlgn="auto" latinLnBrk="0" hangingPunct="1">
+                <a:lnSpc>
+                  <a:spcPct val="100000"/>
+                </a:lnSpc>
+                <a:spcBef>
+                  <a:spcPts val="0"/>
+                </a:spcBef>
+                <a:spcAft>
+                  <a:spcPts val="0"/>
+                </a:spcAft>
+                <a:buClrTx/>
+                <a:buSzTx/>
+                <a:buFontTx/>
+                <a:buNone/>
+                <a:tabLst/>
+                <a:defRPr/>
+              </a:pPr>
+              <a:r>
+                <a:rPr kumimoji="1" lang="en-US" altLang="ja-JP" sz="1200" dirty="0">
+                  <a:solidFill>
+                    <a:prstClr val="black"/>
+                  </a:solidFill>
+                  <a:latin typeface="Calibri"/>
+                  <a:ea typeface="ＭＳ Ｐゴシック" panose="020B0600070205080204" pitchFamily="50" charset="-128"/>
+                </a:rPr>
+                <a:t>Source code if needed</a:t>
+              </a:r>
+              <a:r>
+                <a:rPr kumimoji="1" lang="ja-JP" altLang="en-US" sz="1200" b="0" i="0" u="none" strike="noStrike" kern="1200" cap="none" spc="0" normalizeH="0" baseline="0" noProof="0" dirty="0">
+                  <a:ln>
+                    <a:noFill/>
+                  </a:ln>
+                  <a:solidFill>
+                    <a:prstClr val="black"/>
+                  </a:solidFill>
+                  <a:effectLst/>
+                  <a:uLnTx/>
+                  <a:uFillTx/>
+                  <a:latin typeface="Calibri"/>
+                  <a:ea typeface="ＭＳ Ｐゴシック" panose="020B0600070205080204" pitchFamily="50" charset="-128"/>
+                  <a:cs typeface="+mn-cs"/>
+                </a:rPr>
+                <a:t>）</a:t>
+              </a:r>
+            </a:p>
+          </p:txBody>
+        </p:sp>
+        <p:sp>
+          <p:nvSpPr>
+            <p:cNvPr id="51" name="テキスト ボックス 50">
+              <a:extLst>
+                <a:ext uri="{FF2B5EF4-FFF2-40B4-BE49-F238E27FC236}">
+                  <a16:creationId xmlns:a16="http://schemas.microsoft.com/office/drawing/2014/main" id="{B0074E85-688C-4C3A-8DE3-F9EA54BAB42F}"/>
+                </a:ext>
+              </a:extLst>
+            </p:cNvPr>
+            <p:cNvSpPr txBox="1"/>
+            <p:nvPr/>
+          </p:nvSpPr>
+          <p:spPr>
+            <a:xfrm>
+              <a:off x="2522770" y="3524015"/>
+              <a:ext cx="923651" cy="276999"/>
+            </a:xfrm>
+            <a:prstGeom prst="rect">
+              <a:avLst/>
+            </a:prstGeom>
+            <a:noFill/>
+          </p:spPr>
+          <p:txBody>
+            <a:bodyPr wrap="none" rtlCol="0">
+              <a:spAutoFit/>
+            </a:bodyPr>
+            <a:lstStyle/>
+            <a:p>
+              <a:pPr marL="0" marR="0" lvl="0" indent="0" algn="l" defTabSz="914400" rtl="0" eaLnBrk="1" fontAlgn="auto" latinLnBrk="0" hangingPunct="1">
+                <a:lnSpc>
+                  <a:spcPct val="100000"/>
+                </a:lnSpc>
+                <a:spcBef>
+                  <a:spcPts val="0"/>
+                </a:spcBef>
+                <a:spcAft>
+                  <a:spcPts val="0"/>
+                </a:spcAft>
+                <a:buClrTx/>
+                <a:buSzTx/>
+                <a:buFontTx/>
+                <a:buNone/>
+                <a:tabLst/>
+                <a:defRPr/>
+              </a:pPr>
+              <a:r>
+                <a:rPr kumimoji="1" lang="en-US" altLang="ja-JP" sz="1200" b="0" i="0" u="none" strike="noStrike" kern="1200" cap="none" spc="0" normalizeH="0" baseline="0" noProof="0" dirty="0">
+                  <a:ln>
+                    <a:noFill/>
+                  </a:ln>
+                  <a:solidFill>
+                    <a:prstClr val="black"/>
+                  </a:solidFill>
+                  <a:effectLst/>
+                  <a:uLnTx/>
+                  <a:uFillTx/>
+                  <a:latin typeface="Calibri"/>
+                  <a:ea typeface="ＭＳ Ｐゴシック" panose="020B0600070205080204" pitchFamily="50" charset="-128"/>
+                  <a:cs typeface="+mn-cs"/>
+                </a:rPr>
+                <a:t>OSS</a:t>
+              </a:r>
+              <a:r>
+                <a:rPr kumimoji="1" lang="ja-JP" altLang="en-US" sz="1200" dirty="0">
+                  <a:solidFill>
+                    <a:prstClr val="black"/>
+                  </a:solidFill>
+                  <a:latin typeface="Calibri"/>
+                  <a:ea typeface="ＭＳ Ｐゴシック" panose="020B0600070205080204" pitchFamily="50" charset="-128"/>
+                </a:rPr>
+                <a:t> </a:t>
+              </a:r>
+              <a:r>
+                <a:rPr kumimoji="1" lang="en-US" altLang="ja-JP" sz="1200" dirty="0">
+                  <a:solidFill>
+                    <a:prstClr val="black"/>
+                  </a:solidFill>
+                  <a:latin typeface="Calibri"/>
+                  <a:ea typeface="ＭＳ Ｐゴシック" panose="020B0600070205080204" pitchFamily="50" charset="-128"/>
+                </a:rPr>
+                <a:t>License</a:t>
+              </a:r>
+              <a:endParaRPr kumimoji="1" lang="ja-JP" altLang="en-US" sz="1200" b="0" i="0" u="none" strike="noStrike" kern="1200" cap="none" spc="0" normalizeH="0" baseline="0" noProof="0" dirty="0">
+                <a:ln>
+                  <a:noFill/>
+                </a:ln>
+                <a:solidFill>
+                  <a:prstClr val="black"/>
+                </a:solidFill>
+                <a:effectLst/>
+                <a:uLnTx/>
+                <a:uFillTx/>
+                <a:latin typeface="Calibri"/>
+                <a:ea typeface="ＭＳ Ｐゴシック" panose="020B0600070205080204" pitchFamily="50" charset="-128"/>
+                <a:cs typeface="+mn-cs"/>
+              </a:endParaRPr>
+            </a:p>
+          </p:txBody>
+        </p:sp>
+        <p:sp>
+          <p:nvSpPr>
+            <p:cNvPr id="52" name="テキスト ボックス 51">
+              <a:extLst>
+                <a:ext uri="{FF2B5EF4-FFF2-40B4-BE49-F238E27FC236}">
+                  <a16:creationId xmlns:a16="http://schemas.microsoft.com/office/drawing/2014/main" id="{C3E49ACF-9195-4930-B28D-130ABD31308A}"/>
+                </a:ext>
+              </a:extLst>
+            </p:cNvPr>
+            <p:cNvSpPr txBox="1"/>
+            <p:nvPr/>
+          </p:nvSpPr>
+          <p:spPr>
+            <a:xfrm>
+              <a:off x="8077222" y="2518522"/>
+              <a:ext cx="567784" cy="307777"/>
+            </a:xfrm>
+            <a:prstGeom prst="rect">
+              <a:avLst/>
+            </a:prstGeom>
+            <a:noFill/>
+          </p:spPr>
+          <p:txBody>
+            <a:bodyPr wrap="none" rtlCol="0">
+              <a:spAutoFit/>
+            </a:bodyPr>
+            <a:lstStyle/>
+            <a:p>
+              <a:pPr marL="0" marR="0" lvl="0" indent="0" algn="l" defTabSz="914400" rtl="0" eaLnBrk="1" fontAlgn="auto" latinLnBrk="0" hangingPunct="1">
+                <a:lnSpc>
+                  <a:spcPct val="100000"/>
+                </a:lnSpc>
+                <a:spcBef>
+                  <a:spcPts val="0"/>
+                </a:spcBef>
+                <a:spcAft>
+                  <a:spcPts val="0"/>
+                </a:spcAft>
+                <a:buClrTx/>
+                <a:buSzTx/>
+                <a:buFontTx/>
+                <a:buNone/>
+                <a:tabLst/>
+                <a:defRPr/>
+              </a:pPr>
+              <a:r>
+                <a:rPr kumimoji="1" lang="en-US" altLang="ja-JP" sz="1400" b="0" i="0" u="none" strike="noStrike" kern="1200" cap="none" spc="0" normalizeH="0" baseline="0" noProof="0" dirty="0">
+                  <a:ln>
+                    <a:noFill/>
+                  </a:ln>
+                  <a:solidFill>
+                    <a:prstClr val="black"/>
+                  </a:solidFill>
+                  <a:effectLst/>
+                  <a:uLnTx/>
+                  <a:uFillTx/>
+                  <a:latin typeface="Calibri"/>
+                  <a:ea typeface="ＭＳ Ｐゴシック" panose="020B0600070205080204" pitchFamily="50" charset="-128"/>
+                  <a:cs typeface="+mn-cs"/>
+                </a:rPr>
+                <a:t>EULA</a:t>
+              </a:r>
+              <a:endParaRPr kumimoji="1" lang="ja-JP" altLang="en-US" sz="1400" b="0" i="0" u="none" strike="noStrike" kern="1200" cap="none" spc="0" normalizeH="0" baseline="0" noProof="0" dirty="0">
+                <a:ln>
+                  <a:noFill/>
+                </a:ln>
+                <a:solidFill>
+                  <a:prstClr val="black"/>
+                </a:solidFill>
+                <a:effectLst/>
+                <a:uLnTx/>
+                <a:uFillTx/>
+                <a:latin typeface="Calibri"/>
+                <a:ea typeface="ＭＳ Ｐゴシック" panose="020B0600070205080204" pitchFamily="50" charset="-128"/>
+                <a:cs typeface="+mn-cs"/>
+              </a:endParaRPr>
+            </a:p>
+          </p:txBody>
+        </p:sp>
+        <p:sp>
+          <p:nvSpPr>
+            <p:cNvPr id="53" name="テキスト ボックス 52">
+              <a:extLst>
+                <a:ext uri="{FF2B5EF4-FFF2-40B4-BE49-F238E27FC236}">
+                  <a16:creationId xmlns:a16="http://schemas.microsoft.com/office/drawing/2014/main" id="{92A99D74-19FD-4883-B90A-D34018AE2B67}"/>
+                </a:ext>
+              </a:extLst>
+            </p:cNvPr>
+            <p:cNvSpPr txBox="1"/>
+            <p:nvPr/>
+          </p:nvSpPr>
+          <p:spPr>
+            <a:xfrm>
+              <a:off x="7853304" y="2999687"/>
+              <a:ext cx="1023655" cy="523220"/>
+            </a:xfrm>
+            <a:prstGeom prst="rect">
+              <a:avLst/>
+            </a:prstGeom>
+            <a:noFill/>
+          </p:spPr>
+          <p:txBody>
+            <a:bodyPr wrap="square" rtlCol="0">
+              <a:spAutoFit/>
+            </a:bodyPr>
+            <a:lstStyle/>
+            <a:p>
+              <a:pPr marL="0" marR="0" lvl="0" indent="0" algn="l" defTabSz="914400" rtl="0" eaLnBrk="1" fontAlgn="auto" latinLnBrk="0" hangingPunct="1">
+                <a:lnSpc>
+                  <a:spcPct val="100000"/>
+                </a:lnSpc>
+                <a:spcBef>
+                  <a:spcPts val="0"/>
+                </a:spcBef>
+                <a:spcAft>
+                  <a:spcPts val="0"/>
+                </a:spcAft>
+                <a:buClrTx/>
+                <a:buSzTx/>
+                <a:buFontTx/>
+                <a:buNone/>
+                <a:tabLst/>
+                <a:defRPr/>
+              </a:pPr>
+              <a:r>
+                <a:rPr kumimoji="1" lang="en-US" altLang="ja-JP" sz="1400" b="0" i="0" u="none" strike="noStrike" kern="1200" cap="none" spc="0" normalizeH="0" baseline="0" noProof="0" dirty="0">
+                  <a:ln>
+                    <a:noFill/>
+                  </a:ln>
+                  <a:solidFill>
+                    <a:prstClr val="black"/>
+                  </a:solidFill>
+                  <a:effectLst/>
+                  <a:uLnTx/>
+                  <a:uFillTx/>
+                  <a:latin typeface="Calibri"/>
+                  <a:ea typeface="ＭＳ Ｐゴシック" panose="020B0600070205080204" pitchFamily="50" charset="-128"/>
+                  <a:cs typeface="+mn-cs"/>
+                </a:rPr>
+                <a:t>Software</a:t>
+              </a:r>
+            </a:p>
+            <a:p>
+              <a:pPr marL="0" marR="0" lvl="0" indent="0" algn="l" defTabSz="914400" rtl="0" eaLnBrk="1" fontAlgn="auto" latinLnBrk="0" hangingPunct="1">
+                <a:lnSpc>
+                  <a:spcPct val="100000"/>
+                </a:lnSpc>
+                <a:spcBef>
+                  <a:spcPts val="0"/>
+                </a:spcBef>
+                <a:spcAft>
+                  <a:spcPts val="0"/>
+                </a:spcAft>
+                <a:buClrTx/>
+                <a:buSzTx/>
+                <a:buFontTx/>
+                <a:buNone/>
+                <a:tabLst/>
+                <a:defRPr/>
+              </a:pPr>
+              <a:r>
+                <a:rPr kumimoji="1" lang="ja-JP" altLang="en-US" sz="1400" b="0" i="0" u="none" strike="noStrike" kern="1200" cap="none" spc="0" normalizeH="0" baseline="0" noProof="0" dirty="0">
+                  <a:ln>
+                    <a:noFill/>
+                  </a:ln>
+                  <a:solidFill>
+                    <a:prstClr val="black"/>
+                  </a:solidFill>
+                  <a:effectLst/>
+                  <a:uLnTx/>
+                  <a:uFillTx/>
+                  <a:latin typeface="Calibri"/>
+                  <a:ea typeface="ＭＳ Ｐゴシック" panose="020B0600070205080204" pitchFamily="50" charset="-128"/>
+                  <a:cs typeface="+mn-cs"/>
+                </a:rPr>
+                <a:t>（</a:t>
+              </a:r>
+              <a:r>
+                <a:rPr kumimoji="1" lang="en-US" altLang="ja-JP" sz="1400" b="0" i="0" u="none" strike="noStrike" kern="1200" cap="none" spc="0" normalizeH="0" baseline="0" noProof="0" dirty="0">
+                  <a:ln>
+                    <a:noFill/>
+                  </a:ln>
+                  <a:solidFill>
+                    <a:prstClr val="black"/>
+                  </a:solidFill>
+                  <a:effectLst/>
+                  <a:uLnTx/>
+                  <a:uFillTx/>
+                  <a:latin typeface="Calibri"/>
+                  <a:ea typeface="ＭＳ Ｐゴシック" panose="020B0600070205080204" pitchFamily="50" charset="-128"/>
+                  <a:cs typeface="+mn-cs"/>
+                </a:rPr>
+                <a:t>incl. OSS</a:t>
+              </a:r>
+              <a:r>
+                <a:rPr kumimoji="1" lang="ja-JP" altLang="en-US" sz="1400" b="0" i="0" u="none" strike="noStrike" kern="1200" cap="none" spc="0" normalizeH="0" baseline="0" noProof="0" dirty="0">
+                  <a:ln>
+                    <a:noFill/>
+                  </a:ln>
+                  <a:solidFill>
+                    <a:prstClr val="black"/>
+                  </a:solidFill>
+                  <a:effectLst/>
+                  <a:uLnTx/>
+                  <a:uFillTx/>
+                  <a:latin typeface="Calibri"/>
+                  <a:ea typeface="ＭＳ Ｐゴシック" panose="020B0600070205080204" pitchFamily="50" charset="-128"/>
+                  <a:cs typeface="+mn-cs"/>
+                </a:rPr>
+                <a:t>）</a:t>
+              </a:r>
+            </a:p>
+          </p:txBody>
+        </p:sp>
+        <p:sp>
+          <p:nvSpPr>
+            <p:cNvPr id="54" name="テキスト ボックス 53">
+              <a:extLst>
+                <a:ext uri="{FF2B5EF4-FFF2-40B4-BE49-F238E27FC236}">
+                  <a16:creationId xmlns:a16="http://schemas.microsoft.com/office/drawing/2014/main" id="{BC2E899B-C4A2-4544-BB5F-527B1C564FBE}"/>
+                </a:ext>
+              </a:extLst>
+            </p:cNvPr>
+            <p:cNvSpPr txBox="1"/>
+            <p:nvPr/>
+          </p:nvSpPr>
+          <p:spPr>
+            <a:xfrm>
+              <a:off x="7915840" y="3686738"/>
+              <a:ext cx="923651" cy="276999"/>
+            </a:xfrm>
+            <a:prstGeom prst="rect">
+              <a:avLst/>
+            </a:prstGeom>
+            <a:noFill/>
+          </p:spPr>
+          <p:txBody>
+            <a:bodyPr wrap="none" rtlCol="0">
+              <a:spAutoFit/>
+            </a:bodyPr>
+            <a:lstStyle/>
+            <a:p>
+              <a:pPr marL="0" marR="0" lvl="0" indent="0" algn="l" defTabSz="914400" rtl="0" eaLnBrk="1" fontAlgn="auto" latinLnBrk="0" hangingPunct="1">
+                <a:lnSpc>
+                  <a:spcPct val="100000"/>
+                </a:lnSpc>
+                <a:spcBef>
+                  <a:spcPts val="0"/>
+                </a:spcBef>
+                <a:spcAft>
+                  <a:spcPts val="0"/>
+                </a:spcAft>
+                <a:buClrTx/>
+                <a:buSzTx/>
+                <a:buFontTx/>
+                <a:buNone/>
+                <a:tabLst/>
+                <a:defRPr/>
+              </a:pPr>
+              <a:r>
+                <a:rPr kumimoji="1" lang="en-US" altLang="ja-JP" sz="1200" b="0" i="0" u="none" strike="noStrike" kern="1200" cap="none" spc="0" normalizeH="0" baseline="0" noProof="0" dirty="0">
+                  <a:ln>
+                    <a:noFill/>
+                  </a:ln>
+                  <a:solidFill>
+                    <a:prstClr val="black"/>
+                  </a:solidFill>
+                  <a:effectLst/>
+                  <a:uLnTx/>
+                  <a:uFillTx/>
+                  <a:latin typeface="Calibri"/>
+                  <a:ea typeface="ＭＳ Ｐゴシック" panose="020B0600070205080204" pitchFamily="50" charset="-128"/>
+                  <a:cs typeface="+mn-cs"/>
+                </a:rPr>
+                <a:t>OSS</a:t>
+              </a:r>
+              <a:r>
+                <a:rPr kumimoji="1" lang="ja-JP" altLang="en-US" sz="1200" dirty="0">
+                  <a:solidFill>
+                    <a:prstClr val="black"/>
+                  </a:solidFill>
+                  <a:latin typeface="Calibri"/>
+                  <a:ea typeface="ＭＳ Ｐゴシック" panose="020B0600070205080204" pitchFamily="50" charset="-128"/>
+                </a:rPr>
+                <a:t> </a:t>
+              </a:r>
+              <a:r>
+                <a:rPr kumimoji="1" lang="en-US" altLang="ja-JP" sz="1200" dirty="0">
+                  <a:solidFill>
+                    <a:prstClr val="black"/>
+                  </a:solidFill>
+                  <a:latin typeface="Calibri"/>
+                  <a:ea typeface="ＭＳ Ｐゴシック" panose="020B0600070205080204" pitchFamily="50" charset="-128"/>
+                </a:rPr>
+                <a:t>License</a:t>
+              </a:r>
+              <a:endParaRPr kumimoji="1" lang="ja-JP" altLang="en-US" sz="1200" b="0" i="0" u="none" strike="noStrike" kern="1200" cap="none" spc="0" normalizeH="0" baseline="0" noProof="0" dirty="0">
+                <a:ln>
+                  <a:noFill/>
+                </a:ln>
+                <a:solidFill>
+                  <a:prstClr val="black"/>
+                </a:solidFill>
+                <a:effectLst/>
+                <a:uLnTx/>
+                <a:uFillTx/>
+                <a:latin typeface="Calibri"/>
+                <a:ea typeface="ＭＳ Ｐゴシック" panose="020B0600070205080204" pitchFamily="50" charset="-128"/>
+                <a:cs typeface="+mn-cs"/>
+              </a:endParaRPr>
+            </a:p>
+          </p:txBody>
+        </p:sp>
+        <p:cxnSp>
+          <p:nvCxnSpPr>
+            <p:cNvPr id="56" name="直線矢印コネクタ 55">
+              <a:extLst>
+                <a:ext uri="{FF2B5EF4-FFF2-40B4-BE49-F238E27FC236}">
+                  <a16:creationId xmlns:a16="http://schemas.microsoft.com/office/drawing/2014/main" id="{0F3198F3-B473-49AB-AF2D-7EE74EB14D81}"/>
+                </a:ext>
+              </a:extLst>
+            </p:cNvPr>
+            <p:cNvCxnSpPr>
+              <a:cxnSpLocks/>
+              <a:stCxn id="55" idx="0"/>
+              <a:endCxn id="61" idx="1"/>
+            </p:cNvCxnSpPr>
+            <p:nvPr/>
+          </p:nvCxnSpPr>
+          <p:spPr>
+            <a:xfrm flipV="1">
+              <a:off x="7413840" y="1879514"/>
+              <a:ext cx="1296280" cy="668832"/>
+            </a:xfrm>
+            <a:prstGeom prst="straightConnector1">
+              <a:avLst/>
+            </a:prstGeom>
+            <a:ln w="38100">
+              <a:solidFill>
+                <a:srgbClr val="FFC000"/>
+              </a:solidFill>
+              <a:tailEnd type="triangle"/>
+            </a:ln>
+          </p:spPr>
+          <p:style>
+            <a:lnRef idx="1">
+              <a:schemeClr val="accent1"/>
+            </a:lnRef>
+            <a:fillRef idx="0">
+              <a:schemeClr val="accent1"/>
+            </a:fillRef>
+            <a:effectRef idx="0">
+              <a:schemeClr val="accent1"/>
+            </a:effectRef>
+            <a:fontRef idx="minor">
+              <a:schemeClr val="tx1"/>
+            </a:fontRef>
+          </p:style>
+        </p:cxnSp>
+        <p:sp>
+          <p:nvSpPr>
+            <p:cNvPr id="58" name="フローチャート: 磁気ディスク 57">
+              <a:extLst>
+                <a:ext uri="{FF2B5EF4-FFF2-40B4-BE49-F238E27FC236}">
+                  <a16:creationId xmlns:a16="http://schemas.microsoft.com/office/drawing/2014/main" id="{6F8A06A7-D462-4044-9916-49AAABAF24F9}"/>
+                </a:ext>
+              </a:extLst>
+            </p:cNvPr>
+            <p:cNvSpPr/>
+            <p:nvPr/>
+          </p:nvSpPr>
+          <p:spPr>
+            <a:xfrm>
+              <a:off x="8244783" y="1552442"/>
+              <a:ext cx="573645" cy="632454"/>
+            </a:xfrm>
+            <a:prstGeom prst="flowChartMagneticDisk">
+              <a:avLst/>
+            </a:prstGeom>
+            <a:solidFill>
+              <a:srgbClr val="FFC000"/>
+            </a:solidFill>
+          </p:spPr>
+          <p:style>
+            <a:lnRef idx="2">
+              <a:schemeClr val="accent1">
+                <a:shade val="50000"/>
+              </a:schemeClr>
+            </a:lnRef>
+            <a:fillRef idx="1">
+              <a:schemeClr val="accent1"/>
+            </a:fillRef>
+            <a:effectRef idx="0">
+              <a:schemeClr val="accent1"/>
+            </a:effectRef>
+            <a:fontRef idx="minor">
+              <a:schemeClr val="lt1"/>
+            </a:fontRef>
+          </p:style>
+          <p:txBody>
+            <a:bodyPr rtlCol="0" anchor="ctr"/>
+            <a:lstStyle/>
+            <a:p>
+              <a:pPr marL="0" marR="0" lvl="0" indent="0" algn="ctr" defTabSz="914400" rtl="0" eaLnBrk="1" fontAlgn="auto" latinLnBrk="0" hangingPunct="1">
+                <a:lnSpc>
+                  <a:spcPct val="100000"/>
+                </a:lnSpc>
+                <a:spcBef>
+                  <a:spcPts val="0"/>
+                </a:spcBef>
+                <a:spcAft>
+                  <a:spcPts val="0"/>
+                </a:spcAft>
+                <a:buClrTx/>
+                <a:buSzTx/>
+                <a:buFontTx/>
+                <a:buNone/>
+                <a:tabLst/>
+                <a:defRPr/>
+              </a:pPr>
+              <a:endParaRPr kumimoji="1" lang="ja-JP" altLang="en-US" sz="1800" b="0" i="0" u="none" strike="noStrike" kern="1200" cap="none" spc="0" normalizeH="0" baseline="0" noProof="0">
+                <a:ln>
+                  <a:noFill/>
+                </a:ln>
+                <a:solidFill>
+                  <a:prstClr val="white"/>
+                </a:solidFill>
+                <a:effectLst/>
+                <a:uLnTx/>
+                <a:uFillTx/>
+                <a:latin typeface="Calibri"/>
+                <a:ea typeface="ＭＳ Ｐゴシック" panose="020B0600070205080204" pitchFamily="50" charset="-128"/>
+                <a:cs typeface="+mn-cs"/>
+              </a:endParaRPr>
+            </a:p>
+          </p:txBody>
+        </p:sp>
+        <p:sp>
+          <p:nvSpPr>
+            <p:cNvPr id="61" name="テキスト ボックス 60">
+              <a:extLst>
+                <a:ext uri="{FF2B5EF4-FFF2-40B4-BE49-F238E27FC236}">
+                  <a16:creationId xmlns:a16="http://schemas.microsoft.com/office/drawing/2014/main" id="{9BA04A49-898C-47F7-A64B-CFFBA5599125}"/>
+                </a:ext>
+              </a:extLst>
+            </p:cNvPr>
+            <p:cNvSpPr txBox="1"/>
+            <p:nvPr/>
+          </p:nvSpPr>
+          <p:spPr>
+            <a:xfrm>
+              <a:off x="8710120" y="1579432"/>
+              <a:ext cx="1056700" cy="600164"/>
+            </a:xfrm>
+            <a:prstGeom prst="rect">
+              <a:avLst/>
+            </a:prstGeom>
+            <a:noFill/>
+          </p:spPr>
+          <p:txBody>
+            <a:bodyPr wrap="square" rtlCol="0">
+              <a:spAutoFit/>
+            </a:bodyPr>
+            <a:lstStyle/>
+            <a:p>
+              <a:pPr marL="0" marR="0" lvl="0" indent="0" algn="ctr" defTabSz="914400" rtl="0" eaLnBrk="1" fontAlgn="auto" latinLnBrk="0" hangingPunct="1">
+                <a:lnSpc>
+                  <a:spcPct val="100000"/>
+                </a:lnSpc>
+                <a:spcBef>
+                  <a:spcPts val="0"/>
+                </a:spcBef>
+                <a:spcAft>
+                  <a:spcPts val="0"/>
+                </a:spcAft>
+                <a:buClrTx/>
+                <a:buSzTx/>
+                <a:buFontTx/>
+                <a:buNone/>
+                <a:tabLst/>
+                <a:defRPr/>
+              </a:pPr>
+              <a:r>
+                <a:rPr kumimoji="1" lang="en-US" altLang="ja-JP" sz="1100" dirty="0">
+                  <a:solidFill>
+                    <a:prstClr val="black"/>
+                  </a:solidFill>
+                  <a:latin typeface="Calibri"/>
+                  <a:ea typeface="ＭＳ Ｐゴシック" panose="020B0600070205080204" pitchFamily="50" charset="-128"/>
+                </a:rPr>
+                <a:t>Website of Source</a:t>
+              </a:r>
+              <a:r>
+                <a:rPr kumimoji="1" lang="ja-JP" altLang="en-US" sz="1100" dirty="0">
+                  <a:solidFill>
+                    <a:prstClr val="black"/>
+                  </a:solidFill>
+                  <a:latin typeface="Calibri"/>
+                  <a:ea typeface="ＭＳ Ｐゴシック" panose="020B0600070205080204" pitchFamily="50" charset="-128"/>
+                </a:rPr>
+                <a:t> </a:t>
+              </a:r>
+              <a:r>
+                <a:rPr kumimoji="1" lang="en-US" altLang="ja-JP" sz="1100" dirty="0">
+                  <a:solidFill>
+                    <a:prstClr val="black"/>
+                  </a:solidFill>
+                  <a:latin typeface="Calibri"/>
+                  <a:ea typeface="ＭＳ Ｐゴシック" panose="020B0600070205080204" pitchFamily="50" charset="-128"/>
+                </a:rPr>
+                <a:t>code</a:t>
+              </a:r>
+              <a:r>
+                <a:rPr kumimoji="1" lang="ja-JP" altLang="en-US" sz="1100" dirty="0">
+                  <a:solidFill>
+                    <a:prstClr val="black"/>
+                  </a:solidFill>
+                  <a:latin typeface="Calibri"/>
+                  <a:ea typeface="ＭＳ Ｐゴシック" panose="020B0600070205080204" pitchFamily="50" charset="-128"/>
+                </a:rPr>
+                <a:t> </a:t>
+              </a:r>
+              <a:r>
+                <a:rPr kumimoji="1" lang="en-US" altLang="ja-JP" sz="1100" dirty="0">
+                  <a:solidFill>
+                    <a:prstClr val="black"/>
+                  </a:solidFill>
+                  <a:latin typeface="Calibri"/>
+                  <a:ea typeface="ＭＳ Ｐゴシック" panose="020B0600070205080204" pitchFamily="50" charset="-128"/>
+                </a:rPr>
+                <a:t>publication</a:t>
+              </a:r>
+              <a:endParaRPr kumimoji="1" lang="en-US" altLang="ja-JP" sz="1100" b="0" i="0" u="none" strike="noStrike" kern="1200" cap="none" spc="0" normalizeH="0" baseline="0" noProof="0" dirty="0">
+                <a:ln>
+                  <a:noFill/>
+                </a:ln>
+                <a:solidFill>
+                  <a:prstClr val="black"/>
+                </a:solidFill>
+                <a:effectLst/>
+                <a:uLnTx/>
+                <a:uFillTx/>
+                <a:latin typeface="Calibri"/>
+                <a:ea typeface="ＭＳ Ｐゴシック" panose="020B0600070205080204" pitchFamily="50" charset="-128"/>
+                <a:cs typeface="+mn-cs"/>
+              </a:endParaRPr>
+            </a:p>
+          </p:txBody>
+        </p:sp>
+        <p:sp>
+          <p:nvSpPr>
+            <p:cNvPr id="62" name="四角形: 角を丸くする 61">
+              <a:extLst>
+                <a:ext uri="{FF2B5EF4-FFF2-40B4-BE49-F238E27FC236}">
+                  <a16:creationId xmlns:a16="http://schemas.microsoft.com/office/drawing/2014/main" id="{61E144C9-EEEA-467C-B27C-79409D934D7E}"/>
+                </a:ext>
+              </a:extLst>
+            </p:cNvPr>
+            <p:cNvSpPr/>
+            <p:nvPr/>
+          </p:nvSpPr>
+          <p:spPr>
+            <a:xfrm>
+              <a:off x="6631302" y="4816818"/>
+              <a:ext cx="1145453" cy="558437"/>
+            </a:xfrm>
+            <a:prstGeom prst="roundRect">
+              <a:avLst/>
+            </a:prstGeom>
+            <a:solidFill>
+              <a:srgbClr val="FFFF00"/>
+            </a:solidFill>
+            <a:ln>
+              <a:noFill/>
+            </a:ln>
+          </p:spPr>
+          <p:style>
+            <a:lnRef idx="2">
+              <a:schemeClr val="accent1">
+                <a:shade val="50000"/>
+              </a:schemeClr>
+            </a:lnRef>
+            <a:fillRef idx="1">
+              <a:schemeClr val="accent1"/>
+            </a:fillRef>
+            <a:effectRef idx="0">
+              <a:schemeClr val="accent1"/>
+            </a:effectRef>
+            <a:fontRef idx="minor">
+              <a:schemeClr val="lt1"/>
+            </a:fontRef>
+          </p:style>
+          <p:txBody>
+            <a:bodyPr rtlCol="0" anchor="ctr"/>
+            <a:lstStyle/>
+            <a:p>
+              <a:pPr marL="0" marR="0" lvl="0" indent="0" algn="ctr" defTabSz="914400" rtl="0" eaLnBrk="1" fontAlgn="auto" latinLnBrk="0" hangingPunct="1">
+                <a:lnSpc>
+                  <a:spcPct val="100000"/>
+                </a:lnSpc>
+                <a:spcBef>
+                  <a:spcPts val="0"/>
+                </a:spcBef>
+                <a:spcAft>
+                  <a:spcPts val="0"/>
+                </a:spcAft>
+                <a:buClrTx/>
+                <a:buSzTx/>
+                <a:buFontTx/>
+                <a:buNone/>
+                <a:tabLst/>
+                <a:defRPr/>
+              </a:pPr>
+              <a:r>
+                <a:rPr kumimoji="1" lang="en-US" altLang="ja-JP" sz="1200" dirty="0">
+                  <a:solidFill>
+                    <a:prstClr val="black"/>
+                  </a:solidFill>
+                  <a:latin typeface="Calibri"/>
+                  <a:ea typeface="ＭＳ Ｐゴシック" panose="020B0600070205080204" pitchFamily="50" charset="-128"/>
+                </a:rPr>
+                <a:t>Customer</a:t>
+              </a:r>
+              <a:r>
+                <a:rPr kumimoji="1" lang="ja-JP" altLang="en-US" sz="1200" dirty="0">
+                  <a:solidFill>
+                    <a:prstClr val="black"/>
+                  </a:solidFill>
+                  <a:latin typeface="Calibri"/>
+                  <a:ea typeface="ＭＳ Ｐゴシック" panose="020B0600070205080204" pitchFamily="50" charset="-128"/>
+                </a:rPr>
+                <a:t> </a:t>
+              </a:r>
+              <a:r>
+                <a:rPr kumimoji="1" lang="en-US" altLang="ja-JP" sz="1200" dirty="0">
+                  <a:solidFill>
+                    <a:prstClr val="black"/>
+                  </a:solidFill>
+                  <a:latin typeface="Calibri"/>
+                  <a:ea typeface="ＭＳ Ｐゴシック" panose="020B0600070205080204" pitchFamily="50" charset="-128"/>
+                </a:rPr>
+                <a:t>Support</a:t>
+              </a:r>
+              <a:endParaRPr kumimoji="1" lang="en-US" altLang="ja-JP" sz="1200" b="0" i="0" u="none" strike="noStrike" kern="1200" cap="none" spc="0" normalizeH="0" baseline="0" noProof="0" dirty="0">
+                <a:ln>
+                  <a:noFill/>
+                </a:ln>
+                <a:solidFill>
+                  <a:prstClr val="black"/>
+                </a:solidFill>
+                <a:effectLst/>
+                <a:uLnTx/>
+                <a:uFillTx/>
+                <a:latin typeface="Calibri"/>
+                <a:ea typeface="ＭＳ Ｐゴシック" panose="020B0600070205080204" pitchFamily="50" charset="-128"/>
+                <a:cs typeface="+mn-cs"/>
+              </a:endParaRPr>
+            </a:p>
+          </p:txBody>
+        </p:sp>
+        <p:sp>
+          <p:nvSpPr>
+            <p:cNvPr id="64" name="テキスト ボックス 63">
+              <a:extLst>
+                <a:ext uri="{FF2B5EF4-FFF2-40B4-BE49-F238E27FC236}">
+                  <a16:creationId xmlns:a16="http://schemas.microsoft.com/office/drawing/2014/main" id="{6FA8BEB1-3EFE-4C16-9F41-44A149F98E9A}"/>
+                </a:ext>
+              </a:extLst>
+            </p:cNvPr>
+            <p:cNvSpPr txBox="1"/>
+            <p:nvPr/>
+          </p:nvSpPr>
+          <p:spPr>
+            <a:xfrm>
+              <a:off x="7915840" y="5110761"/>
+              <a:ext cx="840295" cy="261610"/>
+            </a:xfrm>
+            <a:prstGeom prst="rect">
+              <a:avLst/>
+            </a:prstGeom>
+            <a:noFill/>
+          </p:spPr>
+          <p:txBody>
+            <a:bodyPr wrap="none" rtlCol="0">
+              <a:spAutoFit/>
+            </a:bodyPr>
+            <a:lstStyle/>
+            <a:p>
+              <a:pPr marL="0" marR="0" lvl="0" indent="0" algn="l" defTabSz="914400" rtl="0" eaLnBrk="1" fontAlgn="auto" latinLnBrk="0" hangingPunct="1">
+                <a:lnSpc>
+                  <a:spcPct val="100000"/>
+                </a:lnSpc>
+                <a:spcBef>
+                  <a:spcPts val="0"/>
+                </a:spcBef>
+                <a:spcAft>
+                  <a:spcPts val="0"/>
+                </a:spcAft>
+                <a:buClrTx/>
+                <a:buSzTx/>
+                <a:buFontTx/>
+                <a:buNone/>
+                <a:tabLst/>
+                <a:defRPr/>
+              </a:pPr>
+              <a:r>
+                <a:rPr kumimoji="1" lang="en-US" altLang="ja-JP" sz="1100" b="0" i="0" u="none" strike="noStrike" kern="1200" cap="none" spc="0" normalizeH="0" baseline="0" noProof="0" dirty="0">
+                  <a:ln>
+                    <a:noFill/>
+                  </a:ln>
+                  <a:solidFill>
+                    <a:prstClr val="black"/>
+                  </a:solidFill>
+                  <a:effectLst/>
+                  <a:uLnTx/>
+                  <a:uFillTx/>
+                  <a:latin typeface="Calibri"/>
+                  <a:ea typeface="ＭＳ Ｐゴシック" panose="020B0600070205080204" pitchFamily="50" charset="-128"/>
+                  <a:cs typeface="+mn-cs"/>
+                </a:rPr>
+                <a:t>OSS</a:t>
+              </a:r>
+              <a:r>
+                <a:rPr kumimoji="1" lang="ja-JP" altLang="en-US" sz="1100" dirty="0">
+                  <a:solidFill>
+                    <a:prstClr val="black"/>
+                  </a:solidFill>
+                  <a:latin typeface="Calibri"/>
+                  <a:ea typeface="ＭＳ Ｐゴシック" panose="020B0600070205080204" pitchFamily="50" charset="-128"/>
+                </a:rPr>
+                <a:t> </a:t>
+              </a:r>
+              <a:r>
+                <a:rPr kumimoji="1" lang="en-US" altLang="ja-JP" sz="1100" dirty="0">
+                  <a:solidFill>
+                    <a:prstClr val="black"/>
+                  </a:solidFill>
+                  <a:latin typeface="Calibri"/>
+                  <a:ea typeface="ＭＳ Ｐゴシック" panose="020B0600070205080204" pitchFamily="50" charset="-128"/>
+                </a:rPr>
+                <a:t>Inquiry</a:t>
+              </a:r>
+              <a:endParaRPr kumimoji="1" lang="ja-JP" altLang="en-US" sz="1100" b="0" i="0" u="none" strike="noStrike" kern="1200" cap="none" spc="0" normalizeH="0" baseline="0" noProof="0" dirty="0">
+                <a:ln>
+                  <a:noFill/>
+                </a:ln>
+                <a:solidFill>
+                  <a:prstClr val="black"/>
+                </a:solidFill>
+                <a:effectLst/>
+                <a:uLnTx/>
+                <a:uFillTx/>
+                <a:latin typeface="Calibri"/>
+                <a:ea typeface="ＭＳ Ｐゴシック" panose="020B0600070205080204" pitchFamily="50" charset="-128"/>
+                <a:cs typeface="+mn-cs"/>
+              </a:endParaRPr>
+            </a:p>
+          </p:txBody>
+        </p:sp>
+        <p:cxnSp>
+          <p:nvCxnSpPr>
+            <p:cNvPr id="70" name="直線矢印コネクタ 69">
+              <a:extLst>
+                <a:ext uri="{FF2B5EF4-FFF2-40B4-BE49-F238E27FC236}">
+                  <a16:creationId xmlns:a16="http://schemas.microsoft.com/office/drawing/2014/main" id="{9BEC4DA4-D661-4F0B-87B8-06549A413407}"/>
+                </a:ext>
+              </a:extLst>
+            </p:cNvPr>
+            <p:cNvCxnSpPr>
+              <a:cxnSpLocks/>
+            </p:cNvCxnSpPr>
+            <p:nvPr/>
+          </p:nvCxnSpPr>
+          <p:spPr>
+            <a:xfrm flipV="1">
+              <a:off x="4479324" y="4395306"/>
+              <a:ext cx="0" cy="1244470"/>
+            </a:xfrm>
+            <a:prstGeom prst="straightConnector1">
+              <a:avLst/>
+            </a:prstGeom>
+            <a:ln w="38100">
+              <a:solidFill>
+                <a:srgbClr val="FFC000"/>
+              </a:solidFill>
+              <a:tailEnd type="triangle"/>
+            </a:ln>
+          </p:spPr>
+          <p:style>
+            <a:lnRef idx="1">
+              <a:schemeClr val="accent1"/>
+            </a:lnRef>
+            <a:fillRef idx="0">
+              <a:schemeClr val="accent1"/>
+            </a:fillRef>
+            <a:effectRef idx="0">
+              <a:schemeClr val="accent1"/>
+            </a:effectRef>
+            <a:fontRef idx="minor">
+              <a:schemeClr val="tx1"/>
+            </a:fontRef>
+          </p:style>
+        </p:cxnSp>
+        <p:cxnSp>
+          <p:nvCxnSpPr>
+            <p:cNvPr id="72" name="直線矢印コネクタ 71">
+              <a:extLst>
+                <a:ext uri="{FF2B5EF4-FFF2-40B4-BE49-F238E27FC236}">
+                  <a16:creationId xmlns:a16="http://schemas.microsoft.com/office/drawing/2014/main" id="{CDC1E55D-C73E-4A4F-96C5-7C9AF35137EC}"/>
+                </a:ext>
+              </a:extLst>
+            </p:cNvPr>
+            <p:cNvCxnSpPr>
+              <a:cxnSpLocks/>
+              <a:stCxn id="10" idx="1"/>
+            </p:cNvCxnSpPr>
+            <p:nvPr/>
+          </p:nvCxnSpPr>
+          <p:spPr>
+            <a:xfrm flipH="1" flipV="1">
+              <a:off x="2265971" y="5318200"/>
+              <a:ext cx="1983920" cy="637114"/>
+            </a:xfrm>
+            <a:prstGeom prst="straightConnector1">
+              <a:avLst/>
+            </a:prstGeom>
+            <a:ln w="38100">
+              <a:solidFill>
+                <a:srgbClr val="FFC000"/>
+              </a:solidFill>
+              <a:tailEnd type="triangle"/>
+            </a:ln>
+          </p:spPr>
+          <p:style>
+            <a:lnRef idx="1">
+              <a:schemeClr val="accent1"/>
+            </a:lnRef>
+            <a:fillRef idx="0">
+              <a:schemeClr val="accent1"/>
+            </a:fillRef>
+            <a:effectRef idx="0">
+              <a:schemeClr val="accent1"/>
+            </a:effectRef>
+            <a:fontRef idx="minor">
+              <a:schemeClr val="tx1"/>
+            </a:fontRef>
+          </p:style>
+        </p:cxnSp>
+        <p:sp>
+          <p:nvSpPr>
+            <p:cNvPr id="74" name="テキスト ボックス 73">
+              <a:extLst>
+                <a:ext uri="{FF2B5EF4-FFF2-40B4-BE49-F238E27FC236}">
+                  <a16:creationId xmlns:a16="http://schemas.microsoft.com/office/drawing/2014/main" id="{920F6C34-2AD3-489B-99BC-8607F031AB1D}"/>
+                </a:ext>
+              </a:extLst>
+            </p:cNvPr>
+            <p:cNvSpPr txBox="1"/>
+            <p:nvPr/>
+          </p:nvSpPr>
+          <p:spPr>
+            <a:xfrm>
+              <a:off x="4049398" y="4698248"/>
+              <a:ext cx="428322" cy="276999"/>
+            </a:xfrm>
+            <a:prstGeom prst="rect">
+              <a:avLst/>
+            </a:prstGeom>
+            <a:noFill/>
+          </p:spPr>
+          <p:txBody>
+            <a:bodyPr wrap="none" rtlCol="0">
+              <a:spAutoFit/>
+            </a:bodyPr>
+            <a:lstStyle/>
+            <a:p>
+              <a:pPr marL="0" marR="0" lvl="0" indent="0" algn="l" defTabSz="914400" rtl="0" eaLnBrk="1" fontAlgn="auto" latinLnBrk="0" hangingPunct="1">
+                <a:lnSpc>
+                  <a:spcPct val="100000"/>
+                </a:lnSpc>
+                <a:spcBef>
+                  <a:spcPts val="0"/>
+                </a:spcBef>
+                <a:spcAft>
+                  <a:spcPts val="0"/>
+                </a:spcAft>
+                <a:buClrTx/>
+                <a:buSzTx/>
+                <a:buFontTx/>
+                <a:buNone/>
+                <a:tabLst/>
+                <a:defRPr/>
+              </a:pPr>
+              <a:r>
+                <a:rPr kumimoji="1" lang="en-US" altLang="ja-JP" sz="1200" b="0" i="0" u="none" strike="noStrike" kern="1200" cap="none" spc="0" normalizeH="0" baseline="0" noProof="0" dirty="0">
+                  <a:ln>
+                    <a:noFill/>
+                  </a:ln>
+                  <a:solidFill>
+                    <a:prstClr val="black"/>
+                  </a:solidFill>
+                  <a:effectLst/>
+                  <a:uLnTx/>
+                  <a:uFillTx/>
+                  <a:latin typeface="Calibri"/>
+                  <a:ea typeface="ＭＳ Ｐゴシック" panose="020B0600070205080204" pitchFamily="50" charset="-128"/>
+                  <a:cs typeface="+mn-cs"/>
+                </a:rPr>
+                <a:t>OSS</a:t>
+              </a:r>
+              <a:endParaRPr kumimoji="1" lang="ja-JP" altLang="en-US" sz="1200" b="0" i="0" u="none" strike="noStrike" kern="1200" cap="none" spc="0" normalizeH="0" baseline="0" noProof="0" dirty="0">
+                <a:ln>
+                  <a:noFill/>
+                </a:ln>
+                <a:solidFill>
+                  <a:prstClr val="black"/>
+                </a:solidFill>
+                <a:effectLst/>
+                <a:uLnTx/>
+                <a:uFillTx/>
+                <a:latin typeface="Calibri"/>
+                <a:ea typeface="ＭＳ Ｐゴシック" panose="020B0600070205080204" pitchFamily="50" charset="-128"/>
+                <a:cs typeface="+mn-cs"/>
+              </a:endParaRPr>
+            </a:p>
+          </p:txBody>
+        </p:sp>
+        <p:sp>
+          <p:nvSpPr>
+            <p:cNvPr id="75" name="テキスト ボックス 74">
+              <a:extLst>
+                <a:ext uri="{FF2B5EF4-FFF2-40B4-BE49-F238E27FC236}">
+                  <a16:creationId xmlns:a16="http://schemas.microsoft.com/office/drawing/2014/main" id="{F99D00E4-8CFB-45C1-831D-1D16F50C6085}"/>
+                </a:ext>
+              </a:extLst>
+            </p:cNvPr>
+            <p:cNvSpPr txBox="1"/>
+            <p:nvPr/>
+          </p:nvSpPr>
+          <p:spPr>
+            <a:xfrm>
+              <a:off x="2604456" y="5571471"/>
+              <a:ext cx="428322" cy="276999"/>
+            </a:xfrm>
+            <a:prstGeom prst="rect">
+              <a:avLst/>
+            </a:prstGeom>
+            <a:noFill/>
+          </p:spPr>
+          <p:txBody>
+            <a:bodyPr wrap="none" rtlCol="0">
+              <a:spAutoFit/>
+            </a:bodyPr>
+            <a:lstStyle/>
+            <a:p>
+              <a:pPr marL="0" marR="0" lvl="0" indent="0" algn="l" defTabSz="914400" rtl="0" eaLnBrk="1" fontAlgn="auto" latinLnBrk="0" hangingPunct="1">
+                <a:lnSpc>
+                  <a:spcPct val="100000"/>
+                </a:lnSpc>
+                <a:spcBef>
+                  <a:spcPts val="0"/>
+                </a:spcBef>
+                <a:spcAft>
+                  <a:spcPts val="0"/>
+                </a:spcAft>
+                <a:buClrTx/>
+                <a:buSzTx/>
+                <a:buFontTx/>
+                <a:buNone/>
+                <a:tabLst/>
+                <a:defRPr/>
+              </a:pPr>
+              <a:r>
+                <a:rPr kumimoji="1" lang="en-US" altLang="ja-JP" sz="1200" b="0" i="0" u="none" strike="noStrike" kern="1200" cap="none" spc="0" normalizeH="0" baseline="0" noProof="0" dirty="0">
+                  <a:ln>
+                    <a:noFill/>
+                  </a:ln>
+                  <a:solidFill>
+                    <a:prstClr val="black"/>
+                  </a:solidFill>
+                  <a:effectLst/>
+                  <a:uLnTx/>
+                  <a:uFillTx/>
+                  <a:latin typeface="Calibri"/>
+                  <a:ea typeface="ＭＳ Ｐゴシック" panose="020B0600070205080204" pitchFamily="50" charset="-128"/>
+                  <a:cs typeface="+mn-cs"/>
+                </a:rPr>
+                <a:t>OSS</a:t>
+              </a:r>
+              <a:endParaRPr kumimoji="1" lang="ja-JP" altLang="en-US" sz="1200" b="0" i="0" u="none" strike="noStrike" kern="1200" cap="none" spc="0" normalizeH="0" baseline="0" noProof="0" dirty="0">
+                <a:ln>
+                  <a:noFill/>
+                </a:ln>
+                <a:solidFill>
+                  <a:prstClr val="black"/>
+                </a:solidFill>
+                <a:effectLst/>
+                <a:uLnTx/>
+                <a:uFillTx/>
+                <a:latin typeface="Calibri"/>
+                <a:ea typeface="ＭＳ Ｐゴシック" panose="020B0600070205080204" pitchFamily="50" charset="-128"/>
+                <a:cs typeface="+mn-cs"/>
+              </a:endParaRPr>
+            </a:p>
+          </p:txBody>
+        </p:sp>
+        <p:cxnSp>
+          <p:nvCxnSpPr>
+            <p:cNvPr id="76" name="直線矢印コネクタ 75">
+              <a:extLst>
+                <a:ext uri="{FF2B5EF4-FFF2-40B4-BE49-F238E27FC236}">
+                  <a16:creationId xmlns:a16="http://schemas.microsoft.com/office/drawing/2014/main" id="{2CEF35C0-9E1C-4371-9C22-7BA0F357C050}"/>
+                </a:ext>
+              </a:extLst>
+            </p:cNvPr>
+            <p:cNvCxnSpPr>
+              <a:cxnSpLocks/>
+            </p:cNvCxnSpPr>
+            <p:nvPr/>
+          </p:nvCxnSpPr>
+          <p:spPr>
+            <a:xfrm flipH="1" flipV="1">
+              <a:off x="2244200" y="5013786"/>
+              <a:ext cx="2005691" cy="717171"/>
+            </a:xfrm>
+            <a:prstGeom prst="straightConnector1">
+              <a:avLst/>
+            </a:prstGeom>
+            <a:ln w="38100">
+              <a:solidFill>
+                <a:srgbClr val="FF0000"/>
+              </a:solidFill>
+              <a:tailEnd type="triangle"/>
+            </a:ln>
+          </p:spPr>
+          <p:style>
+            <a:lnRef idx="1">
+              <a:schemeClr val="accent1"/>
+            </a:lnRef>
+            <a:fillRef idx="0">
+              <a:schemeClr val="accent1"/>
+            </a:fillRef>
+            <a:effectRef idx="0">
+              <a:schemeClr val="accent1"/>
+            </a:effectRef>
+            <a:fontRef idx="minor">
+              <a:schemeClr val="tx1"/>
+            </a:fontRef>
+          </p:style>
+        </p:cxnSp>
+        <p:cxnSp>
+          <p:nvCxnSpPr>
+            <p:cNvPr id="78" name="直線矢印コネクタ 77">
+              <a:extLst>
+                <a:ext uri="{FF2B5EF4-FFF2-40B4-BE49-F238E27FC236}">
+                  <a16:creationId xmlns:a16="http://schemas.microsoft.com/office/drawing/2014/main" id="{20935DA2-217A-4D28-A9B8-85956B32C101}"/>
+                </a:ext>
+              </a:extLst>
+            </p:cNvPr>
+            <p:cNvCxnSpPr>
+              <a:cxnSpLocks/>
+            </p:cNvCxnSpPr>
+            <p:nvPr/>
+          </p:nvCxnSpPr>
+          <p:spPr>
+            <a:xfrm flipH="1" flipV="1">
+              <a:off x="4580528" y="4395306"/>
+              <a:ext cx="9515" cy="1252204"/>
+            </a:xfrm>
+            <a:prstGeom prst="straightConnector1">
+              <a:avLst/>
+            </a:prstGeom>
+            <a:ln w="38100">
+              <a:solidFill>
+                <a:srgbClr val="FF0000"/>
+              </a:solidFill>
+              <a:tailEnd type="triangle"/>
+            </a:ln>
+          </p:spPr>
+          <p:style>
+            <a:lnRef idx="1">
+              <a:schemeClr val="accent1"/>
+            </a:lnRef>
+            <a:fillRef idx="0">
+              <a:schemeClr val="accent1"/>
+            </a:fillRef>
+            <a:effectRef idx="0">
+              <a:schemeClr val="accent1"/>
+            </a:effectRef>
+            <a:fontRef idx="minor">
+              <a:schemeClr val="tx1"/>
+            </a:fontRef>
+          </p:style>
+        </p:cxnSp>
+        <p:sp>
+          <p:nvSpPr>
+            <p:cNvPr id="80" name="テキスト ボックス 79">
+              <a:extLst>
+                <a:ext uri="{FF2B5EF4-FFF2-40B4-BE49-F238E27FC236}">
+                  <a16:creationId xmlns:a16="http://schemas.microsoft.com/office/drawing/2014/main" id="{DC5A38D0-4F7B-45AF-A261-CE6A47A36E02}"/>
+                </a:ext>
+              </a:extLst>
+            </p:cNvPr>
+            <p:cNvSpPr txBox="1"/>
+            <p:nvPr/>
+          </p:nvSpPr>
+          <p:spPr>
+            <a:xfrm>
+              <a:off x="4563800" y="4649937"/>
+              <a:ext cx="923651" cy="276999"/>
+            </a:xfrm>
+            <a:prstGeom prst="rect">
+              <a:avLst/>
+            </a:prstGeom>
+            <a:noFill/>
+          </p:spPr>
+          <p:txBody>
+            <a:bodyPr wrap="none" rtlCol="0">
+              <a:spAutoFit/>
+            </a:bodyPr>
+            <a:lstStyle/>
+            <a:p>
+              <a:pPr marL="0" marR="0" lvl="0" indent="0" algn="l" defTabSz="914400" rtl="0" eaLnBrk="1" fontAlgn="auto" latinLnBrk="0" hangingPunct="1">
+                <a:lnSpc>
+                  <a:spcPct val="100000"/>
+                </a:lnSpc>
+                <a:spcBef>
+                  <a:spcPts val="0"/>
+                </a:spcBef>
+                <a:spcAft>
+                  <a:spcPts val="0"/>
+                </a:spcAft>
+                <a:buClrTx/>
+                <a:buSzTx/>
+                <a:buFontTx/>
+                <a:buNone/>
+                <a:tabLst/>
+                <a:defRPr/>
+              </a:pPr>
+              <a:r>
+                <a:rPr kumimoji="1" lang="en-US" altLang="ja-JP" sz="1200" b="0" i="0" u="none" strike="noStrike" kern="1200" cap="none" spc="0" normalizeH="0" baseline="0" noProof="0" dirty="0">
+                  <a:ln>
+                    <a:noFill/>
+                  </a:ln>
+                  <a:solidFill>
+                    <a:prstClr val="black"/>
+                  </a:solidFill>
+                  <a:effectLst/>
+                  <a:uLnTx/>
+                  <a:uFillTx/>
+                  <a:latin typeface="Calibri"/>
+                  <a:ea typeface="ＭＳ Ｐゴシック" panose="020B0600070205080204" pitchFamily="50" charset="-128"/>
+                  <a:cs typeface="+mn-cs"/>
+                </a:rPr>
+                <a:t>OSS </a:t>
+              </a:r>
+              <a:r>
+                <a:rPr kumimoji="1" lang="en-US" altLang="ja-JP" sz="1200" dirty="0">
+                  <a:solidFill>
+                    <a:prstClr val="black"/>
+                  </a:solidFill>
+                  <a:latin typeface="Calibri"/>
+                  <a:ea typeface="ＭＳ Ｐゴシック" panose="020B0600070205080204" pitchFamily="50" charset="-128"/>
+                </a:rPr>
+                <a:t>License</a:t>
+              </a:r>
+              <a:endParaRPr kumimoji="1" lang="ja-JP" altLang="en-US" sz="1200" b="0" i="0" u="none" strike="noStrike" kern="1200" cap="none" spc="0" normalizeH="0" baseline="0" noProof="0" dirty="0">
+                <a:ln>
+                  <a:noFill/>
+                </a:ln>
+                <a:solidFill>
+                  <a:prstClr val="black"/>
+                </a:solidFill>
+                <a:effectLst/>
+                <a:uLnTx/>
+                <a:uFillTx/>
+                <a:latin typeface="Calibri"/>
+                <a:ea typeface="ＭＳ Ｐゴシック" panose="020B0600070205080204" pitchFamily="50" charset="-128"/>
+                <a:cs typeface="+mn-cs"/>
+              </a:endParaRPr>
+            </a:p>
+          </p:txBody>
+        </p:sp>
+        <p:sp>
+          <p:nvSpPr>
+            <p:cNvPr id="81" name="テキスト ボックス 80">
+              <a:extLst>
+                <a:ext uri="{FF2B5EF4-FFF2-40B4-BE49-F238E27FC236}">
+                  <a16:creationId xmlns:a16="http://schemas.microsoft.com/office/drawing/2014/main" id="{0ED29373-205A-40FE-BB9B-F803B32095BB}"/>
+                </a:ext>
+              </a:extLst>
+            </p:cNvPr>
+            <p:cNvSpPr txBox="1"/>
+            <p:nvPr/>
+          </p:nvSpPr>
+          <p:spPr>
+            <a:xfrm>
+              <a:off x="2954830" y="5075280"/>
+              <a:ext cx="923651" cy="276999"/>
+            </a:xfrm>
+            <a:prstGeom prst="rect">
+              <a:avLst/>
+            </a:prstGeom>
+            <a:noFill/>
+          </p:spPr>
+          <p:txBody>
+            <a:bodyPr wrap="none" rtlCol="0">
+              <a:spAutoFit/>
+            </a:bodyPr>
+            <a:lstStyle/>
+            <a:p>
+              <a:pPr marL="0" marR="0" lvl="0" indent="0" algn="l" defTabSz="914400" rtl="0" eaLnBrk="1" fontAlgn="auto" latinLnBrk="0" hangingPunct="1">
+                <a:lnSpc>
+                  <a:spcPct val="100000"/>
+                </a:lnSpc>
+                <a:spcBef>
+                  <a:spcPts val="0"/>
+                </a:spcBef>
+                <a:spcAft>
+                  <a:spcPts val="0"/>
+                </a:spcAft>
+                <a:buClrTx/>
+                <a:buSzTx/>
+                <a:buFontTx/>
+                <a:buNone/>
+                <a:tabLst/>
+                <a:defRPr/>
+              </a:pPr>
+              <a:r>
+                <a:rPr kumimoji="1" lang="en-US" altLang="ja-JP" sz="1200" b="0" i="0" u="none" strike="noStrike" kern="1200" cap="none" spc="0" normalizeH="0" baseline="0" noProof="0" dirty="0">
+                  <a:ln>
+                    <a:noFill/>
+                  </a:ln>
+                  <a:solidFill>
+                    <a:prstClr val="black"/>
+                  </a:solidFill>
+                  <a:effectLst/>
+                  <a:uLnTx/>
+                  <a:uFillTx/>
+                  <a:latin typeface="Calibri"/>
+                  <a:ea typeface="ＭＳ Ｐゴシック" panose="020B0600070205080204" pitchFamily="50" charset="-128"/>
+                  <a:cs typeface="+mn-cs"/>
+                </a:rPr>
+                <a:t>OSS</a:t>
+              </a:r>
+              <a:r>
+                <a:rPr kumimoji="1" lang="ja-JP" altLang="en-US" sz="1200" dirty="0">
+                  <a:solidFill>
+                    <a:prstClr val="black"/>
+                  </a:solidFill>
+                  <a:latin typeface="Calibri"/>
+                  <a:ea typeface="ＭＳ Ｐゴシック" panose="020B0600070205080204" pitchFamily="50" charset="-128"/>
+                </a:rPr>
+                <a:t> </a:t>
+              </a:r>
+              <a:r>
+                <a:rPr kumimoji="1" lang="en-US" altLang="ja-JP" sz="1200" dirty="0">
+                  <a:solidFill>
+                    <a:prstClr val="black"/>
+                  </a:solidFill>
+                  <a:latin typeface="Calibri"/>
+                  <a:ea typeface="ＭＳ Ｐゴシック" panose="020B0600070205080204" pitchFamily="50" charset="-128"/>
+                </a:rPr>
+                <a:t>License</a:t>
+              </a:r>
+              <a:endParaRPr kumimoji="1" lang="ja-JP" altLang="en-US" sz="1200" b="0" i="0" u="none" strike="noStrike" kern="1200" cap="none" spc="0" normalizeH="0" baseline="0" noProof="0" dirty="0">
+                <a:ln>
+                  <a:noFill/>
+                </a:ln>
+                <a:solidFill>
+                  <a:prstClr val="black"/>
+                </a:solidFill>
+                <a:effectLst/>
+                <a:uLnTx/>
+                <a:uFillTx/>
+                <a:latin typeface="Calibri"/>
+                <a:ea typeface="ＭＳ Ｐゴシック" panose="020B0600070205080204" pitchFamily="50" charset="-128"/>
+                <a:cs typeface="+mn-cs"/>
+              </a:endParaRPr>
+            </a:p>
+          </p:txBody>
+        </p:sp>
+        <p:sp>
+          <p:nvSpPr>
+            <p:cNvPr id="55" name="四角形: 角を丸くする 54">
+              <a:extLst>
+                <a:ext uri="{FF2B5EF4-FFF2-40B4-BE49-F238E27FC236}">
+                  <a16:creationId xmlns:a16="http://schemas.microsoft.com/office/drawing/2014/main" id="{C41AF5F0-D940-43D9-BF35-BA72A71DA105}"/>
+                </a:ext>
+              </a:extLst>
+            </p:cNvPr>
+            <p:cNvSpPr/>
+            <p:nvPr/>
+          </p:nvSpPr>
+          <p:spPr>
+            <a:xfrm>
+              <a:off x="7044270" y="2548346"/>
+              <a:ext cx="739140" cy="1809305"/>
+            </a:xfrm>
+            <a:prstGeom prst="roundRect">
+              <a:avLst/>
+            </a:prstGeom>
+            <a:solidFill>
+              <a:srgbClr val="FFFF00"/>
+            </a:solidFill>
+            <a:ln>
+              <a:noFill/>
+            </a:ln>
+          </p:spPr>
+          <p:style>
+            <a:lnRef idx="2">
+              <a:schemeClr val="accent1">
+                <a:shade val="50000"/>
+              </a:schemeClr>
+            </a:lnRef>
+            <a:fillRef idx="1">
+              <a:schemeClr val="accent1"/>
+            </a:fillRef>
+            <a:effectRef idx="0">
+              <a:schemeClr val="accent1"/>
+            </a:effectRef>
+            <a:fontRef idx="minor">
+              <a:schemeClr val="lt1"/>
+            </a:fontRef>
+          </p:style>
+          <p:txBody>
+            <a:bodyPr rtlCol="0" anchor="ctr"/>
+            <a:lstStyle/>
+            <a:p>
+              <a:pPr marL="0" marR="0" lvl="0" indent="0" algn="ctr" defTabSz="914400" rtl="0" eaLnBrk="1" fontAlgn="auto" latinLnBrk="0" hangingPunct="1">
+                <a:lnSpc>
+                  <a:spcPct val="100000"/>
+                </a:lnSpc>
+                <a:spcBef>
+                  <a:spcPts val="0"/>
+                </a:spcBef>
+                <a:spcAft>
+                  <a:spcPts val="0"/>
+                </a:spcAft>
+                <a:buClrTx/>
+                <a:buSzTx/>
+                <a:buFontTx/>
+                <a:buNone/>
+                <a:tabLst/>
+                <a:defRPr/>
+              </a:pPr>
+              <a:r>
+                <a:rPr kumimoji="1" lang="en-US" altLang="ja-JP" sz="1200" dirty="0">
+                  <a:solidFill>
+                    <a:prstClr val="black"/>
+                  </a:solidFill>
+                  <a:latin typeface="Calibri"/>
+                  <a:ea typeface="ＭＳ Ｐゴシック" panose="020B0600070205080204" pitchFamily="50" charset="-128"/>
+                </a:rPr>
+                <a:t>Release</a:t>
+              </a:r>
+              <a:endParaRPr kumimoji="1" lang="ja-JP" altLang="en-US" sz="1400" b="0" i="0" u="none" strike="noStrike" kern="1200" cap="none" spc="0" normalizeH="0" baseline="0" noProof="0" dirty="0">
+                <a:ln>
+                  <a:noFill/>
+                </a:ln>
+                <a:solidFill>
+                  <a:prstClr val="black"/>
+                </a:solidFill>
+                <a:effectLst/>
+                <a:uLnTx/>
+                <a:uFillTx/>
+                <a:latin typeface="Calibri"/>
+                <a:ea typeface="ＭＳ Ｐゴシック" panose="020B0600070205080204" pitchFamily="50" charset="-128"/>
+                <a:cs typeface="+mn-cs"/>
+              </a:endParaRPr>
+            </a:p>
+          </p:txBody>
+        </p:sp>
+        <p:sp>
+          <p:nvSpPr>
+            <p:cNvPr id="59" name="四角形: 角を丸くする 58">
+              <a:extLst>
+                <a:ext uri="{FF2B5EF4-FFF2-40B4-BE49-F238E27FC236}">
+                  <a16:creationId xmlns:a16="http://schemas.microsoft.com/office/drawing/2014/main" id="{3DF67839-8CC9-444C-BA63-6CC611AFACAA}"/>
+                </a:ext>
+              </a:extLst>
+            </p:cNvPr>
+            <p:cNvSpPr/>
+            <p:nvPr/>
+          </p:nvSpPr>
+          <p:spPr>
+            <a:xfrm>
+              <a:off x="4836153" y="1537695"/>
+              <a:ext cx="739140" cy="372291"/>
+            </a:xfrm>
+            <a:prstGeom prst="roundRect">
+              <a:avLst>
+                <a:gd name="adj" fmla="val 16667"/>
+              </a:avLst>
+            </a:prstGeom>
+            <a:solidFill>
+              <a:srgbClr val="FFFF00"/>
+            </a:solidFill>
+            <a:ln>
+              <a:noFill/>
+            </a:ln>
+          </p:spPr>
+          <p:style>
+            <a:lnRef idx="2">
+              <a:schemeClr val="accent1">
+                <a:shade val="50000"/>
+              </a:schemeClr>
+            </a:lnRef>
+            <a:fillRef idx="1">
+              <a:schemeClr val="accent1"/>
+            </a:fillRef>
+            <a:effectRef idx="0">
+              <a:schemeClr val="accent1"/>
+            </a:effectRef>
+            <a:fontRef idx="minor">
+              <a:schemeClr val="lt1"/>
+            </a:fontRef>
+          </p:style>
+          <p:txBody>
+            <a:bodyPr rtlCol="0" anchor="ctr"/>
+            <a:lstStyle/>
+            <a:p>
+              <a:pPr marL="0" marR="0" lvl="0" indent="0" algn="ctr" defTabSz="914400" rtl="0" eaLnBrk="1" fontAlgn="auto" latinLnBrk="0" hangingPunct="1">
+                <a:lnSpc>
+                  <a:spcPct val="100000"/>
+                </a:lnSpc>
+                <a:spcBef>
+                  <a:spcPts val="0"/>
+                </a:spcBef>
+                <a:spcAft>
+                  <a:spcPts val="0"/>
+                </a:spcAft>
+                <a:buClrTx/>
+                <a:buSzTx/>
+                <a:buFontTx/>
+                <a:buNone/>
+                <a:tabLst/>
+                <a:defRPr/>
+              </a:pPr>
+              <a:r>
+                <a:rPr kumimoji="1" lang="en-US" altLang="ja-JP" sz="1600" b="0" i="0" u="none" strike="noStrike" kern="1200" cap="none" spc="0" normalizeH="0" baseline="0" noProof="0" dirty="0">
+                  <a:ln>
+                    <a:noFill/>
+                  </a:ln>
+                  <a:solidFill>
+                    <a:prstClr val="black"/>
+                  </a:solidFill>
+                  <a:effectLst/>
+                  <a:uLnTx/>
+                  <a:uFillTx/>
+                  <a:latin typeface="Calibri"/>
+                  <a:ea typeface="ＭＳ Ｐゴシック" panose="020B0600070205080204" pitchFamily="50" charset="-128"/>
+                  <a:cs typeface="+mn-cs"/>
+                </a:rPr>
+                <a:t>OSPO</a:t>
+              </a:r>
+              <a:endParaRPr kumimoji="1" lang="ja-JP" altLang="en-US" sz="1800" b="0" i="0" u="none" strike="noStrike" kern="1200" cap="none" spc="0" normalizeH="0" baseline="0" noProof="0" dirty="0">
+                <a:ln>
+                  <a:noFill/>
+                </a:ln>
+                <a:solidFill>
+                  <a:prstClr val="black"/>
+                </a:solidFill>
+                <a:effectLst/>
+                <a:uLnTx/>
+                <a:uFillTx/>
+                <a:latin typeface="Calibri"/>
+                <a:ea typeface="ＭＳ Ｐゴシック" panose="020B0600070205080204" pitchFamily="50" charset="-128"/>
+                <a:cs typeface="+mn-cs"/>
+              </a:endParaRPr>
+            </a:p>
+          </p:txBody>
+        </p:sp>
+        <p:sp>
+          <p:nvSpPr>
+            <p:cNvPr id="57" name="四角形: 角を丸くする 56">
+              <a:extLst>
+                <a:ext uri="{FF2B5EF4-FFF2-40B4-BE49-F238E27FC236}">
+                  <a16:creationId xmlns:a16="http://schemas.microsoft.com/office/drawing/2014/main" id="{4D366C3B-1956-4221-AE18-48E731385CCC}"/>
+                </a:ext>
+              </a:extLst>
+            </p:cNvPr>
+            <p:cNvSpPr/>
+            <p:nvPr/>
+          </p:nvSpPr>
+          <p:spPr>
+            <a:xfrm>
+              <a:off x="3859432" y="3715151"/>
+              <a:ext cx="891872" cy="680155"/>
+            </a:xfrm>
+            <a:prstGeom prst="roundRect">
+              <a:avLst/>
+            </a:prstGeom>
+            <a:solidFill>
+              <a:srgbClr val="FFFF00"/>
+            </a:solidFill>
+            <a:ln>
+              <a:noFill/>
+            </a:ln>
+          </p:spPr>
+          <p:style>
+            <a:lnRef idx="2">
+              <a:schemeClr val="accent1">
+                <a:shade val="50000"/>
+              </a:schemeClr>
+            </a:lnRef>
+            <a:fillRef idx="1">
+              <a:schemeClr val="accent1"/>
+            </a:fillRef>
+            <a:effectRef idx="0">
+              <a:schemeClr val="accent1"/>
+            </a:effectRef>
+            <a:fontRef idx="minor">
+              <a:schemeClr val="lt1"/>
+            </a:fontRef>
+          </p:style>
+          <p:txBody>
+            <a:bodyPr rtlCol="0" anchor="ctr"/>
+            <a:lstStyle/>
+            <a:p>
+              <a:pPr marL="0" marR="0" lvl="0" indent="0" algn="ctr" defTabSz="914400" rtl="0" eaLnBrk="1" fontAlgn="auto" latinLnBrk="0" hangingPunct="1">
+                <a:lnSpc>
+                  <a:spcPct val="100000"/>
+                </a:lnSpc>
+                <a:spcBef>
+                  <a:spcPts val="0"/>
+                </a:spcBef>
+                <a:spcAft>
+                  <a:spcPts val="0"/>
+                </a:spcAft>
+                <a:buClrTx/>
+                <a:buSzTx/>
+                <a:buFontTx/>
+                <a:buNone/>
+                <a:tabLst/>
+                <a:defRPr/>
+              </a:pPr>
+              <a:r>
+                <a:rPr kumimoji="1" lang="en-US" altLang="ja-JP" sz="1400" dirty="0">
+                  <a:solidFill>
+                    <a:prstClr val="black"/>
+                  </a:solidFill>
+                  <a:latin typeface="Calibri"/>
+                  <a:ea typeface="ＭＳ Ｐゴシック" panose="020B0600070205080204" pitchFamily="50" charset="-128"/>
+                </a:rPr>
+                <a:t>Inbound</a:t>
+              </a:r>
+              <a:endParaRPr kumimoji="1" lang="en-US" altLang="ja-JP" sz="1400" b="0" i="0" u="none" strike="noStrike" kern="1200" cap="none" spc="0" normalizeH="0" baseline="0" noProof="0" dirty="0">
+                <a:ln>
+                  <a:noFill/>
+                </a:ln>
+                <a:solidFill>
+                  <a:prstClr val="black"/>
+                </a:solidFill>
+                <a:effectLst/>
+                <a:uLnTx/>
+                <a:uFillTx/>
+                <a:latin typeface="Calibri"/>
+                <a:ea typeface="ＭＳ Ｐゴシック" panose="020B0600070205080204" pitchFamily="50" charset="-128"/>
+                <a:cs typeface="+mn-cs"/>
+              </a:endParaRPr>
+            </a:p>
+          </p:txBody>
+        </p:sp>
+        <p:sp>
+          <p:nvSpPr>
+            <p:cNvPr id="63" name="四角形: 角を丸くする 62">
+              <a:extLst>
+                <a:ext uri="{FF2B5EF4-FFF2-40B4-BE49-F238E27FC236}">
+                  <a16:creationId xmlns:a16="http://schemas.microsoft.com/office/drawing/2014/main" id="{C95BED48-E9D4-44D9-AC87-F6218A469675}"/>
+                </a:ext>
+              </a:extLst>
+            </p:cNvPr>
+            <p:cNvSpPr/>
+            <p:nvPr/>
+          </p:nvSpPr>
+          <p:spPr>
+            <a:xfrm>
+              <a:off x="3690929" y="2021715"/>
+              <a:ext cx="1003870" cy="372291"/>
+            </a:xfrm>
+            <a:prstGeom prst="roundRect">
+              <a:avLst/>
+            </a:prstGeom>
+            <a:solidFill>
+              <a:srgbClr val="FFFF00"/>
+            </a:solidFill>
+            <a:ln>
+              <a:noFill/>
+            </a:ln>
+          </p:spPr>
+          <p:style>
+            <a:lnRef idx="2">
+              <a:schemeClr val="accent1">
+                <a:shade val="50000"/>
+              </a:schemeClr>
+            </a:lnRef>
+            <a:fillRef idx="1">
+              <a:schemeClr val="accent1"/>
+            </a:fillRef>
+            <a:effectRef idx="0">
+              <a:schemeClr val="accent1"/>
+            </a:effectRef>
+            <a:fontRef idx="minor">
+              <a:schemeClr val="lt1"/>
+            </a:fontRef>
+          </p:style>
+          <p:txBody>
+            <a:bodyPr rtlCol="0" anchor="ctr"/>
+            <a:lstStyle/>
+            <a:p>
+              <a:pPr marL="0" marR="0" lvl="0" indent="0" algn="ctr" defTabSz="914400" rtl="0" eaLnBrk="1" fontAlgn="auto" latinLnBrk="0" hangingPunct="1">
+                <a:lnSpc>
+                  <a:spcPct val="100000"/>
+                </a:lnSpc>
+                <a:spcBef>
+                  <a:spcPts val="0"/>
+                </a:spcBef>
+                <a:spcAft>
+                  <a:spcPts val="0"/>
+                </a:spcAft>
+                <a:buClrTx/>
+                <a:buSzTx/>
+                <a:buFontTx/>
+                <a:buNone/>
+                <a:tabLst/>
+                <a:defRPr/>
+              </a:pPr>
+              <a:r>
+                <a:rPr kumimoji="1" lang="en-US" altLang="ja-JP" sz="1200" b="0" i="0" u="none" strike="noStrike" kern="1200" cap="none" spc="0" normalizeH="0" baseline="0" noProof="0" dirty="0">
+                  <a:ln>
+                    <a:noFill/>
+                  </a:ln>
+                  <a:solidFill>
+                    <a:prstClr val="black"/>
+                  </a:solidFill>
+                  <a:effectLst/>
+                  <a:uLnTx/>
+                  <a:uFillTx/>
+                  <a:latin typeface="Calibri"/>
+                  <a:ea typeface="ＭＳ Ｐゴシック" panose="020B0600070205080204" pitchFamily="50" charset="-128"/>
+                  <a:cs typeface="+mn-cs"/>
+                </a:rPr>
+                <a:t>OSS</a:t>
+              </a:r>
+              <a:r>
+                <a:rPr kumimoji="1" lang="ja-JP" altLang="en-US" sz="1200" b="0" i="0" u="none" strike="noStrike" kern="1200" cap="none" spc="0" normalizeH="0" baseline="0" noProof="0" dirty="0">
+                  <a:ln>
+                    <a:noFill/>
+                  </a:ln>
+                  <a:solidFill>
+                    <a:prstClr val="black"/>
+                  </a:solidFill>
+                  <a:effectLst/>
+                  <a:uLnTx/>
+                  <a:uFillTx/>
+                  <a:latin typeface="Calibri"/>
+                  <a:ea typeface="ＭＳ Ｐゴシック" panose="020B0600070205080204" pitchFamily="50" charset="-128"/>
+                  <a:cs typeface="+mn-cs"/>
+                </a:rPr>
+                <a:t> </a:t>
+              </a:r>
+              <a:r>
+                <a:rPr kumimoji="1" lang="en-US" altLang="ja-JP" sz="1200" b="0" i="0" u="none" strike="noStrike" kern="1200" cap="none" spc="0" normalizeH="0" baseline="0" noProof="0" dirty="0">
+                  <a:ln>
+                    <a:noFill/>
+                  </a:ln>
+                  <a:solidFill>
+                    <a:prstClr val="black"/>
+                  </a:solidFill>
+                  <a:effectLst/>
+                  <a:uLnTx/>
+                  <a:uFillTx/>
+                  <a:latin typeface="Calibri"/>
+                  <a:ea typeface="ＭＳ Ｐゴシック" panose="020B0600070205080204" pitchFamily="50" charset="-128"/>
+                  <a:cs typeface="+mn-cs"/>
+                </a:rPr>
+                <a:t>License</a:t>
+              </a:r>
+            </a:p>
+          </p:txBody>
+        </p:sp>
+        <p:sp>
+          <p:nvSpPr>
+            <p:cNvPr id="65" name="四角形: 角を丸くする 64">
+              <a:extLst>
+                <a:ext uri="{FF2B5EF4-FFF2-40B4-BE49-F238E27FC236}">
+                  <a16:creationId xmlns:a16="http://schemas.microsoft.com/office/drawing/2014/main" id="{8EB9B262-AFD4-4E7E-8236-F15BB3F0ED12}"/>
+                </a:ext>
+              </a:extLst>
+            </p:cNvPr>
+            <p:cNvSpPr/>
+            <p:nvPr/>
+          </p:nvSpPr>
+          <p:spPr>
+            <a:xfrm>
+              <a:off x="4030294" y="509744"/>
+              <a:ext cx="1220794" cy="372291"/>
+            </a:xfrm>
+            <a:prstGeom prst="roundRect">
+              <a:avLst/>
+            </a:prstGeom>
+            <a:solidFill>
+              <a:srgbClr val="FFFF00"/>
+            </a:solidFill>
+            <a:ln>
+              <a:noFill/>
+            </a:ln>
+          </p:spPr>
+          <p:style>
+            <a:lnRef idx="2">
+              <a:schemeClr val="accent1">
+                <a:shade val="50000"/>
+              </a:schemeClr>
+            </a:lnRef>
+            <a:fillRef idx="1">
+              <a:schemeClr val="accent1"/>
+            </a:fillRef>
+            <a:effectRef idx="0">
+              <a:schemeClr val="accent1"/>
+            </a:effectRef>
+            <a:fontRef idx="minor">
+              <a:schemeClr val="lt1"/>
+            </a:fontRef>
+          </p:style>
+          <p:txBody>
+            <a:bodyPr rtlCol="0" anchor="ctr"/>
+            <a:lstStyle/>
+            <a:p>
+              <a:pPr marL="0" marR="0" lvl="0" indent="0" algn="ctr" defTabSz="914400" rtl="0" eaLnBrk="1" fontAlgn="auto" latinLnBrk="0" hangingPunct="1">
+                <a:lnSpc>
+                  <a:spcPct val="100000"/>
+                </a:lnSpc>
+                <a:spcBef>
+                  <a:spcPts val="0"/>
+                </a:spcBef>
+                <a:spcAft>
+                  <a:spcPts val="0"/>
+                </a:spcAft>
+                <a:buClrTx/>
+                <a:buSzTx/>
+                <a:buFontTx/>
+                <a:buNone/>
+                <a:tabLst/>
+                <a:defRPr/>
+              </a:pPr>
+              <a:r>
+                <a:rPr kumimoji="1" lang="en-US" altLang="ja-JP" sz="1400" dirty="0">
+                  <a:solidFill>
+                    <a:prstClr val="black"/>
+                  </a:solidFill>
+                  <a:latin typeface="Calibri"/>
+                  <a:ea typeface="ＭＳ Ｐゴシック" panose="020B0600070205080204" pitchFamily="50" charset="-128"/>
+                </a:rPr>
+                <a:t>Management</a:t>
+              </a:r>
+            </a:p>
+          </p:txBody>
+        </p:sp>
+        <p:sp>
+          <p:nvSpPr>
+            <p:cNvPr id="67" name="四角形: 角を丸くする 66">
+              <a:extLst>
+                <a:ext uri="{FF2B5EF4-FFF2-40B4-BE49-F238E27FC236}">
+                  <a16:creationId xmlns:a16="http://schemas.microsoft.com/office/drawing/2014/main" id="{7EA2D299-01F6-4EE7-80C7-ACB576CF76B1}"/>
+                </a:ext>
+              </a:extLst>
+            </p:cNvPr>
+            <p:cNvSpPr/>
+            <p:nvPr/>
+          </p:nvSpPr>
+          <p:spPr>
+            <a:xfrm>
+              <a:off x="4855771" y="5021408"/>
+              <a:ext cx="1055956" cy="372291"/>
+            </a:xfrm>
+            <a:prstGeom prst="roundRect">
+              <a:avLst/>
+            </a:prstGeom>
+            <a:solidFill>
+              <a:srgbClr val="FFFF00"/>
+            </a:solidFill>
+            <a:ln>
+              <a:noFill/>
+            </a:ln>
+          </p:spPr>
+          <p:style>
+            <a:lnRef idx="2">
+              <a:schemeClr val="accent1">
+                <a:shade val="50000"/>
+              </a:schemeClr>
+            </a:lnRef>
+            <a:fillRef idx="1">
+              <a:schemeClr val="accent1"/>
+            </a:fillRef>
+            <a:effectRef idx="0">
+              <a:schemeClr val="accent1"/>
+            </a:effectRef>
+            <a:fontRef idx="minor">
+              <a:schemeClr val="lt1"/>
+            </a:fontRef>
+          </p:style>
+          <p:txBody>
+            <a:bodyPr rtlCol="0" anchor="ctr"/>
+            <a:lstStyle/>
+            <a:p>
+              <a:pPr marL="0" marR="0" lvl="0" indent="0" algn="ctr" defTabSz="914400" rtl="0" eaLnBrk="1" fontAlgn="auto" latinLnBrk="0" hangingPunct="1">
+                <a:lnSpc>
+                  <a:spcPct val="100000"/>
+                </a:lnSpc>
+                <a:spcBef>
+                  <a:spcPts val="0"/>
+                </a:spcBef>
+                <a:spcAft>
+                  <a:spcPts val="0"/>
+                </a:spcAft>
+                <a:buClrTx/>
+                <a:buSzTx/>
+                <a:buFontTx/>
+                <a:buNone/>
+                <a:tabLst/>
+                <a:defRPr/>
+              </a:pPr>
+              <a:r>
+                <a:rPr kumimoji="1" lang="en-US" altLang="ja-JP" sz="1100" dirty="0">
+                  <a:solidFill>
+                    <a:prstClr val="black"/>
+                  </a:solidFill>
+                  <a:latin typeface="Calibri"/>
+                  <a:ea typeface="ＭＳ Ｐゴシック" panose="020B0600070205080204" pitchFamily="50" charset="-128"/>
+                </a:rPr>
+                <a:t>Community</a:t>
+              </a:r>
+              <a:r>
+                <a:rPr kumimoji="1" lang="ja-JP" altLang="en-US" sz="1100" dirty="0">
+                  <a:solidFill>
+                    <a:prstClr val="black"/>
+                  </a:solidFill>
+                  <a:latin typeface="Calibri"/>
+                  <a:ea typeface="ＭＳ Ｐゴシック" panose="020B0600070205080204" pitchFamily="50" charset="-128"/>
+                </a:rPr>
+                <a:t> </a:t>
+              </a:r>
+              <a:r>
+                <a:rPr kumimoji="1" lang="en-US" altLang="ja-JP" sz="1100" dirty="0">
+                  <a:solidFill>
+                    <a:prstClr val="black"/>
+                  </a:solidFill>
+                  <a:latin typeface="Calibri"/>
+                  <a:ea typeface="ＭＳ Ｐゴシック" panose="020B0600070205080204" pitchFamily="50" charset="-128"/>
+                </a:rPr>
+                <a:t>Liaison</a:t>
+              </a:r>
+              <a:endParaRPr kumimoji="1" lang="ja-JP" altLang="en-US" sz="1100" b="0" i="0" u="none" strike="noStrike" kern="1200" cap="none" spc="0" normalizeH="0" baseline="0" noProof="0" dirty="0">
+                <a:ln>
+                  <a:noFill/>
+                </a:ln>
+                <a:solidFill>
+                  <a:prstClr val="black"/>
+                </a:solidFill>
+                <a:effectLst/>
+                <a:uLnTx/>
+                <a:uFillTx/>
+                <a:latin typeface="Calibri"/>
+                <a:ea typeface="ＭＳ Ｐゴシック" panose="020B0600070205080204" pitchFamily="50" charset="-128"/>
+                <a:cs typeface="+mn-cs"/>
+              </a:endParaRPr>
+            </a:p>
+          </p:txBody>
+        </p:sp>
+        <p:sp>
+          <p:nvSpPr>
+            <p:cNvPr id="68" name="四角形: 角を丸くする 67">
+              <a:extLst>
+                <a:ext uri="{FF2B5EF4-FFF2-40B4-BE49-F238E27FC236}">
+                  <a16:creationId xmlns:a16="http://schemas.microsoft.com/office/drawing/2014/main" id="{4DBA374D-4E39-4DCE-9553-510B87A65F96}"/>
+                </a:ext>
+              </a:extLst>
+            </p:cNvPr>
+            <p:cNvSpPr/>
+            <p:nvPr/>
+          </p:nvSpPr>
+          <p:spPr>
+            <a:xfrm>
+              <a:off x="5947364" y="2002782"/>
+              <a:ext cx="1094405" cy="372291"/>
+            </a:xfrm>
+            <a:prstGeom prst="roundRect">
+              <a:avLst/>
+            </a:prstGeom>
+            <a:solidFill>
+              <a:srgbClr val="FFFF00"/>
+            </a:solidFill>
+            <a:ln>
+              <a:noFill/>
+            </a:ln>
+          </p:spPr>
+          <p:style>
+            <a:lnRef idx="2">
+              <a:schemeClr val="accent1">
+                <a:shade val="50000"/>
+              </a:schemeClr>
+            </a:lnRef>
+            <a:fillRef idx="1">
+              <a:schemeClr val="accent1"/>
+            </a:fillRef>
+            <a:effectRef idx="0">
+              <a:schemeClr val="accent1"/>
+            </a:effectRef>
+            <a:fontRef idx="minor">
+              <a:schemeClr val="lt1"/>
+            </a:fontRef>
+          </p:style>
+          <p:txBody>
+            <a:bodyPr rtlCol="0" anchor="ctr"/>
+            <a:lstStyle/>
+            <a:p>
+              <a:pPr marL="0" marR="0" lvl="0" indent="0" algn="ctr" defTabSz="914400" rtl="0" eaLnBrk="1" fontAlgn="auto" latinLnBrk="0" hangingPunct="1">
+                <a:lnSpc>
+                  <a:spcPct val="100000"/>
+                </a:lnSpc>
+                <a:spcBef>
+                  <a:spcPts val="0"/>
+                </a:spcBef>
+                <a:spcAft>
+                  <a:spcPts val="0"/>
+                </a:spcAft>
+                <a:buClrTx/>
+                <a:buSzTx/>
+                <a:buFontTx/>
+                <a:buNone/>
+                <a:tabLst/>
+                <a:defRPr/>
+              </a:pPr>
+              <a:r>
+                <a:rPr kumimoji="1" lang="en-US" altLang="ja-JP" sz="1400" dirty="0">
+                  <a:solidFill>
+                    <a:prstClr val="black"/>
+                  </a:solidFill>
+                  <a:latin typeface="Calibri"/>
+                  <a:ea typeface="ＭＳ Ｐゴシック" panose="020B0600070205080204" pitchFamily="50" charset="-128"/>
+                </a:rPr>
+                <a:t>Engineering</a:t>
+              </a:r>
+              <a:endParaRPr kumimoji="1" lang="ja-JP" altLang="en-US" sz="1400" b="0" i="0" u="none" strike="noStrike" kern="1200" cap="none" spc="0" normalizeH="0" baseline="0" noProof="0" dirty="0">
+                <a:ln>
+                  <a:noFill/>
+                </a:ln>
+                <a:solidFill>
+                  <a:prstClr val="black"/>
+                </a:solidFill>
+                <a:effectLst/>
+                <a:uLnTx/>
+                <a:uFillTx/>
+                <a:latin typeface="Calibri"/>
+                <a:ea typeface="ＭＳ Ｐゴシック" panose="020B0600070205080204" pitchFamily="50" charset="-128"/>
+                <a:cs typeface="+mn-cs"/>
+              </a:endParaRPr>
+            </a:p>
+          </p:txBody>
+        </p:sp>
+        <p:sp>
+          <p:nvSpPr>
+            <p:cNvPr id="69" name="四角形: 角を丸くする 68">
+              <a:extLst>
+                <a:ext uri="{FF2B5EF4-FFF2-40B4-BE49-F238E27FC236}">
+                  <a16:creationId xmlns:a16="http://schemas.microsoft.com/office/drawing/2014/main" id="{66FD5A74-491E-4F0A-806B-3C2DCCB78CB2}"/>
+                </a:ext>
+              </a:extLst>
+            </p:cNvPr>
+            <p:cNvSpPr/>
+            <p:nvPr/>
+          </p:nvSpPr>
+          <p:spPr>
+            <a:xfrm>
+              <a:off x="6616709" y="1537694"/>
+              <a:ext cx="970613" cy="372291"/>
+            </a:xfrm>
+            <a:prstGeom prst="roundRect">
+              <a:avLst/>
+            </a:prstGeom>
+            <a:solidFill>
+              <a:srgbClr val="FFFF00"/>
+            </a:solidFill>
+            <a:ln>
+              <a:noFill/>
+            </a:ln>
+          </p:spPr>
+          <p:style>
+            <a:lnRef idx="2">
+              <a:schemeClr val="accent1">
+                <a:shade val="50000"/>
+              </a:schemeClr>
+            </a:lnRef>
+            <a:fillRef idx="1">
+              <a:schemeClr val="accent1"/>
+            </a:fillRef>
+            <a:effectRef idx="0">
+              <a:schemeClr val="accent1"/>
+            </a:effectRef>
+            <a:fontRef idx="minor">
+              <a:schemeClr val="lt1"/>
+            </a:fontRef>
+          </p:style>
+          <p:txBody>
+            <a:bodyPr rtlCol="0" anchor="ctr"/>
+            <a:lstStyle/>
+            <a:p>
+              <a:pPr marL="0" marR="0" lvl="0" indent="0" algn="ctr" defTabSz="914400" rtl="0" eaLnBrk="1" fontAlgn="auto" latinLnBrk="0" hangingPunct="1">
+                <a:lnSpc>
+                  <a:spcPct val="100000"/>
+                </a:lnSpc>
+                <a:spcBef>
+                  <a:spcPts val="0"/>
+                </a:spcBef>
+                <a:spcAft>
+                  <a:spcPts val="0"/>
+                </a:spcAft>
+                <a:buClrTx/>
+                <a:buSzTx/>
+                <a:buFontTx/>
+                <a:buNone/>
+                <a:tabLst/>
+                <a:defRPr/>
+              </a:pPr>
+              <a:r>
+                <a:rPr kumimoji="1" lang="en-US" altLang="ja-JP" sz="1400" dirty="0">
+                  <a:solidFill>
+                    <a:prstClr val="black"/>
+                  </a:solidFill>
+                  <a:latin typeface="Calibri"/>
+                  <a:ea typeface="ＭＳ Ｐゴシック" panose="020B0600070205080204" pitchFamily="50" charset="-128"/>
+                </a:rPr>
+                <a:t>Education</a:t>
+              </a:r>
+              <a:endParaRPr kumimoji="1" lang="ja-JP" altLang="en-US" sz="1400" b="0" i="0" u="none" strike="noStrike" kern="1200" cap="none" spc="0" normalizeH="0" baseline="0" noProof="0" dirty="0">
+                <a:ln>
+                  <a:noFill/>
+                </a:ln>
+                <a:solidFill>
+                  <a:prstClr val="black"/>
+                </a:solidFill>
+                <a:effectLst/>
+                <a:uLnTx/>
+                <a:uFillTx/>
+                <a:latin typeface="Calibri"/>
+                <a:ea typeface="ＭＳ Ｐゴシック" panose="020B0600070205080204" pitchFamily="50" charset="-128"/>
+                <a:cs typeface="+mn-cs"/>
+              </a:endParaRPr>
+            </a:p>
+          </p:txBody>
+        </p:sp>
+        <p:sp>
+          <p:nvSpPr>
+            <p:cNvPr id="71" name="四角形: 角を丸くする 70">
+              <a:extLst>
+                <a:ext uri="{FF2B5EF4-FFF2-40B4-BE49-F238E27FC236}">
+                  <a16:creationId xmlns:a16="http://schemas.microsoft.com/office/drawing/2014/main" id="{CCF148FC-5627-4720-BAFA-4F7565168BB7}"/>
+                </a:ext>
+              </a:extLst>
+            </p:cNvPr>
+            <p:cNvSpPr/>
+            <p:nvPr/>
+          </p:nvSpPr>
+          <p:spPr>
+            <a:xfrm>
+              <a:off x="3682236" y="978591"/>
+              <a:ext cx="1108650" cy="424643"/>
+            </a:xfrm>
+            <a:prstGeom prst="roundRect">
+              <a:avLst/>
+            </a:prstGeom>
+            <a:solidFill>
+              <a:srgbClr val="FFFF00"/>
+            </a:solidFill>
+            <a:ln>
+              <a:noFill/>
+            </a:ln>
+          </p:spPr>
+          <p:style>
+            <a:lnRef idx="2">
+              <a:schemeClr val="accent1">
+                <a:shade val="50000"/>
+              </a:schemeClr>
+            </a:lnRef>
+            <a:fillRef idx="1">
+              <a:schemeClr val="accent1"/>
+            </a:fillRef>
+            <a:effectRef idx="0">
+              <a:schemeClr val="accent1"/>
+            </a:effectRef>
+            <a:fontRef idx="minor">
+              <a:schemeClr val="lt1"/>
+            </a:fontRef>
+          </p:style>
+          <p:txBody>
+            <a:bodyPr rtlCol="0" anchor="ctr"/>
+            <a:lstStyle/>
+            <a:p>
+              <a:pPr marL="0" marR="0" lvl="0" indent="0" algn="ctr" defTabSz="914400" rtl="0" eaLnBrk="1" fontAlgn="auto" latinLnBrk="0" hangingPunct="1">
+                <a:lnSpc>
+                  <a:spcPct val="100000"/>
+                </a:lnSpc>
+                <a:spcBef>
+                  <a:spcPts val="0"/>
+                </a:spcBef>
+                <a:spcAft>
+                  <a:spcPts val="0"/>
+                </a:spcAft>
+                <a:buClrTx/>
+                <a:buSzTx/>
+                <a:buFontTx/>
+                <a:buNone/>
+                <a:tabLst/>
+                <a:defRPr/>
+              </a:pPr>
+              <a:r>
+                <a:rPr kumimoji="1" lang="en-US" altLang="ja-JP" sz="1400" dirty="0">
+                  <a:solidFill>
+                    <a:prstClr val="black"/>
+                  </a:solidFill>
+                  <a:latin typeface="Calibri"/>
+                  <a:ea typeface="ＭＳ Ｐゴシック" panose="020B0600070205080204" pitchFamily="50" charset="-128"/>
+                </a:rPr>
+                <a:t>Dev. </a:t>
+              </a:r>
+              <a:r>
+                <a:rPr kumimoji="1" lang="en-US" altLang="ja-JP" sz="1400" dirty="0" err="1">
+                  <a:solidFill>
+                    <a:prstClr val="black"/>
+                  </a:solidFill>
+                  <a:latin typeface="Calibri"/>
+                  <a:ea typeface="ＭＳ Ｐゴシック" panose="020B0600070205080204" pitchFamily="50" charset="-128"/>
+                </a:rPr>
+                <a:t>Enviroment</a:t>
+              </a:r>
+              <a:endParaRPr kumimoji="1" lang="ja-JP" altLang="en-US" sz="1400" b="0" i="0" u="none" strike="noStrike" kern="1200" cap="none" spc="0" normalizeH="0" baseline="0" noProof="0" dirty="0">
+                <a:ln>
+                  <a:noFill/>
+                </a:ln>
+                <a:solidFill>
+                  <a:prstClr val="black"/>
+                </a:solidFill>
+                <a:effectLst/>
+                <a:uLnTx/>
+                <a:uFillTx/>
+                <a:latin typeface="Calibri"/>
+                <a:ea typeface="ＭＳ Ｐゴシック" panose="020B0600070205080204" pitchFamily="50" charset="-128"/>
+                <a:cs typeface="+mn-cs"/>
+              </a:endParaRPr>
+            </a:p>
+          </p:txBody>
+        </p:sp>
+        <p:sp>
+          <p:nvSpPr>
+            <p:cNvPr id="73" name="四角形: 角を丸くする 72">
+              <a:extLst>
+                <a:ext uri="{FF2B5EF4-FFF2-40B4-BE49-F238E27FC236}">
+                  <a16:creationId xmlns:a16="http://schemas.microsoft.com/office/drawing/2014/main" id="{D90D6A46-98D1-47E6-AFEA-79E8B99D10C2}"/>
+                </a:ext>
+              </a:extLst>
+            </p:cNvPr>
+            <p:cNvSpPr/>
+            <p:nvPr/>
+          </p:nvSpPr>
+          <p:spPr>
+            <a:xfrm>
+              <a:off x="4855771" y="980667"/>
+              <a:ext cx="1075887" cy="436627"/>
+            </a:xfrm>
+            <a:prstGeom prst="roundRect">
+              <a:avLst/>
+            </a:prstGeom>
+            <a:solidFill>
+              <a:srgbClr val="FFFF00"/>
+            </a:solidFill>
+            <a:ln>
+              <a:noFill/>
+            </a:ln>
+          </p:spPr>
+          <p:style>
+            <a:lnRef idx="2">
+              <a:schemeClr val="accent1">
+                <a:shade val="50000"/>
+              </a:schemeClr>
+            </a:lnRef>
+            <a:fillRef idx="1">
+              <a:schemeClr val="accent1"/>
+            </a:fillRef>
+            <a:effectRef idx="0">
+              <a:schemeClr val="accent1"/>
+            </a:effectRef>
+            <a:fontRef idx="minor">
+              <a:schemeClr val="lt1"/>
+            </a:fontRef>
+          </p:style>
+          <p:txBody>
+            <a:bodyPr rtlCol="0" anchor="ctr"/>
+            <a:lstStyle/>
+            <a:p>
+              <a:pPr marL="0" marR="0" lvl="0" indent="0" algn="ctr" defTabSz="914400" rtl="0" eaLnBrk="1" fontAlgn="auto" latinLnBrk="0" hangingPunct="1">
+                <a:lnSpc>
+                  <a:spcPct val="100000"/>
+                </a:lnSpc>
+                <a:spcBef>
+                  <a:spcPts val="0"/>
+                </a:spcBef>
+                <a:spcAft>
+                  <a:spcPts val="0"/>
+                </a:spcAft>
+                <a:buClrTx/>
+                <a:buSzTx/>
+                <a:buFontTx/>
+                <a:buNone/>
+                <a:tabLst/>
+                <a:defRPr/>
+              </a:pPr>
+              <a:r>
+                <a:rPr kumimoji="1" lang="en-US" altLang="ja-JP" sz="1400" dirty="0">
+                  <a:solidFill>
+                    <a:prstClr val="black"/>
+                  </a:solidFill>
+                  <a:latin typeface="Calibri"/>
+                  <a:ea typeface="ＭＳ Ｐゴシック" panose="020B0600070205080204" pitchFamily="50" charset="-128"/>
+                </a:rPr>
+                <a:t>Product Planning</a:t>
+              </a:r>
+              <a:endParaRPr kumimoji="1" lang="ja-JP" altLang="en-US" sz="1400" b="0" i="0" u="none" strike="noStrike" kern="1200" cap="none" spc="0" normalizeH="0" baseline="0" noProof="0" dirty="0">
+                <a:ln>
+                  <a:noFill/>
+                </a:ln>
+                <a:solidFill>
+                  <a:prstClr val="black"/>
+                </a:solidFill>
+                <a:effectLst/>
+                <a:uLnTx/>
+                <a:uFillTx/>
+                <a:latin typeface="Calibri"/>
+                <a:ea typeface="ＭＳ Ｐゴシック" panose="020B0600070205080204" pitchFamily="50" charset="-128"/>
+                <a:cs typeface="+mn-cs"/>
+              </a:endParaRPr>
+            </a:p>
+          </p:txBody>
+        </p:sp>
+        <p:sp>
+          <p:nvSpPr>
+            <p:cNvPr id="77" name="四角形: 角を丸くする 76">
+              <a:extLst>
+                <a:ext uri="{FF2B5EF4-FFF2-40B4-BE49-F238E27FC236}">
+                  <a16:creationId xmlns:a16="http://schemas.microsoft.com/office/drawing/2014/main" id="{51A0DB07-3DCF-4F5A-A83A-D86AE6E7CBF2}"/>
+                </a:ext>
+              </a:extLst>
+            </p:cNvPr>
+            <p:cNvSpPr/>
+            <p:nvPr/>
+          </p:nvSpPr>
+          <p:spPr>
+            <a:xfrm>
+              <a:off x="6016785" y="994744"/>
+              <a:ext cx="1229034" cy="422550"/>
+            </a:xfrm>
+            <a:prstGeom prst="roundRect">
+              <a:avLst/>
+            </a:prstGeom>
+            <a:solidFill>
+              <a:srgbClr val="FFFF00"/>
+            </a:solidFill>
+            <a:ln>
+              <a:noFill/>
+            </a:ln>
+          </p:spPr>
+          <p:style>
+            <a:lnRef idx="2">
+              <a:schemeClr val="accent1">
+                <a:shade val="50000"/>
+              </a:schemeClr>
+            </a:lnRef>
+            <a:fillRef idx="1">
+              <a:schemeClr val="accent1"/>
+            </a:fillRef>
+            <a:effectRef idx="0">
+              <a:schemeClr val="accent1"/>
+            </a:effectRef>
+            <a:fontRef idx="minor">
+              <a:schemeClr val="lt1"/>
+            </a:fontRef>
+          </p:style>
+          <p:txBody>
+            <a:bodyPr rtlCol="0" anchor="ctr"/>
+            <a:lstStyle/>
+            <a:p>
+              <a:pPr marL="0" marR="0" lvl="0" indent="0" algn="ctr" defTabSz="914400" rtl="0" eaLnBrk="1" fontAlgn="auto" latinLnBrk="0" hangingPunct="1">
+                <a:lnSpc>
+                  <a:spcPct val="100000"/>
+                </a:lnSpc>
+                <a:spcBef>
+                  <a:spcPts val="0"/>
+                </a:spcBef>
+                <a:spcAft>
+                  <a:spcPts val="0"/>
+                </a:spcAft>
+                <a:buClrTx/>
+                <a:buSzTx/>
+                <a:buFontTx/>
+                <a:buNone/>
+                <a:tabLst/>
+                <a:defRPr/>
+              </a:pPr>
+              <a:r>
+                <a:rPr kumimoji="1" lang="en-US" altLang="ja-JP" sz="1400" b="0" i="0" u="none" strike="noStrike" kern="1200" cap="none" spc="0" normalizeH="0" baseline="0" noProof="0" dirty="0">
+                  <a:ln>
+                    <a:noFill/>
+                  </a:ln>
+                  <a:solidFill>
+                    <a:prstClr val="black"/>
+                  </a:solidFill>
+                  <a:effectLst/>
+                  <a:uLnTx/>
+                  <a:uFillTx/>
+                  <a:latin typeface="Calibri"/>
+                  <a:ea typeface="ＭＳ Ｐゴシック" panose="020B0600070205080204" pitchFamily="50" charset="-128"/>
+                  <a:cs typeface="+mn-cs"/>
+                </a:rPr>
+                <a:t>BOM</a:t>
+              </a:r>
+            </a:p>
+            <a:p>
+              <a:pPr marL="0" marR="0" lvl="0" indent="0" algn="ctr" defTabSz="914400" rtl="0" eaLnBrk="1" fontAlgn="auto" latinLnBrk="0" hangingPunct="1">
+                <a:lnSpc>
+                  <a:spcPct val="100000"/>
+                </a:lnSpc>
+                <a:spcBef>
+                  <a:spcPts val="0"/>
+                </a:spcBef>
+                <a:spcAft>
+                  <a:spcPts val="0"/>
+                </a:spcAft>
+                <a:buClrTx/>
+                <a:buSzTx/>
+                <a:buFontTx/>
+                <a:buNone/>
+                <a:tabLst/>
+                <a:defRPr/>
+              </a:pPr>
+              <a:r>
+                <a:rPr kumimoji="1" lang="en-US" altLang="ja-JP" sz="1400" dirty="0">
+                  <a:solidFill>
+                    <a:prstClr val="black"/>
+                  </a:solidFill>
+                  <a:latin typeface="Calibri"/>
+                  <a:ea typeface="ＭＳ Ｐゴシック" panose="020B0600070205080204" pitchFamily="50" charset="-128"/>
+                </a:rPr>
+                <a:t>Management</a:t>
+              </a:r>
+              <a:endParaRPr kumimoji="1" lang="ja-JP" altLang="en-US" sz="1400" b="0" i="0" u="none" strike="noStrike" kern="1200" cap="none" spc="0" normalizeH="0" baseline="0" noProof="0" dirty="0">
+                <a:ln>
+                  <a:noFill/>
+                </a:ln>
+                <a:solidFill>
+                  <a:prstClr val="black"/>
+                </a:solidFill>
+                <a:effectLst/>
+                <a:uLnTx/>
+                <a:uFillTx/>
+                <a:latin typeface="Calibri"/>
+                <a:ea typeface="ＭＳ Ｐゴシック" panose="020B0600070205080204" pitchFamily="50" charset="-128"/>
+                <a:cs typeface="+mn-cs"/>
+              </a:endParaRPr>
+            </a:p>
+          </p:txBody>
+        </p:sp>
+        <p:sp>
+          <p:nvSpPr>
+            <p:cNvPr id="79" name="四角形: 角を丸くする 78">
+              <a:extLst>
+                <a:ext uri="{FF2B5EF4-FFF2-40B4-BE49-F238E27FC236}">
+                  <a16:creationId xmlns:a16="http://schemas.microsoft.com/office/drawing/2014/main" id="{4AECB53A-017B-4D5C-92BA-ED8AFD099673}"/>
+                </a:ext>
+              </a:extLst>
+            </p:cNvPr>
+            <p:cNvSpPr/>
+            <p:nvPr/>
+          </p:nvSpPr>
+          <p:spPr>
+            <a:xfrm>
+              <a:off x="6631301" y="4401778"/>
+              <a:ext cx="1161353" cy="372291"/>
+            </a:xfrm>
+            <a:prstGeom prst="roundRect">
+              <a:avLst/>
+            </a:prstGeom>
+            <a:solidFill>
+              <a:srgbClr val="FFFF00"/>
+            </a:solidFill>
+            <a:ln>
+              <a:noFill/>
+            </a:ln>
+          </p:spPr>
+          <p:style>
+            <a:lnRef idx="2">
+              <a:schemeClr val="accent1">
+                <a:shade val="50000"/>
+              </a:schemeClr>
+            </a:lnRef>
+            <a:fillRef idx="1">
+              <a:schemeClr val="accent1"/>
+            </a:fillRef>
+            <a:effectRef idx="0">
+              <a:schemeClr val="accent1"/>
+            </a:effectRef>
+            <a:fontRef idx="minor">
+              <a:schemeClr val="lt1"/>
+            </a:fontRef>
+          </p:style>
+          <p:txBody>
+            <a:bodyPr rtlCol="0" anchor="ctr"/>
+            <a:lstStyle/>
+            <a:p>
+              <a:pPr marL="0" marR="0" lvl="0" indent="0" algn="ctr" defTabSz="914400" rtl="0" eaLnBrk="1" fontAlgn="auto" latinLnBrk="0" hangingPunct="1">
+                <a:lnSpc>
+                  <a:spcPct val="100000"/>
+                </a:lnSpc>
+                <a:spcBef>
+                  <a:spcPts val="0"/>
+                </a:spcBef>
+                <a:spcAft>
+                  <a:spcPts val="0"/>
+                </a:spcAft>
+                <a:buClrTx/>
+                <a:buSzTx/>
+                <a:buFontTx/>
+                <a:buNone/>
+                <a:tabLst/>
+                <a:defRPr/>
+              </a:pPr>
+              <a:r>
+                <a:rPr kumimoji="1" lang="en-US" altLang="ja-JP" sz="1400" dirty="0">
+                  <a:solidFill>
+                    <a:prstClr val="black"/>
+                  </a:solidFill>
+                  <a:latin typeface="Calibri"/>
+                  <a:ea typeface="ＭＳ Ｐゴシック" panose="020B0600070205080204" pitchFamily="50" charset="-128"/>
+                </a:rPr>
+                <a:t>Marketing</a:t>
+              </a:r>
+              <a:endParaRPr kumimoji="1" lang="ja-JP" altLang="en-US" sz="1400" b="0" i="0" u="none" strike="noStrike" kern="1200" cap="none" spc="0" normalizeH="0" baseline="0" noProof="0" dirty="0">
+                <a:ln>
+                  <a:noFill/>
+                </a:ln>
+                <a:solidFill>
+                  <a:prstClr val="black"/>
+                </a:solidFill>
+                <a:effectLst/>
+                <a:uLnTx/>
+                <a:uFillTx/>
+                <a:latin typeface="Calibri"/>
+                <a:ea typeface="ＭＳ Ｐゴシック" panose="020B0600070205080204" pitchFamily="50" charset="-128"/>
+                <a:cs typeface="+mn-cs"/>
+              </a:endParaRPr>
+            </a:p>
+          </p:txBody>
+        </p:sp>
+        <p:sp>
+          <p:nvSpPr>
+            <p:cNvPr id="60" name="テキスト ボックス 59">
+              <a:extLst>
+                <a:ext uri="{FF2B5EF4-FFF2-40B4-BE49-F238E27FC236}">
+                  <a16:creationId xmlns:a16="http://schemas.microsoft.com/office/drawing/2014/main" id="{3F9EB81D-AB46-428E-A104-B5F2C7A9D5B8}"/>
+                </a:ext>
+              </a:extLst>
+            </p:cNvPr>
+            <p:cNvSpPr txBox="1"/>
+            <p:nvPr/>
+          </p:nvSpPr>
+          <p:spPr>
+            <a:xfrm>
+              <a:off x="5742669" y="336723"/>
+              <a:ext cx="1503150" cy="369332"/>
+            </a:xfrm>
+            <a:prstGeom prst="rect">
+              <a:avLst/>
+            </a:prstGeom>
+            <a:noFill/>
+          </p:spPr>
+          <p:txBody>
+            <a:bodyPr wrap="square" rtlCol="0">
+              <a:spAutoFit/>
+            </a:bodyPr>
+            <a:lstStyle/>
+            <a:p>
+              <a:pPr marL="0" marR="0" lvl="0" indent="0" algn="l" defTabSz="914400" rtl="0" eaLnBrk="1" fontAlgn="auto" latinLnBrk="0" hangingPunct="1">
+                <a:lnSpc>
+                  <a:spcPct val="100000"/>
+                </a:lnSpc>
+                <a:spcBef>
+                  <a:spcPts val="0"/>
+                </a:spcBef>
+                <a:spcAft>
+                  <a:spcPts val="0"/>
+                </a:spcAft>
+                <a:buClrTx/>
+                <a:buSzTx/>
+                <a:buFontTx/>
+                <a:buNone/>
+                <a:tabLst/>
+                <a:defRPr/>
+              </a:pPr>
+              <a:r>
+                <a:rPr kumimoji="1" lang="en-US" altLang="ja-JP" dirty="0">
+                  <a:solidFill>
+                    <a:prstClr val="black"/>
+                  </a:solidFill>
+                  <a:latin typeface="Calibri"/>
+                  <a:ea typeface="ＭＳ Ｐゴシック" panose="020B0600070205080204" pitchFamily="50" charset="-128"/>
+                </a:rPr>
+                <a:t>Organization</a:t>
+              </a:r>
+              <a:endParaRPr kumimoji="1" lang="ja-JP" altLang="en-US" b="0" i="0" u="none" strike="noStrike" kern="1200" cap="none" spc="0" normalizeH="0" baseline="0" noProof="0" dirty="0">
+                <a:ln>
+                  <a:noFill/>
+                </a:ln>
+                <a:solidFill>
+                  <a:prstClr val="black"/>
+                </a:solidFill>
+                <a:effectLst/>
+                <a:uLnTx/>
+                <a:uFillTx/>
+                <a:latin typeface="Calibri"/>
+                <a:ea typeface="ＭＳ Ｐゴシック" panose="020B0600070205080204" pitchFamily="50" charset="-128"/>
+                <a:cs typeface="+mn-cs"/>
+              </a:endParaRPr>
+            </a:p>
+          </p:txBody>
+        </p:sp>
+      </p:grpSp>
+    </p:spTree>
+    <p:extLst>
+      <p:ext uri="{BB962C8B-B14F-4D97-AF65-F5344CB8AC3E}">
+        <p14:creationId xmlns:p14="http://schemas.microsoft.com/office/powerpoint/2010/main" val="3878596643"/>
       </p:ext>
     </p:extLst>
   </p:cSld>

</xml_diff>